<commit_message>
Stuff sur Page principale
</commit_message>
<xml_diff>
--- a/HopitalBim/Images/LOGOSite.pptx
+++ b/HopitalBim/Images/LOGOSite.pptx
@@ -104,6 +104,11 @@
       </a:defRPr>
     </a:lvl9pPr>
   </p:defaultTextStyle>
+  <p:extLst>
+    <p:ext uri="{EFAFB233-063F-42B5-8137-9DF3F51BA10A}">
+      <p15:sldGuideLst xmlns:p15="http://schemas.microsoft.com/office/powerpoint/2012/main"/>
+    </p:ext>
+  </p:extLst>
 </p:presentation>
 </file>
 
@@ -2950,6 +2955,17 @@
 <file path=ppt/slides/slide1.xml><?xml version="1.0" encoding="utf-8"?>
 <p:sld xmlns:a="http://schemas.openxmlformats.org/drawingml/2006/main" xmlns:r="http://schemas.openxmlformats.org/officeDocument/2006/relationships" xmlns:p="http://schemas.openxmlformats.org/presentationml/2006/main">
   <p:cSld>
+    <p:bg>
+      <p:bgPr>
+        <a:solidFill>
+          <a:schemeClr val="accent1">
+            <a:lumMod val="60000"/>
+            <a:lumOff val="40000"/>
+          </a:schemeClr>
+        </a:solidFill>
+        <a:effectLst/>
+      </p:bgPr>
+    </p:bg>
     <p:spTree>
       <p:nvGrpSpPr>
         <p:cNvPr id="1" name=""/>
@@ -2972,7 +2988,7 @@
         </p:nvGrpSpPr>
         <p:grpSpPr>
           <a:xfrm>
-            <a:off x="2426046" y="358387"/>
+            <a:off x="388240" y="211397"/>
             <a:ext cx="3194354" cy="3235713"/>
             <a:chOff x="2426046" y="358387"/>
             <a:chExt cx="3194354" cy="3235713"/>
@@ -3833,6 +3849,1028 @@
           </p:txBody>
         </p:sp>
       </p:grpSp>
+      <p:grpSp>
+        <p:nvGrpSpPr>
+          <p:cNvPr id="3" name="Grouper 2"/>
+          <p:cNvGrpSpPr/>
+          <p:nvPr/>
+        </p:nvGrpSpPr>
+        <p:grpSpPr>
+          <a:xfrm>
+            <a:off x="7420580" y="219119"/>
+            <a:ext cx="4500000" cy="4284000"/>
+            <a:chOff x="4548475" y="2353900"/>
+            <a:chExt cx="4500000" cy="4284000"/>
+          </a:xfrm>
+        </p:grpSpPr>
+        <p:grpSp>
+          <p:nvGrpSpPr>
+            <p:cNvPr id="21" name="Grouper 20"/>
+            <p:cNvGrpSpPr/>
+            <p:nvPr/>
+          </p:nvGrpSpPr>
+          <p:grpSpPr>
+            <a:xfrm>
+              <a:off x="5064147" y="2826724"/>
+              <a:ext cx="3194354" cy="3235713"/>
+              <a:chOff x="2426046" y="358387"/>
+              <a:chExt cx="3194354" cy="3235713"/>
+            </a:xfrm>
+            <a:effectLst>
+              <a:outerShdw blurRad="50800" dist="38100" dir="2700000" algn="tl" rotWithShape="0">
+                <a:prstClr val="black">
+                  <a:alpha val="40000"/>
+                </a:prstClr>
+              </a:outerShdw>
+            </a:effectLst>
+          </p:grpSpPr>
+          <p:grpSp>
+            <p:nvGrpSpPr>
+              <p:cNvPr id="24" name="Grouper 23"/>
+              <p:cNvGrpSpPr/>
+              <p:nvPr/>
+            </p:nvGrpSpPr>
+            <p:grpSpPr>
+              <a:xfrm>
+                <a:off x="2426046" y="366109"/>
+                <a:ext cx="3194354" cy="3227991"/>
+                <a:chOff x="2393646" y="368960"/>
+                <a:chExt cx="5500312" cy="5155839"/>
+              </a:xfrm>
+            </p:grpSpPr>
+            <p:sp>
+              <p:nvSpPr>
+                <p:cNvPr id="28" name="Parallélogramme 27"/>
+                <p:cNvSpPr/>
+                <p:nvPr/>
+              </p:nvSpPr>
+              <p:spPr>
+                <a:xfrm rot="5400000" flipV="1">
+                  <a:off x="6682524" y="4313366"/>
+                  <a:ext cx="2056975" cy="365892"/>
+                </a:xfrm>
+                <a:prstGeom prst="parallelogram">
+                  <a:avLst>
+                    <a:gd name="adj" fmla="val 99524"/>
+                  </a:avLst>
+                </a:prstGeom>
+                <a:solidFill>
+                  <a:srgbClr val="3E82A3"/>
+                </a:solidFill>
+                <a:ln>
+                  <a:solidFill>
+                    <a:srgbClr val="0F638C"/>
+                  </a:solidFill>
+                </a:ln>
+              </p:spPr>
+              <p:style>
+                <a:lnRef idx="2">
+                  <a:schemeClr val="accent6">
+                    <a:shade val="50000"/>
+                  </a:schemeClr>
+                </a:lnRef>
+                <a:fillRef idx="1">
+                  <a:schemeClr val="accent6"/>
+                </a:fillRef>
+                <a:effectRef idx="0">
+                  <a:schemeClr val="accent6"/>
+                </a:effectRef>
+                <a:fontRef idx="minor">
+                  <a:schemeClr val="lt1"/>
+                </a:fontRef>
+              </p:style>
+              <p:txBody>
+                <a:bodyPr rtlCol="0" anchor="ctr"/>
+                <a:lstStyle/>
+                <a:p>
+                  <a:pPr algn="ctr"/>
+                  <a:endParaRPr lang="fr-FR"/>
+                </a:p>
+              </p:txBody>
+            </p:sp>
+            <p:grpSp>
+              <p:nvGrpSpPr>
+                <p:cNvPr id="29" name="Grouper 28"/>
+                <p:cNvGrpSpPr/>
+                <p:nvPr/>
+              </p:nvGrpSpPr>
+              <p:grpSpPr>
+                <a:xfrm>
+                  <a:off x="4597579" y="1438881"/>
+                  <a:ext cx="1568358" cy="1515581"/>
+                  <a:chOff x="4615681" y="1516114"/>
+                  <a:chExt cx="1584358" cy="1515581"/>
+                </a:xfrm>
+              </p:grpSpPr>
+              <p:sp>
+                <p:nvSpPr>
+                  <p:cNvPr id="56" name="Parallélogramme 55"/>
+                  <p:cNvSpPr/>
+                  <p:nvPr/>
+                </p:nvSpPr>
+                <p:spPr>
+                  <a:xfrm>
+                    <a:off x="4615681" y="2655201"/>
+                    <a:ext cx="1584358" cy="376494"/>
+                  </a:xfrm>
+                  <a:prstGeom prst="parallelogram">
+                    <a:avLst>
+                      <a:gd name="adj" fmla="val 98123"/>
+                    </a:avLst>
+                  </a:prstGeom>
+                  <a:solidFill>
+                    <a:srgbClr val="3E82A3"/>
+                  </a:solidFill>
+                  <a:ln>
+                    <a:solidFill>
+                      <a:srgbClr val="0F638C"/>
+                    </a:solidFill>
+                  </a:ln>
+                </p:spPr>
+                <p:style>
+                  <a:lnRef idx="2">
+                    <a:schemeClr val="accent5">
+                      <a:shade val="50000"/>
+                    </a:schemeClr>
+                  </a:lnRef>
+                  <a:fillRef idx="1">
+                    <a:schemeClr val="accent5"/>
+                  </a:fillRef>
+                  <a:effectRef idx="0">
+                    <a:schemeClr val="accent5"/>
+                  </a:effectRef>
+                  <a:fontRef idx="minor">
+                    <a:schemeClr val="lt1"/>
+                  </a:fontRef>
+                </p:style>
+                <p:txBody>
+                  <a:bodyPr rtlCol="0" anchor="ctr"/>
+                  <a:lstStyle/>
+                  <a:p>
+                    <a:pPr algn="ctr"/>
+                    <a:endParaRPr lang="fr-FR"/>
+                  </a:p>
+                </p:txBody>
+              </p:sp>
+              <p:sp>
+                <p:nvSpPr>
+                  <p:cNvPr id="57" name="Parallélogramme 56"/>
+                  <p:cNvSpPr/>
+                  <p:nvPr/>
+                </p:nvSpPr>
+                <p:spPr>
+                  <a:xfrm rot="5400000" flipV="1">
+                    <a:off x="5264332" y="2079335"/>
+                    <a:ext cx="1498928" cy="372486"/>
+                  </a:xfrm>
+                  <a:prstGeom prst="parallelogram">
+                    <a:avLst>
+                      <a:gd name="adj" fmla="val 99524"/>
+                    </a:avLst>
+                  </a:prstGeom>
+                  <a:solidFill>
+                    <a:srgbClr val="262626"/>
+                  </a:solidFill>
+                  <a:ln>
+                    <a:solidFill>
+                      <a:schemeClr val="tx1">
+                        <a:lumMod val="95000"/>
+                        <a:lumOff val="5000"/>
+                      </a:schemeClr>
+                    </a:solidFill>
+                  </a:ln>
+                </p:spPr>
+                <p:style>
+                  <a:lnRef idx="2">
+                    <a:schemeClr val="accent6">
+                      <a:shade val="50000"/>
+                    </a:schemeClr>
+                  </a:lnRef>
+                  <a:fillRef idx="1">
+                    <a:schemeClr val="accent6"/>
+                  </a:fillRef>
+                  <a:effectRef idx="0">
+                    <a:schemeClr val="accent6"/>
+                  </a:effectRef>
+                  <a:fontRef idx="minor">
+                    <a:schemeClr val="lt1"/>
+                  </a:fontRef>
+                </p:style>
+                <p:txBody>
+                  <a:bodyPr rtlCol="0" anchor="ctr"/>
+                  <a:lstStyle/>
+                  <a:p>
+                    <a:pPr algn="ctr"/>
+                    <a:endParaRPr lang="fr-FR"/>
+                  </a:p>
+                </p:txBody>
+              </p:sp>
+            </p:grpSp>
+            <p:sp>
+              <p:nvSpPr>
+                <p:cNvPr id="30" name="Parallélogramme 29"/>
+                <p:cNvSpPr/>
+                <p:nvPr/>
+              </p:nvSpPr>
+              <p:spPr>
+                <a:xfrm rot="5400000" flipV="1">
+                  <a:off x="4047131" y="888043"/>
+                  <a:ext cx="1421744" cy="383578"/>
+                </a:xfrm>
+                <a:prstGeom prst="parallelogram">
+                  <a:avLst>
+                    <a:gd name="adj" fmla="val 99524"/>
+                  </a:avLst>
+                </a:prstGeom>
+                <a:solidFill>
+                  <a:srgbClr val="262626"/>
+                </a:solidFill>
+                <a:ln>
+                  <a:solidFill>
+                    <a:schemeClr val="tx1">
+                      <a:lumMod val="95000"/>
+                      <a:lumOff val="5000"/>
+                    </a:schemeClr>
+                  </a:solidFill>
+                </a:ln>
+              </p:spPr>
+              <p:style>
+                <a:lnRef idx="2">
+                  <a:schemeClr val="accent3">
+                    <a:shade val="50000"/>
+                  </a:schemeClr>
+                </a:lnRef>
+                <a:fillRef idx="1">
+                  <a:schemeClr val="accent3"/>
+                </a:fillRef>
+                <a:effectRef idx="0">
+                  <a:schemeClr val="accent3"/>
+                </a:effectRef>
+                <a:fontRef idx="minor">
+                  <a:schemeClr val="lt1"/>
+                </a:fontRef>
+              </p:style>
+              <p:txBody>
+                <a:bodyPr rtlCol="0" anchor="ctr"/>
+                <a:lstStyle/>
+                <a:p>
+                  <a:pPr algn="ctr"/>
+                  <a:endParaRPr lang="fr-FR"/>
+                </a:p>
+              </p:txBody>
+            </p:sp>
+            <p:sp>
+              <p:nvSpPr>
+                <p:cNvPr id="31" name="Parallélogramme 30"/>
+                <p:cNvSpPr/>
+                <p:nvPr/>
+              </p:nvSpPr>
+              <p:spPr>
+                <a:xfrm>
+                  <a:off x="2393646" y="2337877"/>
+                  <a:ext cx="1584039" cy="376494"/>
+                </a:xfrm>
+                <a:prstGeom prst="parallelogram">
+                  <a:avLst>
+                    <a:gd name="adj" fmla="val 98123"/>
+                  </a:avLst>
+                </a:prstGeom>
+                <a:solidFill>
+                  <a:srgbClr val="3E82A3"/>
+                </a:solidFill>
+                <a:ln>
+                  <a:solidFill>
+                    <a:srgbClr val="0F638C"/>
+                  </a:solidFill>
+                </a:ln>
+              </p:spPr>
+              <p:style>
+                <a:lnRef idx="2">
+                  <a:schemeClr val="accent5">
+                    <a:shade val="50000"/>
+                  </a:schemeClr>
+                </a:lnRef>
+                <a:fillRef idx="1">
+                  <a:schemeClr val="accent5"/>
+                </a:fillRef>
+                <a:effectRef idx="0">
+                  <a:schemeClr val="accent5"/>
+                </a:effectRef>
+                <a:fontRef idx="minor">
+                  <a:schemeClr val="lt1"/>
+                </a:fontRef>
+              </p:style>
+              <p:txBody>
+                <a:bodyPr rtlCol="0" anchor="ctr"/>
+                <a:lstStyle/>
+                <a:p>
+                  <a:pPr algn="ctr"/>
+                  <a:endParaRPr lang="fr-FR"/>
+                </a:p>
+              </p:txBody>
+            </p:sp>
+            <p:sp>
+              <p:nvSpPr>
+                <p:cNvPr id="38" name="Parallélogramme 37"/>
+                <p:cNvSpPr/>
+                <p:nvPr/>
+              </p:nvSpPr>
+              <p:spPr>
+                <a:xfrm rot="5400000" flipV="1">
+                  <a:off x="3055416" y="2904792"/>
+                  <a:ext cx="1485900" cy="365892"/>
+                </a:xfrm>
+                <a:prstGeom prst="parallelogram">
+                  <a:avLst>
+                    <a:gd name="adj" fmla="val 102916"/>
+                  </a:avLst>
+                </a:prstGeom>
+                <a:solidFill>
+                  <a:srgbClr val="262626"/>
+                </a:solidFill>
+                <a:ln>
+                  <a:solidFill>
+                    <a:schemeClr val="tx1">
+                      <a:lumMod val="95000"/>
+                      <a:lumOff val="5000"/>
+                    </a:schemeClr>
+                  </a:solidFill>
+                </a:ln>
+              </p:spPr>
+              <p:style>
+                <a:lnRef idx="2">
+                  <a:schemeClr val="accent6">
+                    <a:shade val="50000"/>
+                  </a:schemeClr>
+                </a:lnRef>
+                <a:fillRef idx="1">
+                  <a:schemeClr val="accent6"/>
+                </a:fillRef>
+                <a:effectRef idx="0">
+                  <a:schemeClr val="accent6"/>
+                </a:effectRef>
+                <a:fontRef idx="minor">
+                  <a:schemeClr val="lt1"/>
+                </a:fontRef>
+              </p:style>
+              <p:txBody>
+                <a:bodyPr rtlCol="0" anchor="ctr"/>
+                <a:lstStyle/>
+                <a:p>
+                  <a:pPr algn="ctr"/>
+                  <a:endParaRPr lang="fr-FR"/>
+                </a:p>
+              </p:txBody>
+            </p:sp>
+            <p:sp>
+              <p:nvSpPr>
+                <p:cNvPr id="48" name="Parallélogramme 47"/>
+                <p:cNvSpPr/>
+                <p:nvPr/>
+              </p:nvSpPr>
+              <p:spPr>
+                <a:xfrm rot="5400000" flipV="1">
+                  <a:off x="1838403" y="1771678"/>
+                  <a:ext cx="1485900" cy="365892"/>
+                </a:xfrm>
+                <a:prstGeom prst="parallelogram">
+                  <a:avLst>
+                    <a:gd name="adj" fmla="val 99524"/>
+                  </a:avLst>
+                </a:prstGeom>
+                <a:solidFill>
+                  <a:srgbClr val="262626"/>
+                </a:solidFill>
+                <a:ln>
+                  <a:solidFill>
+                    <a:schemeClr val="tx1">
+                      <a:lumMod val="95000"/>
+                      <a:lumOff val="5000"/>
+                    </a:schemeClr>
+                  </a:solidFill>
+                </a:ln>
+              </p:spPr>
+              <p:style>
+                <a:lnRef idx="2">
+                  <a:schemeClr val="accent6">
+                    <a:shade val="50000"/>
+                  </a:schemeClr>
+                </a:lnRef>
+                <a:fillRef idx="1">
+                  <a:schemeClr val="accent6"/>
+                </a:fillRef>
+                <a:effectRef idx="0">
+                  <a:schemeClr val="accent6"/>
+                </a:effectRef>
+                <a:fontRef idx="minor">
+                  <a:schemeClr val="lt1"/>
+                </a:fontRef>
+              </p:style>
+              <p:txBody>
+                <a:bodyPr rtlCol="0" anchor="ctr"/>
+                <a:lstStyle/>
+                <a:p>
+                  <a:pPr algn="ctr"/>
+                  <a:endParaRPr lang="fr-FR"/>
+                </a:p>
+              </p:txBody>
+            </p:sp>
+            <p:sp>
+              <p:nvSpPr>
+                <p:cNvPr id="49" name="Parallélogramme 48"/>
+                <p:cNvSpPr/>
+                <p:nvPr/>
+              </p:nvSpPr>
+              <p:spPr>
+                <a:xfrm>
+                  <a:off x="2409229" y="1165803"/>
+                  <a:ext cx="1584038" cy="376494"/>
+                </a:xfrm>
+                <a:prstGeom prst="parallelogram">
+                  <a:avLst>
+                    <a:gd name="adj" fmla="val 98123"/>
+                  </a:avLst>
+                </a:prstGeom>
+                <a:solidFill>
+                  <a:srgbClr val="3E82A3"/>
+                </a:solidFill>
+                <a:ln>
+                  <a:solidFill>
+                    <a:srgbClr val="0F638C"/>
+                  </a:solidFill>
+                </a:ln>
+              </p:spPr>
+              <p:style>
+                <a:lnRef idx="2">
+                  <a:schemeClr val="accent5">
+                    <a:shade val="50000"/>
+                  </a:schemeClr>
+                </a:lnRef>
+                <a:fillRef idx="1">
+                  <a:schemeClr val="accent5"/>
+                </a:fillRef>
+                <a:effectRef idx="0">
+                  <a:schemeClr val="accent5"/>
+                </a:effectRef>
+                <a:fontRef idx="minor">
+                  <a:schemeClr val="lt1"/>
+                </a:fontRef>
+              </p:style>
+              <p:txBody>
+                <a:bodyPr rtlCol="0" anchor="ctr"/>
+                <a:lstStyle/>
+                <a:p>
+                  <a:pPr algn="ctr"/>
+                  <a:endParaRPr lang="fr-FR"/>
+                </a:p>
+              </p:txBody>
+            </p:sp>
+            <p:sp>
+              <p:nvSpPr>
+                <p:cNvPr id="50" name="Parallélogramme 49"/>
+                <p:cNvSpPr/>
+                <p:nvPr/>
+              </p:nvSpPr>
+              <p:spPr>
+                <a:xfrm>
+                  <a:off x="3615420" y="3467824"/>
+                  <a:ext cx="4269036" cy="376494"/>
+                </a:xfrm>
+                <a:prstGeom prst="parallelogram">
+                  <a:avLst>
+                    <a:gd name="adj" fmla="val 98123"/>
+                  </a:avLst>
+                </a:prstGeom>
+                <a:solidFill>
+                  <a:srgbClr val="3E82A3"/>
+                </a:solidFill>
+                <a:ln>
+                  <a:solidFill>
+                    <a:srgbClr val="0F638C"/>
+                  </a:solidFill>
+                </a:ln>
+              </p:spPr>
+              <p:style>
+                <a:lnRef idx="2">
+                  <a:schemeClr val="accent5">
+                    <a:shade val="50000"/>
+                  </a:schemeClr>
+                </a:lnRef>
+                <a:fillRef idx="1">
+                  <a:schemeClr val="accent5"/>
+                </a:fillRef>
+                <a:effectRef idx="0">
+                  <a:schemeClr val="accent5"/>
+                </a:effectRef>
+                <a:fontRef idx="minor">
+                  <a:schemeClr val="lt1"/>
+                </a:fontRef>
+              </p:style>
+              <p:txBody>
+                <a:bodyPr rtlCol="0" anchor="ctr"/>
+                <a:lstStyle/>
+                <a:p>
+                  <a:pPr algn="ctr"/>
+                  <a:endParaRPr lang="fr-FR"/>
+                </a:p>
+              </p:txBody>
+            </p:sp>
+            <p:sp>
+              <p:nvSpPr>
+                <p:cNvPr id="51" name="Parallélogramme 50"/>
+                <p:cNvSpPr/>
+                <p:nvPr/>
+              </p:nvSpPr>
+              <p:spPr>
+                <a:xfrm rot="5400000" flipV="1">
+                  <a:off x="6508292" y="2452140"/>
+                  <a:ext cx="2405437" cy="365892"/>
+                </a:xfrm>
+                <a:prstGeom prst="parallelogram">
+                  <a:avLst>
+                    <a:gd name="adj" fmla="val 99524"/>
+                  </a:avLst>
+                </a:prstGeom>
+                <a:solidFill>
+                  <a:srgbClr val="3E82A3"/>
+                </a:solidFill>
+                <a:ln>
+                  <a:solidFill>
+                    <a:srgbClr val="0F638C"/>
+                  </a:solidFill>
+                </a:ln>
+              </p:spPr>
+              <p:style>
+                <a:lnRef idx="2">
+                  <a:schemeClr val="accent6">
+                    <a:shade val="50000"/>
+                  </a:schemeClr>
+                </a:lnRef>
+                <a:fillRef idx="1">
+                  <a:schemeClr val="accent6"/>
+                </a:fillRef>
+                <a:effectRef idx="0">
+                  <a:schemeClr val="accent6"/>
+                </a:effectRef>
+                <a:fontRef idx="minor">
+                  <a:schemeClr val="lt1"/>
+                </a:fontRef>
+              </p:style>
+              <p:txBody>
+                <a:bodyPr rtlCol="0" anchor="ctr"/>
+                <a:lstStyle/>
+                <a:p>
+                  <a:pPr algn="ctr"/>
+                  <a:endParaRPr lang="fr-FR"/>
+                </a:p>
+              </p:txBody>
+            </p:sp>
+            <p:sp>
+              <p:nvSpPr>
+                <p:cNvPr id="52" name="Parallélogramme 51"/>
+                <p:cNvSpPr/>
+                <p:nvPr/>
+              </p:nvSpPr>
+              <p:spPr>
+                <a:xfrm rot="5400000" flipV="1">
+                  <a:off x="6361649" y="2590107"/>
+                  <a:ext cx="1125629" cy="365892"/>
+                </a:xfrm>
+                <a:prstGeom prst="parallelogram">
+                  <a:avLst>
+                    <a:gd name="adj" fmla="val 99524"/>
+                  </a:avLst>
+                </a:prstGeom>
+                <a:solidFill>
+                  <a:srgbClr val="262626"/>
+                </a:solidFill>
+                <a:ln>
+                  <a:solidFill>
+                    <a:schemeClr val="tx1">
+                      <a:lumMod val="95000"/>
+                      <a:lumOff val="5000"/>
+                    </a:schemeClr>
+                  </a:solidFill>
+                </a:ln>
+              </p:spPr>
+              <p:style>
+                <a:lnRef idx="2">
+                  <a:schemeClr val="accent6">
+                    <a:shade val="50000"/>
+                  </a:schemeClr>
+                </a:lnRef>
+                <a:fillRef idx="1">
+                  <a:schemeClr val="accent6"/>
+                </a:fillRef>
+                <a:effectRef idx="0">
+                  <a:schemeClr val="accent6"/>
+                </a:effectRef>
+                <a:fontRef idx="minor">
+                  <a:schemeClr val="lt1"/>
+                </a:fontRef>
+              </p:style>
+              <p:txBody>
+                <a:bodyPr rtlCol="0" anchor="ctr"/>
+                <a:lstStyle/>
+                <a:p>
+                  <a:pPr algn="ctr"/>
+                  <a:endParaRPr lang="fr-FR"/>
+                </a:p>
+              </p:txBody>
+            </p:sp>
+            <p:sp>
+              <p:nvSpPr>
+                <p:cNvPr id="53" name="Parallélogramme 52"/>
+                <p:cNvSpPr/>
+                <p:nvPr/>
+              </p:nvSpPr>
+              <p:spPr>
+                <a:xfrm rot="5400000" flipV="1">
+                  <a:off x="6310632" y="4350956"/>
+                  <a:ext cx="1227663" cy="365892"/>
+                </a:xfrm>
+                <a:prstGeom prst="parallelogram">
+                  <a:avLst>
+                    <a:gd name="adj" fmla="val 0"/>
+                  </a:avLst>
+                </a:prstGeom>
+                <a:solidFill>
+                  <a:srgbClr val="262626"/>
+                </a:solidFill>
+                <a:ln>
+                  <a:solidFill>
+                    <a:schemeClr val="tx1">
+                      <a:lumMod val="95000"/>
+                      <a:lumOff val="5000"/>
+                    </a:schemeClr>
+                  </a:solidFill>
+                </a:ln>
+              </p:spPr>
+              <p:style>
+                <a:lnRef idx="2">
+                  <a:schemeClr val="accent6">
+                    <a:shade val="50000"/>
+                  </a:schemeClr>
+                </a:lnRef>
+                <a:fillRef idx="1">
+                  <a:schemeClr val="accent6"/>
+                </a:fillRef>
+                <a:effectRef idx="0">
+                  <a:schemeClr val="accent6"/>
+                </a:effectRef>
+                <a:fontRef idx="minor">
+                  <a:schemeClr val="lt1"/>
+                </a:fontRef>
+              </p:style>
+              <p:txBody>
+                <a:bodyPr rtlCol="0" anchor="ctr"/>
+                <a:lstStyle/>
+                <a:p>
+                  <a:pPr algn="ctr"/>
+                  <a:endParaRPr lang="fr-FR"/>
+                </a:p>
+              </p:txBody>
+            </p:sp>
+            <p:sp>
+              <p:nvSpPr>
+                <p:cNvPr id="54" name="Parallélogramme 53"/>
+                <p:cNvSpPr/>
+                <p:nvPr/>
+              </p:nvSpPr>
+              <p:spPr>
+                <a:xfrm rot="5400000" flipV="1">
+                  <a:off x="6532677" y="2825696"/>
+                  <a:ext cx="783574" cy="365892"/>
+                </a:xfrm>
+                <a:prstGeom prst="parallelogram">
+                  <a:avLst>
+                    <a:gd name="adj" fmla="val 0"/>
+                  </a:avLst>
+                </a:prstGeom>
+                <a:solidFill>
+                  <a:srgbClr val="262626"/>
+                </a:solidFill>
+                <a:ln>
+                  <a:solidFill>
+                    <a:schemeClr val="tx1">
+                      <a:lumMod val="95000"/>
+                      <a:lumOff val="5000"/>
+                    </a:schemeClr>
+                  </a:solidFill>
+                </a:ln>
+              </p:spPr>
+              <p:style>
+                <a:lnRef idx="2">
+                  <a:schemeClr val="accent6">
+                    <a:shade val="50000"/>
+                  </a:schemeClr>
+                </a:lnRef>
+                <a:fillRef idx="1">
+                  <a:schemeClr val="accent6"/>
+                </a:fillRef>
+                <a:effectRef idx="0">
+                  <a:schemeClr val="accent6"/>
+                </a:effectRef>
+                <a:fontRef idx="minor">
+                  <a:schemeClr val="lt1"/>
+                </a:fontRef>
+              </p:style>
+              <p:txBody>
+                <a:bodyPr rtlCol="0" anchor="ctr"/>
+                <a:lstStyle/>
+                <a:p>
+                  <a:pPr algn="ctr"/>
+                  <a:endParaRPr lang="fr-FR"/>
+                </a:p>
+              </p:txBody>
+            </p:sp>
+            <p:sp>
+              <p:nvSpPr>
+                <p:cNvPr id="55" name="Rectangle 54"/>
+                <p:cNvSpPr/>
+                <p:nvPr/>
+              </p:nvSpPr>
+              <p:spPr>
+                <a:xfrm>
+                  <a:off x="6741516" y="2598682"/>
+                  <a:ext cx="365893" cy="169918"/>
+                </a:xfrm>
+                <a:prstGeom prst="rect">
+                  <a:avLst/>
+                </a:prstGeom>
+                <a:solidFill>
+                  <a:srgbClr val="262626"/>
+                </a:solidFill>
+                <a:ln>
+                  <a:noFill/>
+                </a:ln>
+              </p:spPr>
+              <p:style>
+                <a:lnRef idx="2">
+                  <a:schemeClr val="accent1">
+                    <a:shade val="50000"/>
+                  </a:schemeClr>
+                </a:lnRef>
+                <a:fillRef idx="1">
+                  <a:schemeClr val="accent1"/>
+                </a:fillRef>
+                <a:effectRef idx="0">
+                  <a:schemeClr val="accent1"/>
+                </a:effectRef>
+                <a:fontRef idx="minor">
+                  <a:schemeClr val="lt1"/>
+                </a:fontRef>
+              </p:style>
+              <p:txBody>
+                <a:bodyPr rtlCol="0" anchor="ctr"/>
+                <a:lstStyle/>
+                <a:p>
+                  <a:pPr algn="ctr"/>
+                  <a:endParaRPr lang="fr-FR"/>
+                </a:p>
+              </p:txBody>
+            </p:sp>
+          </p:grpSp>
+          <p:sp>
+            <p:nvSpPr>
+              <p:cNvPr id="25" name="Parallélogramme 24"/>
+              <p:cNvSpPr/>
+              <p:nvPr/>
+            </p:nvSpPr>
+            <p:spPr>
+              <a:xfrm>
+                <a:off x="3694935" y="1025737"/>
+                <a:ext cx="921902" cy="235717"/>
+              </a:xfrm>
+              <a:prstGeom prst="parallelogram">
+                <a:avLst>
+                  <a:gd name="adj" fmla="val 98123"/>
+                </a:avLst>
+              </a:prstGeom>
+              <a:solidFill>
+                <a:srgbClr val="3E82A3"/>
+              </a:solidFill>
+              <a:ln>
+                <a:solidFill>
+                  <a:srgbClr val="0F638C"/>
+                </a:solidFill>
+              </a:ln>
+            </p:spPr>
+            <p:style>
+              <a:lnRef idx="2">
+                <a:schemeClr val="accent5">
+                  <a:shade val="50000"/>
+                </a:schemeClr>
+              </a:lnRef>
+              <a:fillRef idx="1">
+                <a:schemeClr val="accent5"/>
+              </a:fillRef>
+              <a:effectRef idx="0">
+                <a:schemeClr val="accent5"/>
+              </a:effectRef>
+              <a:fontRef idx="minor">
+                <a:schemeClr val="lt1"/>
+              </a:fontRef>
+            </p:style>
+            <p:txBody>
+              <a:bodyPr rtlCol="0" anchor="ctr"/>
+              <a:lstStyle/>
+              <a:p>
+                <a:pPr algn="ctr"/>
+                <a:endParaRPr lang="fr-FR"/>
+              </a:p>
+            </p:txBody>
+          </p:sp>
+          <p:sp>
+            <p:nvSpPr>
+              <p:cNvPr id="27" name="Parallélogramme 26"/>
+              <p:cNvSpPr/>
+              <p:nvPr/>
+            </p:nvSpPr>
+            <p:spPr>
+              <a:xfrm>
+                <a:off x="2787446" y="358387"/>
+                <a:ext cx="1123104" cy="235717"/>
+              </a:xfrm>
+              <a:prstGeom prst="parallelogram">
+                <a:avLst>
+                  <a:gd name="adj" fmla="val 98123"/>
+                </a:avLst>
+              </a:prstGeom>
+              <a:solidFill>
+                <a:srgbClr val="3E82A3"/>
+              </a:solidFill>
+              <a:ln>
+                <a:solidFill>
+                  <a:srgbClr val="0F638C"/>
+                </a:solidFill>
+              </a:ln>
+            </p:spPr>
+            <p:style>
+              <a:lnRef idx="2">
+                <a:schemeClr val="accent5">
+                  <a:shade val="50000"/>
+                </a:schemeClr>
+              </a:lnRef>
+              <a:fillRef idx="1">
+                <a:schemeClr val="accent5"/>
+              </a:fillRef>
+              <a:effectRef idx="0">
+                <a:schemeClr val="accent5"/>
+              </a:effectRef>
+              <a:fontRef idx="minor">
+                <a:schemeClr val="lt1"/>
+              </a:fontRef>
+            </p:style>
+            <p:txBody>
+              <a:bodyPr rtlCol="0" anchor="ctr"/>
+              <a:lstStyle/>
+              <a:p>
+                <a:pPr algn="ctr"/>
+                <a:endParaRPr lang="fr-FR"/>
+              </a:p>
+            </p:txBody>
+          </p:sp>
+        </p:grpSp>
+        <p:sp>
+          <p:nvSpPr>
+            <p:cNvPr id="2" name="Ellipse 1"/>
+            <p:cNvSpPr/>
+            <p:nvPr/>
+          </p:nvSpPr>
+          <p:spPr>
+            <a:xfrm>
+              <a:off x="4592924" y="2398248"/>
+              <a:ext cx="4402125" cy="4177723"/>
+            </a:xfrm>
+            <a:prstGeom prst="ellipse">
+              <a:avLst/>
+            </a:prstGeom>
+            <a:noFill/>
+            <a:ln w="28575">
+              <a:solidFill>
+                <a:srgbClr val="3E82A3"/>
+              </a:solidFill>
+            </a:ln>
+          </p:spPr>
+          <p:style>
+            <a:lnRef idx="2">
+              <a:schemeClr val="accent1">
+                <a:shade val="50000"/>
+              </a:schemeClr>
+            </a:lnRef>
+            <a:fillRef idx="1">
+              <a:schemeClr val="accent1"/>
+            </a:fillRef>
+            <a:effectRef idx="0">
+              <a:schemeClr val="accent1"/>
+            </a:effectRef>
+            <a:fontRef idx="minor">
+              <a:schemeClr val="lt1"/>
+            </a:fontRef>
+          </p:style>
+          <p:txBody>
+            <a:bodyPr rtlCol="0" anchor="ctr"/>
+            <a:lstStyle/>
+            <a:p>
+              <a:pPr algn="ctr"/>
+              <a:endParaRPr lang="fr-FR"/>
+            </a:p>
+          </p:txBody>
+        </p:sp>
+        <p:sp>
+          <p:nvSpPr>
+            <p:cNvPr id="58" name="Ellipse 57"/>
+            <p:cNvSpPr/>
+            <p:nvPr/>
+          </p:nvSpPr>
+          <p:spPr>
+            <a:xfrm>
+              <a:off x="4548475" y="2353900"/>
+              <a:ext cx="4500000" cy="4284000"/>
+            </a:xfrm>
+            <a:prstGeom prst="ellipse">
+              <a:avLst/>
+            </a:prstGeom>
+            <a:noFill/>
+            <a:ln w="28575">
+              <a:solidFill>
+                <a:srgbClr val="262626"/>
+              </a:solidFill>
+            </a:ln>
+          </p:spPr>
+          <p:style>
+            <a:lnRef idx="2">
+              <a:schemeClr val="accent1">
+                <a:shade val="50000"/>
+              </a:schemeClr>
+            </a:lnRef>
+            <a:fillRef idx="1">
+              <a:schemeClr val="accent1"/>
+            </a:fillRef>
+            <a:effectRef idx="0">
+              <a:schemeClr val="accent1"/>
+            </a:effectRef>
+            <a:fontRef idx="minor">
+              <a:schemeClr val="lt1"/>
+            </a:fontRef>
+          </p:style>
+          <p:txBody>
+            <a:bodyPr rtlCol="0" anchor="ctr"/>
+            <a:lstStyle/>
+            <a:p>
+              <a:pPr algn="ctr"/>
+              <a:endParaRPr lang="fr-FR"/>
+            </a:p>
+          </p:txBody>
+        </p:sp>
+        <p:sp>
+          <p:nvSpPr>
+            <p:cNvPr id="59" name="Ellipse 58"/>
+            <p:cNvSpPr/>
+            <p:nvPr/>
+          </p:nvSpPr>
+          <p:spPr>
+            <a:xfrm>
+              <a:off x="4651986" y="2461900"/>
+              <a:ext cx="4284000" cy="4068000"/>
+            </a:xfrm>
+            <a:prstGeom prst="ellipse">
+              <a:avLst/>
+            </a:prstGeom>
+            <a:noFill/>
+            <a:ln w="28575">
+              <a:solidFill>
+                <a:schemeClr val="bg1"/>
+              </a:solidFill>
+            </a:ln>
+          </p:spPr>
+          <p:style>
+            <a:lnRef idx="2">
+              <a:schemeClr val="accent1">
+                <a:shade val="50000"/>
+              </a:schemeClr>
+            </a:lnRef>
+            <a:fillRef idx="1">
+              <a:schemeClr val="accent1"/>
+            </a:fillRef>
+            <a:effectRef idx="0">
+              <a:schemeClr val="accent1"/>
+            </a:effectRef>
+            <a:fontRef idx="minor">
+              <a:schemeClr val="lt1"/>
+            </a:fontRef>
+          </p:style>
+          <p:txBody>
+            <a:bodyPr rtlCol="0" anchor="ctr"/>
+            <a:lstStyle/>
+            <a:p>
+              <a:pPr algn="ctr"/>
+              <a:endParaRPr lang="fr-FR"/>
+            </a:p>
+          </p:txBody>
+        </p:sp>
+      </p:grpSp>
     </p:spTree>
     <p:extLst>
       <p:ext uri="{BB962C8B-B14F-4D97-AF65-F5344CB8AC3E}">

</xml_diff>

<commit_message>
footer, logo et btn déco
</commit_message>
<xml_diff>
--- a/HopitalBim/Images/LOGOSite.pptx
+++ b/HopitalBim/Images/LOGOSite.pptx
@@ -243,7 +243,7 @@
           <a:p>
             <a:fld id="{C468E374-40A4-554F-A1FE-8809F0CFFCA6}" type="datetimeFigureOut">
               <a:rPr lang="fr-FR" smtClean="0"/>
-              <a:t>01/12/2017</a:t>
+              <a:t>02/12/2017</a:t>
             </a:fld>
             <a:endParaRPr lang="fr-FR"/>
           </a:p>
@@ -413,7 +413,7 @@
           <a:p>
             <a:fld id="{C468E374-40A4-554F-A1FE-8809F0CFFCA6}" type="datetimeFigureOut">
               <a:rPr lang="fr-FR" smtClean="0"/>
-              <a:t>01/12/2017</a:t>
+              <a:t>02/12/2017</a:t>
             </a:fld>
             <a:endParaRPr lang="fr-FR"/>
           </a:p>
@@ -593,7 +593,7 @@
           <a:p>
             <a:fld id="{C468E374-40A4-554F-A1FE-8809F0CFFCA6}" type="datetimeFigureOut">
               <a:rPr lang="fr-FR" smtClean="0"/>
-              <a:t>01/12/2017</a:t>
+              <a:t>02/12/2017</a:t>
             </a:fld>
             <a:endParaRPr lang="fr-FR"/>
           </a:p>
@@ -763,7 +763,7 @@
           <a:p>
             <a:fld id="{C468E374-40A4-554F-A1FE-8809F0CFFCA6}" type="datetimeFigureOut">
               <a:rPr lang="fr-FR" smtClean="0"/>
-              <a:t>01/12/2017</a:t>
+              <a:t>02/12/2017</a:t>
             </a:fld>
             <a:endParaRPr lang="fr-FR"/>
           </a:p>
@@ -1009,7 +1009,7 @@
           <a:p>
             <a:fld id="{C468E374-40A4-554F-A1FE-8809F0CFFCA6}" type="datetimeFigureOut">
               <a:rPr lang="fr-FR" smtClean="0"/>
-              <a:t>01/12/2017</a:t>
+              <a:t>02/12/2017</a:t>
             </a:fld>
             <a:endParaRPr lang="fr-FR"/>
           </a:p>
@@ -1241,7 +1241,7 @@
           <a:p>
             <a:fld id="{C468E374-40A4-554F-A1FE-8809F0CFFCA6}" type="datetimeFigureOut">
               <a:rPr lang="fr-FR" smtClean="0"/>
-              <a:t>01/12/2017</a:t>
+              <a:t>02/12/2017</a:t>
             </a:fld>
             <a:endParaRPr lang="fr-FR"/>
           </a:p>
@@ -1608,7 +1608,7 @@
           <a:p>
             <a:fld id="{C468E374-40A4-554F-A1FE-8809F0CFFCA6}" type="datetimeFigureOut">
               <a:rPr lang="fr-FR" smtClean="0"/>
-              <a:t>01/12/2017</a:t>
+              <a:t>02/12/2017</a:t>
             </a:fld>
             <a:endParaRPr lang="fr-FR"/>
           </a:p>
@@ -1726,7 +1726,7 @@
           <a:p>
             <a:fld id="{C468E374-40A4-554F-A1FE-8809F0CFFCA6}" type="datetimeFigureOut">
               <a:rPr lang="fr-FR" smtClean="0"/>
-              <a:t>01/12/2017</a:t>
+              <a:t>02/12/2017</a:t>
             </a:fld>
             <a:endParaRPr lang="fr-FR"/>
           </a:p>
@@ -1821,7 +1821,7 @@
           <a:p>
             <a:fld id="{C468E374-40A4-554F-A1FE-8809F0CFFCA6}" type="datetimeFigureOut">
               <a:rPr lang="fr-FR" smtClean="0"/>
-              <a:t>01/12/2017</a:t>
+              <a:t>02/12/2017</a:t>
             </a:fld>
             <a:endParaRPr lang="fr-FR"/>
           </a:p>
@@ -2098,7 +2098,7 @@
           <a:p>
             <a:fld id="{C468E374-40A4-554F-A1FE-8809F0CFFCA6}" type="datetimeFigureOut">
               <a:rPr lang="fr-FR" smtClean="0"/>
-              <a:t>01/12/2017</a:t>
+              <a:t>02/12/2017</a:t>
             </a:fld>
             <a:endParaRPr lang="fr-FR"/>
           </a:p>
@@ -2351,7 +2351,7 @@
           <a:p>
             <a:fld id="{C468E374-40A4-554F-A1FE-8809F0CFFCA6}" type="datetimeFigureOut">
               <a:rPr lang="fr-FR" smtClean="0"/>
-              <a:t>01/12/2017</a:t>
+              <a:t>02/12/2017</a:t>
             </a:fld>
             <a:endParaRPr lang="fr-FR"/>
           </a:p>
@@ -2564,7 +2564,7 @@
           <a:p>
             <a:fld id="{C468E374-40A4-554F-A1FE-8809F0CFFCA6}" type="datetimeFigureOut">
               <a:rPr lang="fr-FR" smtClean="0"/>
-              <a:t>01/12/2017</a:t>
+              <a:t>02/12/2017</a:t>
             </a:fld>
             <a:endParaRPr lang="fr-FR"/>
           </a:p>
@@ -2958,10 +2958,7 @@
     <p:bg>
       <p:bgPr>
         <a:solidFill>
-          <a:schemeClr val="accent1">
-            <a:lumMod val="60000"/>
-            <a:lumOff val="40000"/>
-          </a:schemeClr>
+          <a:srgbClr val="136A88"/>
         </a:solidFill>
         <a:effectLst/>
       </p:bgPr>
@@ -2988,15 +2985,15 @@
         </p:nvGrpSpPr>
         <p:grpSpPr>
           <a:xfrm>
-            <a:off x="388240" y="211397"/>
+            <a:off x="4195614" y="446982"/>
             <a:ext cx="3194354" cy="3235713"/>
             <a:chOff x="2426046" y="358387"/>
             <a:chExt cx="3194354" cy="3235713"/>
           </a:xfrm>
           <a:effectLst>
-            <a:outerShdw blurRad="50800" dist="38100" dir="2700000" algn="tl" rotWithShape="0">
+            <a:outerShdw blurRad="139700" dist="50800" dir="2700000" algn="tl" rotWithShape="0">
               <a:prstClr val="black">
-                <a:alpha val="40000"/>
+                <a:alpha val="65000"/>
               </a:prstClr>
             </a:outerShdw>
           </a:effectLst>
@@ -3031,12 +3028,35 @@
                   <a:gd name="adj" fmla="val 99524"/>
                 </a:avLst>
               </a:prstGeom>
-              <a:solidFill>
-                <a:srgbClr val="3E82A3"/>
-              </a:solidFill>
+              <a:gradFill flip="none" rotWithShape="1">
+                <a:gsLst>
+                  <a:gs pos="0">
+                    <a:srgbClr val="DEA804">
+                      <a:shade val="30000"/>
+                      <a:satMod val="115000"/>
+                    </a:srgbClr>
+                  </a:gs>
+                  <a:gs pos="50000">
+                    <a:srgbClr val="DEA804">
+                      <a:shade val="67500"/>
+                      <a:satMod val="115000"/>
+                    </a:srgbClr>
+                  </a:gs>
+                  <a:gs pos="100000">
+                    <a:srgbClr val="DEA804">
+                      <a:shade val="100000"/>
+                      <a:satMod val="115000"/>
+                    </a:srgbClr>
+                  </a:gs>
+                </a:gsLst>
+                <a:lin ang="10800000" scaled="1"/>
+                <a:tileRect/>
+              </a:gradFill>
               <a:ln>
                 <a:solidFill>
-                  <a:srgbClr val="0F638C"/>
+                  <a:schemeClr val="accent4">
+                    <a:lumMod val="75000"/>
+                  </a:schemeClr>
                 </a:solidFill>
               </a:ln>
             </p:spPr>
@@ -3095,12 +3115,35 @@
                     <a:gd name="adj" fmla="val 98123"/>
                   </a:avLst>
                 </a:prstGeom>
-                <a:solidFill>
-                  <a:srgbClr val="3E82A3"/>
-                </a:solidFill>
+                <a:gradFill flip="none" rotWithShape="1">
+                  <a:gsLst>
+                    <a:gs pos="0">
+                      <a:srgbClr val="DEA804">
+                        <a:shade val="30000"/>
+                        <a:satMod val="115000"/>
+                      </a:srgbClr>
+                    </a:gs>
+                    <a:gs pos="50000">
+                      <a:srgbClr val="DEA804">
+                        <a:shade val="67500"/>
+                        <a:satMod val="115000"/>
+                      </a:srgbClr>
+                    </a:gs>
+                    <a:gs pos="100000">
+                      <a:srgbClr val="DEA804">
+                        <a:shade val="100000"/>
+                        <a:satMod val="115000"/>
+                      </a:srgbClr>
+                    </a:gs>
+                  </a:gsLst>
+                  <a:lin ang="2700000" scaled="1"/>
+                  <a:tileRect/>
+                </a:gradFill>
                 <a:ln>
                   <a:solidFill>
-                    <a:srgbClr val="0F638C"/>
+                    <a:schemeClr val="accent4">
+                      <a:lumMod val="75000"/>
+                    </a:schemeClr>
                   </a:solidFill>
                 </a:ln>
               </p:spPr>
@@ -3252,12 +3295,35 @@
                   <a:gd name="adj" fmla="val 98123"/>
                 </a:avLst>
               </a:prstGeom>
-              <a:solidFill>
-                <a:srgbClr val="3E82A3"/>
-              </a:solidFill>
+              <a:gradFill flip="none" rotWithShape="1">
+                <a:gsLst>
+                  <a:gs pos="0">
+                    <a:srgbClr val="DEA804">
+                      <a:shade val="30000"/>
+                      <a:satMod val="115000"/>
+                    </a:srgbClr>
+                  </a:gs>
+                  <a:gs pos="50000">
+                    <a:srgbClr val="DEA804">
+                      <a:shade val="67500"/>
+                      <a:satMod val="115000"/>
+                    </a:srgbClr>
+                  </a:gs>
+                  <a:gs pos="100000">
+                    <a:srgbClr val="DEA804">
+                      <a:shade val="100000"/>
+                      <a:satMod val="115000"/>
+                    </a:srgbClr>
+                  </a:gs>
+                </a:gsLst>
+                <a:lin ang="2700000" scaled="1"/>
+                <a:tileRect/>
+              </a:gradFill>
               <a:ln>
                 <a:solidFill>
-                  <a:srgbClr val="0F638C"/>
+                  <a:schemeClr val="accent4">
+                    <a:lumMod val="75000"/>
+                  </a:schemeClr>
                 </a:solidFill>
               </a:ln>
             </p:spPr>
@@ -3408,12 +3474,35 @@
                   <a:gd name="adj" fmla="val 98123"/>
                 </a:avLst>
               </a:prstGeom>
-              <a:solidFill>
-                <a:srgbClr val="3E82A3"/>
-              </a:solidFill>
+              <a:gradFill flip="none" rotWithShape="1">
+                <a:gsLst>
+                  <a:gs pos="0">
+                    <a:srgbClr val="DEA804">
+                      <a:shade val="30000"/>
+                      <a:satMod val="115000"/>
+                    </a:srgbClr>
+                  </a:gs>
+                  <a:gs pos="50000">
+                    <a:srgbClr val="DEA804">
+                      <a:shade val="67500"/>
+                      <a:satMod val="115000"/>
+                    </a:srgbClr>
+                  </a:gs>
+                  <a:gs pos="100000">
+                    <a:srgbClr val="DEA804">
+                      <a:shade val="100000"/>
+                      <a:satMod val="115000"/>
+                    </a:srgbClr>
+                  </a:gs>
+                </a:gsLst>
+                <a:lin ang="2700000" scaled="1"/>
+                <a:tileRect/>
+              </a:gradFill>
               <a:ln>
                 <a:solidFill>
-                  <a:srgbClr val="0F638C"/>
+                  <a:schemeClr val="accent4">
+                    <a:lumMod val="75000"/>
+                  </a:schemeClr>
                 </a:solidFill>
               </a:ln>
             </p:spPr>
@@ -3458,12 +3547,35 @@
                   <a:gd name="adj" fmla="val 98123"/>
                 </a:avLst>
               </a:prstGeom>
-              <a:solidFill>
-                <a:srgbClr val="3E82A3"/>
-              </a:solidFill>
+              <a:gradFill flip="none" rotWithShape="1">
+                <a:gsLst>
+                  <a:gs pos="0">
+                    <a:srgbClr val="DEA804">
+                      <a:shade val="30000"/>
+                      <a:satMod val="115000"/>
+                    </a:srgbClr>
+                  </a:gs>
+                  <a:gs pos="50000">
+                    <a:srgbClr val="DEA804">
+                      <a:shade val="67500"/>
+                      <a:satMod val="115000"/>
+                    </a:srgbClr>
+                  </a:gs>
+                  <a:gs pos="100000">
+                    <a:srgbClr val="DEA804">
+                      <a:shade val="100000"/>
+                      <a:satMod val="115000"/>
+                    </a:srgbClr>
+                  </a:gs>
+                </a:gsLst>
+                <a:lin ang="2700000" scaled="1"/>
+                <a:tileRect/>
+              </a:gradFill>
               <a:ln>
                 <a:solidFill>
-                  <a:srgbClr val="0F638C"/>
+                  <a:schemeClr val="accent4">
+                    <a:lumMod val="75000"/>
+                  </a:schemeClr>
                 </a:solidFill>
               </a:ln>
             </p:spPr>
@@ -3508,12 +3620,35 @@
                   <a:gd name="adj" fmla="val 99524"/>
                 </a:avLst>
               </a:prstGeom>
-              <a:solidFill>
-                <a:srgbClr val="3E82A3"/>
-              </a:solidFill>
+              <a:gradFill flip="none" rotWithShape="1">
+                <a:gsLst>
+                  <a:gs pos="0">
+                    <a:srgbClr val="DEA804">
+                      <a:shade val="30000"/>
+                      <a:satMod val="115000"/>
+                    </a:srgbClr>
+                  </a:gs>
+                  <a:gs pos="50000">
+                    <a:srgbClr val="DEA804">
+                      <a:shade val="67500"/>
+                      <a:satMod val="115000"/>
+                    </a:srgbClr>
+                  </a:gs>
+                  <a:gs pos="100000">
+                    <a:srgbClr val="DEA804">
+                      <a:shade val="100000"/>
+                      <a:satMod val="115000"/>
+                    </a:srgbClr>
+                  </a:gs>
+                </a:gsLst>
+                <a:lin ang="0" scaled="1"/>
+                <a:tileRect/>
+              </a:gradFill>
               <a:ln>
                 <a:solidFill>
-                  <a:srgbClr val="0F638C"/>
+                  <a:schemeClr val="accent4">
+                    <a:lumMod val="75000"/>
+                  </a:schemeClr>
                 </a:solidFill>
               </a:ln>
             </p:spPr>
@@ -3764,6 +3899,2843 @@
                 <a:gd name="adj" fmla="val 98123"/>
               </a:avLst>
             </a:prstGeom>
+            <a:gradFill flip="none" rotWithShape="1">
+              <a:gsLst>
+                <a:gs pos="0">
+                  <a:srgbClr val="DEA804">
+                    <a:shade val="30000"/>
+                    <a:satMod val="115000"/>
+                  </a:srgbClr>
+                </a:gs>
+                <a:gs pos="50000">
+                  <a:srgbClr val="DEA804">
+                    <a:shade val="67500"/>
+                    <a:satMod val="115000"/>
+                  </a:srgbClr>
+                </a:gs>
+                <a:gs pos="100000">
+                  <a:srgbClr val="DEA804">
+                    <a:shade val="100000"/>
+                    <a:satMod val="115000"/>
+                  </a:srgbClr>
+                </a:gs>
+              </a:gsLst>
+              <a:lin ang="2700000" scaled="1"/>
+              <a:tileRect/>
+            </a:gradFill>
+            <a:ln>
+              <a:solidFill>
+                <a:schemeClr val="accent4">
+                  <a:lumMod val="75000"/>
+                </a:schemeClr>
+              </a:solidFill>
+            </a:ln>
+          </p:spPr>
+          <p:style>
+            <a:lnRef idx="2">
+              <a:schemeClr val="accent5">
+                <a:shade val="50000"/>
+              </a:schemeClr>
+            </a:lnRef>
+            <a:fillRef idx="1">
+              <a:schemeClr val="accent5"/>
+            </a:fillRef>
+            <a:effectRef idx="0">
+              <a:schemeClr val="accent5"/>
+            </a:effectRef>
+            <a:fontRef idx="minor">
+              <a:schemeClr val="lt1"/>
+            </a:fontRef>
+          </p:style>
+          <p:txBody>
+            <a:bodyPr rtlCol="0" anchor="ctr"/>
+            <a:lstStyle/>
+            <a:p>
+              <a:pPr algn="ctr"/>
+              <a:endParaRPr lang="fr-FR"/>
+            </a:p>
+          </p:txBody>
+        </p:sp>
+        <p:sp>
+          <p:nvSpPr>
+            <p:cNvPr id="46" name="Parallélogramme 45"/>
+            <p:cNvSpPr/>
+            <p:nvPr/>
+          </p:nvSpPr>
+          <p:spPr>
+            <a:xfrm>
+              <a:off x="2787446" y="358387"/>
+              <a:ext cx="1123104" cy="235717"/>
+            </a:xfrm>
+            <a:prstGeom prst="parallelogram">
+              <a:avLst>
+                <a:gd name="adj" fmla="val 98123"/>
+              </a:avLst>
+            </a:prstGeom>
+            <a:gradFill flip="none" rotWithShape="1">
+              <a:gsLst>
+                <a:gs pos="0">
+                  <a:srgbClr val="DEA804">
+                    <a:shade val="30000"/>
+                    <a:satMod val="115000"/>
+                  </a:srgbClr>
+                </a:gs>
+                <a:gs pos="50000">
+                  <a:srgbClr val="DEA804">
+                    <a:shade val="67500"/>
+                    <a:satMod val="115000"/>
+                  </a:srgbClr>
+                </a:gs>
+                <a:gs pos="100000">
+                  <a:srgbClr val="DEA804">
+                    <a:shade val="100000"/>
+                    <a:satMod val="115000"/>
+                  </a:srgbClr>
+                </a:gs>
+              </a:gsLst>
+              <a:lin ang="2700000" scaled="1"/>
+              <a:tileRect/>
+            </a:gradFill>
+            <a:ln>
+              <a:solidFill>
+                <a:schemeClr val="accent4">
+                  <a:lumMod val="75000"/>
+                </a:schemeClr>
+              </a:solidFill>
+            </a:ln>
+          </p:spPr>
+          <p:style>
+            <a:lnRef idx="2">
+              <a:schemeClr val="accent5">
+                <a:shade val="50000"/>
+              </a:schemeClr>
+            </a:lnRef>
+            <a:fillRef idx="1">
+              <a:schemeClr val="accent5"/>
+            </a:fillRef>
+            <a:effectRef idx="0">
+              <a:schemeClr val="accent5"/>
+            </a:effectRef>
+            <a:fontRef idx="minor">
+              <a:schemeClr val="lt1"/>
+            </a:fontRef>
+          </p:style>
+          <p:txBody>
+            <a:bodyPr rtlCol="0" anchor="ctr"/>
+            <a:lstStyle/>
+            <a:p>
+              <a:pPr algn="ctr"/>
+              <a:endParaRPr lang="fr-FR"/>
+            </a:p>
+          </p:txBody>
+        </p:sp>
+      </p:grpSp>
+      <p:grpSp>
+        <p:nvGrpSpPr>
+          <p:cNvPr id="61" name="Grouper 60"/>
+          <p:cNvGrpSpPr/>
+          <p:nvPr/>
+        </p:nvGrpSpPr>
+        <p:grpSpPr>
+          <a:xfrm>
+            <a:off x="208664" y="324627"/>
+            <a:ext cx="3194354" cy="3235713"/>
+            <a:chOff x="2426046" y="358387"/>
+            <a:chExt cx="3194354" cy="3235713"/>
+          </a:xfrm>
+          <a:effectLst>
+            <a:outerShdw blurRad="50800" dist="38100" dir="2700000" algn="tl" rotWithShape="0">
+              <a:prstClr val="black">
+                <a:alpha val="40000"/>
+              </a:prstClr>
+            </a:outerShdw>
+          </a:effectLst>
+        </p:grpSpPr>
+        <p:grpSp>
+          <p:nvGrpSpPr>
+            <p:cNvPr id="62" name="Grouper 61"/>
+            <p:cNvGrpSpPr/>
+            <p:nvPr/>
+          </p:nvGrpSpPr>
+          <p:grpSpPr>
+            <a:xfrm>
+              <a:off x="2426046" y="366109"/>
+              <a:ext cx="3194354" cy="3227991"/>
+              <a:chOff x="2393646" y="368960"/>
+              <a:chExt cx="5500312" cy="5155839"/>
+            </a:xfrm>
+          </p:grpSpPr>
+          <p:sp>
+            <p:nvSpPr>
+              <p:cNvPr id="65" name="Parallélogramme 64"/>
+              <p:cNvSpPr/>
+              <p:nvPr/>
+            </p:nvSpPr>
+            <p:spPr>
+              <a:xfrm rot="5400000" flipV="1">
+                <a:off x="6682524" y="4313366"/>
+                <a:ext cx="2056975" cy="365892"/>
+              </a:xfrm>
+              <a:prstGeom prst="parallelogram">
+                <a:avLst>
+                  <a:gd name="adj" fmla="val 99524"/>
+                </a:avLst>
+              </a:prstGeom>
+              <a:solidFill>
+                <a:schemeClr val="bg1">
+                  <a:lumMod val="95000"/>
+                </a:schemeClr>
+              </a:solidFill>
+              <a:ln>
+                <a:solidFill>
+                  <a:srgbClr val="262626"/>
+                </a:solidFill>
+              </a:ln>
+            </p:spPr>
+            <p:style>
+              <a:lnRef idx="2">
+                <a:schemeClr val="accent6">
+                  <a:shade val="50000"/>
+                </a:schemeClr>
+              </a:lnRef>
+              <a:fillRef idx="1">
+                <a:schemeClr val="accent6"/>
+              </a:fillRef>
+              <a:effectRef idx="0">
+                <a:schemeClr val="accent6"/>
+              </a:effectRef>
+              <a:fontRef idx="minor">
+                <a:schemeClr val="lt1"/>
+              </a:fontRef>
+            </p:style>
+            <p:txBody>
+              <a:bodyPr rtlCol="0" anchor="ctr"/>
+              <a:lstStyle/>
+              <a:p>
+                <a:pPr algn="ctr"/>
+                <a:endParaRPr lang="fr-FR"/>
+              </a:p>
+            </p:txBody>
+          </p:sp>
+          <p:grpSp>
+            <p:nvGrpSpPr>
+              <p:cNvPr id="66" name="Grouper 65"/>
+              <p:cNvGrpSpPr/>
+              <p:nvPr/>
+            </p:nvGrpSpPr>
+            <p:grpSpPr>
+              <a:xfrm>
+                <a:off x="4597579" y="1438881"/>
+                <a:ext cx="1568358" cy="1515581"/>
+                <a:chOff x="4615681" y="1516114"/>
+                <a:chExt cx="1584358" cy="1515581"/>
+              </a:xfrm>
+            </p:grpSpPr>
+            <p:sp>
+              <p:nvSpPr>
+                <p:cNvPr id="78" name="Parallélogramme 77"/>
+                <p:cNvSpPr/>
+                <p:nvPr/>
+              </p:nvSpPr>
+              <p:spPr>
+                <a:xfrm>
+                  <a:off x="4615681" y="2655201"/>
+                  <a:ext cx="1584358" cy="376494"/>
+                </a:xfrm>
+                <a:prstGeom prst="parallelogram">
+                  <a:avLst>
+                    <a:gd name="adj" fmla="val 98123"/>
+                  </a:avLst>
+                </a:prstGeom>
+                <a:solidFill>
+                  <a:schemeClr val="bg1">
+                    <a:lumMod val="95000"/>
+                  </a:schemeClr>
+                </a:solidFill>
+                <a:ln>
+                  <a:solidFill>
+                    <a:srgbClr val="262626"/>
+                  </a:solidFill>
+                </a:ln>
+              </p:spPr>
+              <p:style>
+                <a:lnRef idx="2">
+                  <a:schemeClr val="accent5">
+                    <a:shade val="50000"/>
+                  </a:schemeClr>
+                </a:lnRef>
+                <a:fillRef idx="1">
+                  <a:schemeClr val="accent5"/>
+                </a:fillRef>
+                <a:effectRef idx="0">
+                  <a:schemeClr val="accent5"/>
+                </a:effectRef>
+                <a:fontRef idx="minor">
+                  <a:schemeClr val="lt1"/>
+                </a:fontRef>
+              </p:style>
+              <p:txBody>
+                <a:bodyPr rtlCol="0" anchor="ctr"/>
+                <a:lstStyle/>
+                <a:p>
+                  <a:pPr algn="ctr"/>
+                  <a:endParaRPr lang="fr-FR"/>
+                </a:p>
+              </p:txBody>
+            </p:sp>
+            <p:sp>
+              <p:nvSpPr>
+                <p:cNvPr id="79" name="Parallélogramme 78"/>
+                <p:cNvSpPr/>
+                <p:nvPr/>
+              </p:nvSpPr>
+              <p:spPr>
+                <a:xfrm rot="5400000" flipV="1">
+                  <a:off x="5264332" y="2079335"/>
+                  <a:ext cx="1498928" cy="372486"/>
+                </a:xfrm>
+                <a:prstGeom prst="parallelogram">
+                  <a:avLst>
+                    <a:gd name="adj" fmla="val 99524"/>
+                  </a:avLst>
+                </a:prstGeom>
+                <a:solidFill>
+                  <a:srgbClr val="262626"/>
+                </a:solidFill>
+                <a:ln>
+                  <a:solidFill>
+                    <a:schemeClr val="tx1">
+                      <a:lumMod val="95000"/>
+                      <a:lumOff val="5000"/>
+                    </a:schemeClr>
+                  </a:solidFill>
+                </a:ln>
+              </p:spPr>
+              <p:style>
+                <a:lnRef idx="2">
+                  <a:schemeClr val="accent6">
+                    <a:shade val="50000"/>
+                  </a:schemeClr>
+                </a:lnRef>
+                <a:fillRef idx="1">
+                  <a:schemeClr val="accent6"/>
+                </a:fillRef>
+                <a:effectRef idx="0">
+                  <a:schemeClr val="accent6"/>
+                </a:effectRef>
+                <a:fontRef idx="minor">
+                  <a:schemeClr val="lt1"/>
+                </a:fontRef>
+              </p:style>
+              <p:txBody>
+                <a:bodyPr rtlCol="0" anchor="ctr"/>
+                <a:lstStyle/>
+                <a:p>
+                  <a:pPr algn="ctr"/>
+                  <a:endParaRPr lang="fr-FR"/>
+                </a:p>
+              </p:txBody>
+            </p:sp>
+          </p:grpSp>
+          <p:sp>
+            <p:nvSpPr>
+              <p:cNvPr id="67" name="Parallélogramme 66"/>
+              <p:cNvSpPr/>
+              <p:nvPr/>
+            </p:nvSpPr>
+            <p:spPr>
+              <a:xfrm rot="5400000" flipV="1">
+                <a:off x="4047131" y="888043"/>
+                <a:ext cx="1421744" cy="383578"/>
+              </a:xfrm>
+              <a:prstGeom prst="parallelogram">
+                <a:avLst>
+                  <a:gd name="adj" fmla="val 99524"/>
+                </a:avLst>
+              </a:prstGeom>
+              <a:solidFill>
+                <a:srgbClr val="262626"/>
+              </a:solidFill>
+              <a:ln>
+                <a:solidFill>
+                  <a:schemeClr val="tx1">
+                    <a:lumMod val="95000"/>
+                    <a:lumOff val="5000"/>
+                  </a:schemeClr>
+                </a:solidFill>
+              </a:ln>
+            </p:spPr>
+            <p:style>
+              <a:lnRef idx="2">
+                <a:schemeClr val="accent3">
+                  <a:shade val="50000"/>
+                </a:schemeClr>
+              </a:lnRef>
+              <a:fillRef idx="1">
+                <a:schemeClr val="accent3"/>
+              </a:fillRef>
+              <a:effectRef idx="0">
+                <a:schemeClr val="accent3"/>
+              </a:effectRef>
+              <a:fontRef idx="minor">
+                <a:schemeClr val="lt1"/>
+              </a:fontRef>
+            </p:style>
+            <p:txBody>
+              <a:bodyPr rtlCol="0" anchor="ctr"/>
+              <a:lstStyle/>
+              <a:p>
+                <a:pPr algn="ctr"/>
+                <a:endParaRPr lang="fr-FR"/>
+              </a:p>
+            </p:txBody>
+          </p:sp>
+          <p:sp>
+            <p:nvSpPr>
+              <p:cNvPr id="68" name="Parallélogramme 67"/>
+              <p:cNvSpPr/>
+              <p:nvPr/>
+            </p:nvSpPr>
+            <p:spPr>
+              <a:xfrm>
+                <a:off x="2393646" y="2337877"/>
+                <a:ext cx="1584039" cy="376494"/>
+              </a:xfrm>
+              <a:prstGeom prst="parallelogram">
+                <a:avLst>
+                  <a:gd name="adj" fmla="val 98123"/>
+                </a:avLst>
+              </a:prstGeom>
+              <a:solidFill>
+                <a:schemeClr val="bg1">
+                  <a:lumMod val="95000"/>
+                </a:schemeClr>
+              </a:solidFill>
+              <a:ln>
+                <a:solidFill>
+                  <a:srgbClr val="262626"/>
+                </a:solidFill>
+              </a:ln>
+            </p:spPr>
+            <p:style>
+              <a:lnRef idx="2">
+                <a:schemeClr val="accent5">
+                  <a:shade val="50000"/>
+                </a:schemeClr>
+              </a:lnRef>
+              <a:fillRef idx="1">
+                <a:schemeClr val="accent5"/>
+              </a:fillRef>
+              <a:effectRef idx="0">
+                <a:schemeClr val="accent5"/>
+              </a:effectRef>
+              <a:fontRef idx="minor">
+                <a:schemeClr val="lt1"/>
+              </a:fontRef>
+            </p:style>
+            <p:txBody>
+              <a:bodyPr rtlCol="0" anchor="ctr"/>
+              <a:lstStyle/>
+              <a:p>
+                <a:pPr algn="ctr"/>
+                <a:endParaRPr lang="fr-FR"/>
+              </a:p>
+            </p:txBody>
+          </p:sp>
+          <p:sp>
+            <p:nvSpPr>
+              <p:cNvPr id="69" name="Parallélogramme 68"/>
+              <p:cNvSpPr/>
+              <p:nvPr/>
+            </p:nvSpPr>
+            <p:spPr>
+              <a:xfrm rot="5400000" flipV="1">
+                <a:off x="3055416" y="2904792"/>
+                <a:ext cx="1485900" cy="365892"/>
+              </a:xfrm>
+              <a:prstGeom prst="parallelogram">
+                <a:avLst>
+                  <a:gd name="adj" fmla="val 102916"/>
+                </a:avLst>
+              </a:prstGeom>
+              <a:solidFill>
+                <a:srgbClr val="262626"/>
+              </a:solidFill>
+              <a:ln>
+                <a:solidFill>
+                  <a:schemeClr val="tx1">
+                    <a:lumMod val="95000"/>
+                    <a:lumOff val="5000"/>
+                  </a:schemeClr>
+                </a:solidFill>
+              </a:ln>
+            </p:spPr>
+            <p:style>
+              <a:lnRef idx="2">
+                <a:schemeClr val="accent6">
+                  <a:shade val="50000"/>
+                </a:schemeClr>
+              </a:lnRef>
+              <a:fillRef idx="1">
+                <a:schemeClr val="accent6"/>
+              </a:fillRef>
+              <a:effectRef idx="0">
+                <a:schemeClr val="accent6"/>
+              </a:effectRef>
+              <a:fontRef idx="minor">
+                <a:schemeClr val="lt1"/>
+              </a:fontRef>
+            </p:style>
+            <p:txBody>
+              <a:bodyPr rtlCol="0" anchor="ctr"/>
+              <a:lstStyle/>
+              <a:p>
+                <a:pPr algn="ctr"/>
+                <a:endParaRPr lang="fr-FR"/>
+              </a:p>
+            </p:txBody>
+          </p:sp>
+          <p:sp>
+            <p:nvSpPr>
+              <p:cNvPr id="70" name="Parallélogramme 69"/>
+              <p:cNvSpPr/>
+              <p:nvPr/>
+            </p:nvSpPr>
+            <p:spPr>
+              <a:xfrm rot="5400000" flipV="1">
+                <a:off x="1838403" y="1771678"/>
+                <a:ext cx="1485900" cy="365892"/>
+              </a:xfrm>
+              <a:prstGeom prst="parallelogram">
+                <a:avLst>
+                  <a:gd name="adj" fmla="val 99524"/>
+                </a:avLst>
+              </a:prstGeom>
+              <a:solidFill>
+                <a:srgbClr val="262626"/>
+              </a:solidFill>
+              <a:ln>
+                <a:solidFill>
+                  <a:schemeClr val="tx1">
+                    <a:lumMod val="95000"/>
+                    <a:lumOff val="5000"/>
+                  </a:schemeClr>
+                </a:solidFill>
+              </a:ln>
+            </p:spPr>
+            <p:style>
+              <a:lnRef idx="2">
+                <a:schemeClr val="accent6">
+                  <a:shade val="50000"/>
+                </a:schemeClr>
+              </a:lnRef>
+              <a:fillRef idx="1">
+                <a:schemeClr val="accent6"/>
+              </a:fillRef>
+              <a:effectRef idx="0">
+                <a:schemeClr val="accent6"/>
+              </a:effectRef>
+              <a:fontRef idx="minor">
+                <a:schemeClr val="lt1"/>
+              </a:fontRef>
+            </p:style>
+            <p:txBody>
+              <a:bodyPr rtlCol="0" anchor="ctr"/>
+              <a:lstStyle/>
+              <a:p>
+                <a:pPr algn="ctr"/>
+                <a:endParaRPr lang="fr-FR"/>
+              </a:p>
+            </p:txBody>
+          </p:sp>
+          <p:sp>
+            <p:nvSpPr>
+              <p:cNvPr id="71" name="Parallélogramme 70"/>
+              <p:cNvSpPr/>
+              <p:nvPr/>
+            </p:nvSpPr>
+            <p:spPr>
+              <a:xfrm>
+                <a:off x="2409229" y="1165803"/>
+                <a:ext cx="1584038" cy="376494"/>
+              </a:xfrm>
+              <a:prstGeom prst="parallelogram">
+                <a:avLst>
+                  <a:gd name="adj" fmla="val 98123"/>
+                </a:avLst>
+              </a:prstGeom>
+              <a:solidFill>
+                <a:schemeClr val="bg1">
+                  <a:lumMod val="95000"/>
+                </a:schemeClr>
+              </a:solidFill>
+              <a:ln>
+                <a:solidFill>
+                  <a:srgbClr val="262626"/>
+                </a:solidFill>
+              </a:ln>
+            </p:spPr>
+            <p:style>
+              <a:lnRef idx="2">
+                <a:schemeClr val="accent5">
+                  <a:shade val="50000"/>
+                </a:schemeClr>
+              </a:lnRef>
+              <a:fillRef idx="1">
+                <a:schemeClr val="accent5"/>
+              </a:fillRef>
+              <a:effectRef idx="0">
+                <a:schemeClr val="accent5"/>
+              </a:effectRef>
+              <a:fontRef idx="minor">
+                <a:schemeClr val="lt1"/>
+              </a:fontRef>
+            </p:style>
+            <p:txBody>
+              <a:bodyPr rtlCol="0" anchor="ctr"/>
+              <a:lstStyle/>
+              <a:p>
+                <a:pPr algn="ctr"/>
+                <a:endParaRPr lang="fr-FR"/>
+              </a:p>
+            </p:txBody>
+          </p:sp>
+          <p:sp>
+            <p:nvSpPr>
+              <p:cNvPr id="72" name="Parallélogramme 71"/>
+              <p:cNvSpPr/>
+              <p:nvPr/>
+            </p:nvSpPr>
+            <p:spPr>
+              <a:xfrm>
+                <a:off x="3615420" y="3467824"/>
+                <a:ext cx="4269036" cy="376494"/>
+              </a:xfrm>
+              <a:prstGeom prst="parallelogram">
+                <a:avLst>
+                  <a:gd name="adj" fmla="val 98123"/>
+                </a:avLst>
+              </a:prstGeom>
+              <a:solidFill>
+                <a:schemeClr val="bg1">
+                  <a:lumMod val="95000"/>
+                </a:schemeClr>
+              </a:solidFill>
+              <a:ln>
+                <a:solidFill>
+                  <a:srgbClr val="262626"/>
+                </a:solidFill>
+              </a:ln>
+            </p:spPr>
+            <p:style>
+              <a:lnRef idx="2">
+                <a:schemeClr val="accent5">
+                  <a:shade val="50000"/>
+                </a:schemeClr>
+              </a:lnRef>
+              <a:fillRef idx="1">
+                <a:schemeClr val="accent5"/>
+              </a:fillRef>
+              <a:effectRef idx="0">
+                <a:schemeClr val="accent5"/>
+              </a:effectRef>
+              <a:fontRef idx="minor">
+                <a:schemeClr val="lt1"/>
+              </a:fontRef>
+            </p:style>
+            <p:txBody>
+              <a:bodyPr rtlCol="0" anchor="ctr"/>
+              <a:lstStyle/>
+              <a:p>
+                <a:pPr algn="ctr"/>
+                <a:endParaRPr lang="fr-FR"/>
+              </a:p>
+            </p:txBody>
+          </p:sp>
+          <p:sp>
+            <p:nvSpPr>
+              <p:cNvPr id="73" name="Parallélogramme 72"/>
+              <p:cNvSpPr/>
+              <p:nvPr/>
+            </p:nvSpPr>
+            <p:spPr>
+              <a:xfrm rot="5400000" flipV="1">
+                <a:off x="6508292" y="2452140"/>
+                <a:ext cx="2405437" cy="365892"/>
+              </a:xfrm>
+              <a:prstGeom prst="parallelogram">
+                <a:avLst>
+                  <a:gd name="adj" fmla="val 99524"/>
+                </a:avLst>
+              </a:prstGeom>
+              <a:solidFill>
+                <a:schemeClr val="bg1">
+                  <a:lumMod val="95000"/>
+                </a:schemeClr>
+              </a:solidFill>
+              <a:ln>
+                <a:solidFill>
+                  <a:srgbClr val="262626"/>
+                </a:solidFill>
+              </a:ln>
+            </p:spPr>
+            <p:style>
+              <a:lnRef idx="2">
+                <a:schemeClr val="accent6">
+                  <a:shade val="50000"/>
+                </a:schemeClr>
+              </a:lnRef>
+              <a:fillRef idx="1">
+                <a:schemeClr val="accent6"/>
+              </a:fillRef>
+              <a:effectRef idx="0">
+                <a:schemeClr val="accent6"/>
+              </a:effectRef>
+              <a:fontRef idx="minor">
+                <a:schemeClr val="lt1"/>
+              </a:fontRef>
+            </p:style>
+            <p:txBody>
+              <a:bodyPr rtlCol="0" anchor="ctr"/>
+              <a:lstStyle/>
+              <a:p>
+                <a:pPr algn="ctr"/>
+                <a:endParaRPr lang="fr-FR"/>
+              </a:p>
+            </p:txBody>
+          </p:sp>
+          <p:sp>
+            <p:nvSpPr>
+              <p:cNvPr id="74" name="Parallélogramme 73"/>
+              <p:cNvSpPr/>
+              <p:nvPr/>
+            </p:nvSpPr>
+            <p:spPr>
+              <a:xfrm rot="5400000" flipV="1">
+                <a:off x="6361649" y="2590107"/>
+                <a:ext cx="1125629" cy="365892"/>
+              </a:xfrm>
+              <a:prstGeom prst="parallelogram">
+                <a:avLst>
+                  <a:gd name="adj" fmla="val 99524"/>
+                </a:avLst>
+              </a:prstGeom>
+              <a:solidFill>
+                <a:srgbClr val="262626"/>
+              </a:solidFill>
+              <a:ln>
+                <a:solidFill>
+                  <a:schemeClr val="tx1">
+                    <a:lumMod val="95000"/>
+                    <a:lumOff val="5000"/>
+                  </a:schemeClr>
+                </a:solidFill>
+              </a:ln>
+            </p:spPr>
+            <p:style>
+              <a:lnRef idx="2">
+                <a:schemeClr val="accent6">
+                  <a:shade val="50000"/>
+                </a:schemeClr>
+              </a:lnRef>
+              <a:fillRef idx="1">
+                <a:schemeClr val="accent6"/>
+              </a:fillRef>
+              <a:effectRef idx="0">
+                <a:schemeClr val="accent6"/>
+              </a:effectRef>
+              <a:fontRef idx="minor">
+                <a:schemeClr val="lt1"/>
+              </a:fontRef>
+            </p:style>
+            <p:txBody>
+              <a:bodyPr rtlCol="0" anchor="ctr"/>
+              <a:lstStyle/>
+              <a:p>
+                <a:pPr algn="ctr"/>
+                <a:endParaRPr lang="fr-FR"/>
+              </a:p>
+            </p:txBody>
+          </p:sp>
+          <p:sp>
+            <p:nvSpPr>
+              <p:cNvPr id="75" name="Parallélogramme 74"/>
+              <p:cNvSpPr/>
+              <p:nvPr/>
+            </p:nvSpPr>
+            <p:spPr>
+              <a:xfrm rot="5400000" flipV="1">
+                <a:off x="6310632" y="4350956"/>
+                <a:ext cx="1227663" cy="365892"/>
+              </a:xfrm>
+              <a:prstGeom prst="parallelogram">
+                <a:avLst>
+                  <a:gd name="adj" fmla="val 0"/>
+                </a:avLst>
+              </a:prstGeom>
+              <a:solidFill>
+                <a:srgbClr val="262626"/>
+              </a:solidFill>
+              <a:ln>
+                <a:solidFill>
+                  <a:schemeClr val="tx1">
+                    <a:lumMod val="95000"/>
+                    <a:lumOff val="5000"/>
+                  </a:schemeClr>
+                </a:solidFill>
+              </a:ln>
+            </p:spPr>
+            <p:style>
+              <a:lnRef idx="2">
+                <a:schemeClr val="accent6">
+                  <a:shade val="50000"/>
+                </a:schemeClr>
+              </a:lnRef>
+              <a:fillRef idx="1">
+                <a:schemeClr val="accent6"/>
+              </a:fillRef>
+              <a:effectRef idx="0">
+                <a:schemeClr val="accent6"/>
+              </a:effectRef>
+              <a:fontRef idx="minor">
+                <a:schemeClr val="lt1"/>
+              </a:fontRef>
+            </p:style>
+            <p:txBody>
+              <a:bodyPr rtlCol="0" anchor="ctr"/>
+              <a:lstStyle/>
+              <a:p>
+                <a:pPr algn="ctr"/>
+                <a:endParaRPr lang="fr-FR"/>
+              </a:p>
+            </p:txBody>
+          </p:sp>
+          <p:sp>
+            <p:nvSpPr>
+              <p:cNvPr id="76" name="Parallélogramme 75"/>
+              <p:cNvSpPr/>
+              <p:nvPr/>
+            </p:nvSpPr>
+            <p:spPr>
+              <a:xfrm rot="5400000" flipV="1">
+                <a:off x="6532677" y="2825696"/>
+                <a:ext cx="783574" cy="365892"/>
+              </a:xfrm>
+              <a:prstGeom prst="parallelogram">
+                <a:avLst>
+                  <a:gd name="adj" fmla="val 0"/>
+                </a:avLst>
+              </a:prstGeom>
+              <a:solidFill>
+                <a:srgbClr val="262626"/>
+              </a:solidFill>
+              <a:ln>
+                <a:solidFill>
+                  <a:schemeClr val="tx1">
+                    <a:lumMod val="95000"/>
+                    <a:lumOff val="5000"/>
+                  </a:schemeClr>
+                </a:solidFill>
+              </a:ln>
+            </p:spPr>
+            <p:style>
+              <a:lnRef idx="2">
+                <a:schemeClr val="accent6">
+                  <a:shade val="50000"/>
+                </a:schemeClr>
+              </a:lnRef>
+              <a:fillRef idx="1">
+                <a:schemeClr val="accent6"/>
+              </a:fillRef>
+              <a:effectRef idx="0">
+                <a:schemeClr val="accent6"/>
+              </a:effectRef>
+              <a:fontRef idx="minor">
+                <a:schemeClr val="lt1"/>
+              </a:fontRef>
+            </p:style>
+            <p:txBody>
+              <a:bodyPr rtlCol="0" anchor="ctr"/>
+              <a:lstStyle/>
+              <a:p>
+                <a:pPr algn="ctr"/>
+                <a:endParaRPr lang="fr-FR"/>
+              </a:p>
+            </p:txBody>
+          </p:sp>
+          <p:sp>
+            <p:nvSpPr>
+              <p:cNvPr id="77" name="Rectangle 76"/>
+              <p:cNvSpPr/>
+              <p:nvPr/>
+            </p:nvSpPr>
+            <p:spPr>
+              <a:xfrm>
+                <a:off x="6741516" y="2598682"/>
+                <a:ext cx="365893" cy="169918"/>
+              </a:xfrm>
+              <a:prstGeom prst="rect">
+                <a:avLst/>
+              </a:prstGeom>
+              <a:solidFill>
+                <a:srgbClr val="262626"/>
+              </a:solidFill>
+              <a:ln>
+                <a:noFill/>
+              </a:ln>
+            </p:spPr>
+            <p:style>
+              <a:lnRef idx="2">
+                <a:schemeClr val="accent1">
+                  <a:shade val="50000"/>
+                </a:schemeClr>
+              </a:lnRef>
+              <a:fillRef idx="1">
+                <a:schemeClr val="accent1"/>
+              </a:fillRef>
+              <a:effectRef idx="0">
+                <a:schemeClr val="accent1"/>
+              </a:effectRef>
+              <a:fontRef idx="minor">
+                <a:schemeClr val="lt1"/>
+              </a:fontRef>
+            </p:style>
+            <p:txBody>
+              <a:bodyPr rtlCol="0" anchor="ctr"/>
+              <a:lstStyle/>
+              <a:p>
+                <a:pPr algn="ctr"/>
+                <a:endParaRPr lang="fr-FR"/>
+              </a:p>
+            </p:txBody>
+          </p:sp>
+        </p:grpSp>
+        <p:sp>
+          <p:nvSpPr>
+            <p:cNvPr id="63" name="Parallélogramme 62"/>
+            <p:cNvSpPr/>
+            <p:nvPr/>
+          </p:nvSpPr>
+          <p:spPr>
+            <a:xfrm>
+              <a:off x="3694935" y="1025737"/>
+              <a:ext cx="921902" cy="235717"/>
+            </a:xfrm>
+            <a:prstGeom prst="parallelogram">
+              <a:avLst>
+                <a:gd name="adj" fmla="val 98123"/>
+              </a:avLst>
+            </a:prstGeom>
+            <a:solidFill>
+              <a:schemeClr val="bg1">
+                <a:lumMod val="95000"/>
+              </a:schemeClr>
+            </a:solidFill>
+            <a:ln>
+              <a:solidFill>
+                <a:srgbClr val="262626"/>
+              </a:solidFill>
+            </a:ln>
+          </p:spPr>
+          <p:style>
+            <a:lnRef idx="2">
+              <a:schemeClr val="accent5">
+                <a:shade val="50000"/>
+              </a:schemeClr>
+            </a:lnRef>
+            <a:fillRef idx="1">
+              <a:schemeClr val="accent5"/>
+            </a:fillRef>
+            <a:effectRef idx="0">
+              <a:schemeClr val="accent5"/>
+            </a:effectRef>
+            <a:fontRef idx="minor">
+              <a:schemeClr val="lt1"/>
+            </a:fontRef>
+          </p:style>
+          <p:txBody>
+            <a:bodyPr rtlCol="0" anchor="ctr"/>
+            <a:lstStyle/>
+            <a:p>
+              <a:pPr algn="ctr"/>
+              <a:endParaRPr lang="fr-FR"/>
+            </a:p>
+          </p:txBody>
+        </p:sp>
+        <p:sp>
+          <p:nvSpPr>
+            <p:cNvPr id="64" name="Parallélogramme 63"/>
+            <p:cNvSpPr/>
+            <p:nvPr/>
+          </p:nvSpPr>
+          <p:spPr>
+            <a:xfrm>
+              <a:off x="2787446" y="358387"/>
+              <a:ext cx="1123104" cy="235717"/>
+            </a:xfrm>
+            <a:prstGeom prst="parallelogram">
+              <a:avLst>
+                <a:gd name="adj" fmla="val 98123"/>
+              </a:avLst>
+            </a:prstGeom>
+            <a:solidFill>
+              <a:schemeClr val="bg1">
+                <a:lumMod val="95000"/>
+              </a:schemeClr>
+            </a:solidFill>
+            <a:ln>
+              <a:solidFill>
+                <a:srgbClr val="262626"/>
+              </a:solidFill>
+            </a:ln>
+          </p:spPr>
+          <p:style>
+            <a:lnRef idx="2">
+              <a:schemeClr val="accent5">
+                <a:shade val="50000"/>
+              </a:schemeClr>
+            </a:lnRef>
+            <a:fillRef idx="1">
+              <a:schemeClr val="accent5"/>
+            </a:fillRef>
+            <a:effectRef idx="0">
+              <a:schemeClr val="accent5"/>
+            </a:effectRef>
+            <a:fontRef idx="minor">
+              <a:schemeClr val="lt1"/>
+            </a:fontRef>
+          </p:style>
+          <p:txBody>
+            <a:bodyPr rtlCol="0" anchor="ctr"/>
+            <a:lstStyle/>
+            <a:p>
+              <a:pPr algn="ctr"/>
+              <a:endParaRPr lang="fr-FR"/>
+            </a:p>
+          </p:txBody>
+        </p:sp>
+      </p:grpSp>
+      <p:grpSp>
+        <p:nvGrpSpPr>
+          <p:cNvPr id="80" name="Grouper 79"/>
+          <p:cNvGrpSpPr/>
+          <p:nvPr/>
+        </p:nvGrpSpPr>
+        <p:grpSpPr>
+          <a:xfrm>
+            <a:off x="164184" y="3550018"/>
+            <a:ext cx="3194354" cy="3235713"/>
+            <a:chOff x="2426046" y="358387"/>
+            <a:chExt cx="3194354" cy="3235713"/>
+          </a:xfrm>
+          <a:effectLst>
+            <a:outerShdw blurRad="50800" dist="38100" dir="2700000" algn="tl" rotWithShape="0">
+              <a:prstClr val="black">
+                <a:alpha val="40000"/>
+              </a:prstClr>
+            </a:outerShdw>
+          </a:effectLst>
+        </p:grpSpPr>
+        <p:grpSp>
+          <p:nvGrpSpPr>
+            <p:cNvPr id="81" name="Grouper 80"/>
+            <p:cNvGrpSpPr/>
+            <p:nvPr/>
+          </p:nvGrpSpPr>
+          <p:grpSpPr>
+            <a:xfrm>
+              <a:off x="2426046" y="366109"/>
+              <a:ext cx="3194354" cy="3227991"/>
+              <a:chOff x="2393646" y="368960"/>
+              <a:chExt cx="5500312" cy="5155839"/>
+            </a:xfrm>
+          </p:grpSpPr>
+          <p:sp>
+            <p:nvSpPr>
+              <p:cNvPr id="84" name="Parallélogramme 83"/>
+              <p:cNvSpPr/>
+              <p:nvPr/>
+            </p:nvSpPr>
+            <p:spPr>
+              <a:xfrm rot="5400000" flipV="1">
+                <a:off x="6682524" y="4313366"/>
+                <a:ext cx="2056975" cy="365892"/>
+              </a:xfrm>
+              <a:prstGeom prst="parallelogram">
+                <a:avLst>
+                  <a:gd name="adj" fmla="val 99524"/>
+                </a:avLst>
+              </a:prstGeom>
+              <a:gradFill flip="none" rotWithShape="1">
+                <a:gsLst>
+                  <a:gs pos="0">
+                    <a:srgbClr val="7C0202">
+                      <a:shade val="30000"/>
+                      <a:satMod val="115000"/>
+                    </a:srgbClr>
+                  </a:gs>
+                  <a:gs pos="50000">
+                    <a:srgbClr val="7C0202">
+                      <a:shade val="67500"/>
+                      <a:satMod val="115000"/>
+                    </a:srgbClr>
+                  </a:gs>
+                  <a:gs pos="100000">
+                    <a:srgbClr val="7C0202">
+                      <a:shade val="100000"/>
+                      <a:satMod val="115000"/>
+                    </a:srgbClr>
+                  </a:gs>
+                </a:gsLst>
+                <a:lin ang="13500000" scaled="1"/>
+                <a:tileRect/>
+              </a:gradFill>
+              <a:ln>
+                <a:solidFill>
+                  <a:srgbClr val="262626"/>
+                </a:solidFill>
+              </a:ln>
+            </p:spPr>
+            <p:style>
+              <a:lnRef idx="2">
+                <a:schemeClr val="accent6">
+                  <a:shade val="50000"/>
+                </a:schemeClr>
+              </a:lnRef>
+              <a:fillRef idx="1">
+                <a:schemeClr val="accent6"/>
+              </a:fillRef>
+              <a:effectRef idx="0">
+                <a:schemeClr val="accent6"/>
+              </a:effectRef>
+              <a:fontRef idx="minor">
+                <a:schemeClr val="lt1"/>
+              </a:fontRef>
+            </p:style>
+            <p:txBody>
+              <a:bodyPr rtlCol="0" anchor="ctr"/>
+              <a:lstStyle/>
+              <a:p>
+                <a:pPr algn="ctr"/>
+                <a:endParaRPr lang="fr-FR"/>
+              </a:p>
+            </p:txBody>
+          </p:sp>
+          <p:grpSp>
+            <p:nvGrpSpPr>
+              <p:cNvPr id="85" name="Grouper 84"/>
+              <p:cNvGrpSpPr/>
+              <p:nvPr/>
+            </p:nvGrpSpPr>
+            <p:grpSpPr>
+              <a:xfrm>
+                <a:off x="4597579" y="1438881"/>
+                <a:ext cx="1568358" cy="1515581"/>
+                <a:chOff x="4615681" y="1516114"/>
+                <a:chExt cx="1584358" cy="1515581"/>
+              </a:xfrm>
+            </p:grpSpPr>
+            <p:sp>
+              <p:nvSpPr>
+                <p:cNvPr id="97" name="Parallélogramme 96"/>
+                <p:cNvSpPr/>
+                <p:nvPr/>
+              </p:nvSpPr>
+              <p:spPr>
+                <a:xfrm>
+                  <a:off x="4615681" y="2655201"/>
+                  <a:ext cx="1584358" cy="376494"/>
+                </a:xfrm>
+                <a:prstGeom prst="parallelogram">
+                  <a:avLst>
+                    <a:gd name="adj" fmla="val 98123"/>
+                  </a:avLst>
+                </a:prstGeom>
+                <a:gradFill flip="none" rotWithShape="1">
+                  <a:gsLst>
+                    <a:gs pos="0">
+                      <a:srgbClr val="7C0202">
+                        <a:shade val="30000"/>
+                        <a:satMod val="115000"/>
+                      </a:srgbClr>
+                    </a:gs>
+                    <a:gs pos="50000">
+                      <a:srgbClr val="7C0202">
+                        <a:shade val="67500"/>
+                        <a:satMod val="115000"/>
+                      </a:srgbClr>
+                    </a:gs>
+                    <a:gs pos="100000">
+                      <a:srgbClr val="7C0202">
+                        <a:shade val="100000"/>
+                        <a:satMod val="115000"/>
+                      </a:srgbClr>
+                    </a:gs>
+                  </a:gsLst>
+                  <a:lin ang="2700000" scaled="1"/>
+                  <a:tileRect/>
+                </a:gradFill>
+                <a:ln>
+                  <a:solidFill>
+                    <a:srgbClr val="262626"/>
+                  </a:solidFill>
+                </a:ln>
+              </p:spPr>
+              <p:style>
+                <a:lnRef idx="2">
+                  <a:schemeClr val="accent5">
+                    <a:shade val="50000"/>
+                  </a:schemeClr>
+                </a:lnRef>
+                <a:fillRef idx="1">
+                  <a:schemeClr val="accent5"/>
+                </a:fillRef>
+                <a:effectRef idx="0">
+                  <a:schemeClr val="accent5"/>
+                </a:effectRef>
+                <a:fontRef idx="minor">
+                  <a:schemeClr val="lt1"/>
+                </a:fontRef>
+              </p:style>
+              <p:txBody>
+                <a:bodyPr rtlCol="0" anchor="ctr"/>
+                <a:lstStyle/>
+                <a:p>
+                  <a:pPr algn="ctr"/>
+                  <a:endParaRPr lang="fr-FR"/>
+                </a:p>
+              </p:txBody>
+            </p:sp>
+            <p:sp>
+              <p:nvSpPr>
+                <p:cNvPr id="98" name="Parallélogramme 97"/>
+                <p:cNvSpPr/>
+                <p:nvPr/>
+              </p:nvSpPr>
+              <p:spPr>
+                <a:xfrm rot="5400000" flipV="1">
+                  <a:off x="5264332" y="2079335"/>
+                  <a:ext cx="1498928" cy="372486"/>
+                </a:xfrm>
+                <a:prstGeom prst="parallelogram">
+                  <a:avLst>
+                    <a:gd name="adj" fmla="val 99524"/>
+                  </a:avLst>
+                </a:prstGeom>
+                <a:solidFill>
+                  <a:srgbClr val="262626"/>
+                </a:solidFill>
+                <a:ln>
+                  <a:solidFill>
+                    <a:schemeClr val="tx1">
+                      <a:lumMod val="95000"/>
+                      <a:lumOff val="5000"/>
+                    </a:schemeClr>
+                  </a:solidFill>
+                </a:ln>
+              </p:spPr>
+              <p:style>
+                <a:lnRef idx="2">
+                  <a:schemeClr val="accent6">
+                    <a:shade val="50000"/>
+                  </a:schemeClr>
+                </a:lnRef>
+                <a:fillRef idx="1">
+                  <a:schemeClr val="accent6"/>
+                </a:fillRef>
+                <a:effectRef idx="0">
+                  <a:schemeClr val="accent6"/>
+                </a:effectRef>
+                <a:fontRef idx="minor">
+                  <a:schemeClr val="lt1"/>
+                </a:fontRef>
+              </p:style>
+              <p:txBody>
+                <a:bodyPr rtlCol="0" anchor="ctr"/>
+                <a:lstStyle/>
+                <a:p>
+                  <a:pPr algn="ctr"/>
+                  <a:endParaRPr lang="fr-FR"/>
+                </a:p>
+              </p:txBody>
+            </p:sp>
+          </p:grpSp>
+          <p:sp>
+            <p:nvSpPr>
+              <p:cNvPr id="86" name="Parallélogramme 85"/>
+              <p:cNvSpPr/>
+              <p:nvPr/>
+            </p:nvSpPr>
+            <p:spPr>
+              <a:xfrm rot="5400000" flipV="1">
+                <a:off x="4047131" y="888043"/>
+                <a:ext cx="1421744" cy="383578"/>
+              </a:xfrm>
+              <a:prstGeom prst="parallelogram">
+                <a:avLst>
+                  <a:gd name="adj" fmla="val 99524"/>
+                </a:avLst>
+              </a:prstGeom>
+              <a:solidFill>
+                <a:srgbClr val="262626"/>
+              </a:solidFill>
+              <a:ln>
+                <a:solidFill>
+                  <a:schemeClr val="tx1">
+                    <a:lumMod val="95000"/>
+                    <a:lumOff val="5000"/>
+                  </a:schemeClr>
+                </a:solidFill>
+              </a:ln>
+            </p:spPr>
+            <p:style>
+              <a:lnRef idx="2">
+                <a:schemeClr val="accent3">
+                  <a:shade val="50000"/>
+                </a:schemeClr>
+              </a:lnRef>
+              <a:fillRef idx="1">
+                <a:schemeClr val="accent3"/>
+              </a:fillRef>
+              <a:effectRef idx="0">
+                <a:schemeClr val="accent3"/>
+              </a:effectRef>
+              <a:fontRef idx="minor">
+                <a:schemeClr val="lt1"/>
+              </a:fontRef>
+            </p:style>
+            <p:txBody>
+              <a:bodyPr rtlCol="0" anchor="ctr"/>
+              <a:lstStyle/>
+              <a:p>
+                <a:pPr algn="ctr"/>
+                <a:endParaRPr lang="fr-FR"/>
+              </a:p>
+            </p:txBody>
+          </p:sp>
+          <p:sp>
+            <p:nvSpPr>
+              <p:cNvPr id="87" name="Parallélogramme 86"/>
+              <p:cNvSpPr/>
+              <p:nvPr/>
+            </p:nvSpPr>
+            <p:spPr>
+              <a:xfrm>
+                <a:off x="2393646" y="2337877"/>
+                <a:ext cx="1584039" cy="376494"/>
+              </a:xfrm>
+              <a:prstGeom prst="parallelogram">
+                <a:avLst>
+                  <a:gd name="adj" fmla="val 98123"/>
+                </a:avLst>
+              </a:prstGeom>
+              <a:gradFill flip="none" rotWithShape="1">
+                <a:gsLst>
+                  <a:gs pos="0">
+                    <a:srgbClr val="7C0202">
+                      <a:shade val="30000"/>
+                      <a:satMod val="115000"/>
+                    </a:srgbClr>
+                  </a:gs>
+                  <a:gs pos="50000">
+                    <a:srgbClr val="7C0202">
+                      <a:shade val="67500"/>
+                      <a:satMod val="115000"/>
+                    </a:srgbClr>
+                  </a:gs>
+                  <a:gs pos="100000">
+                    <a:srgbClr val="7C0202">
+                      <a:shade val="100000"/>
+                      <a:satMod val="115000"/>
+                    </a:srgbClr>
+                  </a:gs>
+                </a:gsLst>
+                <a:lin ang="2700000" scaled="1"/>
+                <a:tileRect/>
+              </a:gradFill>
+              <a:ln>
+                <a:solidFill>
+                  <a:srgbClr val="262626"/>
+                </a:solidFill>
+              </a:ln>
+            </p:spPr>
+            <p:style>
+              <a:lnRef idx="2">
+                <a:schemeClr val="accent5">
+                  <a:shade val="50000"/>
+                </a:schemeClr>
+              </a:lnRef>
+              <a:fillRef idx="1">
+                <a:schemeClr val="accent5"/>
+              </a:fillRef>
+              <a:effectRef idx="0">
+                <a:schemeClr val="accent5"/>
+              </a:effectRef>
+              <a:fontRef idx="minor">
+                <a:schemeClr val="lt1"/>
+              </a:fontRef>
+            </p:style>
+            <p:txBody>
+              <a:bodyPr rtlCol="0" anchor="ctr"/>
+              <a:lstStyle/>
+              <a:p>
+                <a:pPr algn="ctr"/>
+                <a:endParaRPr lang="fr-FR"/>
+              </a:p>
+            </p:txBody>
+          </p:sp>
+          <p:sp>
+            <p:nvSpPr>
+              <p:cNvPr id="88" name="Parallélogramme 87"/>
+              <p:cNvSpPr/>
+              <p:nvPr/>
+            </p:nvSpPr>
+            <p:spPr>
+              <a:xfrm rot="5400000" flipV="1">
+                <a:off x="3055416" y="2904792"/>
+                <a:ext cx="1485900" cy="365892"/>
+              </a:xfrm>
+              <a:prstGeom prst="parallelogram">
+                <a:avLst>
+                  <a:gd name="adj" fmla="val 102916"/>
+                </a:avLst>
+              </a:prstGeom>
+              <a:solidFill>
+                <a:srgbClr val="262626"/>
+              </a:solidFill>
+              <a:ln>
+                <a:solidFill>
+                  <a:schemeClr val="tx1">
+                    <a:lumMod val="95000"/>
+                    <a:lumOff val="5000"/>
+                  </a:schemeClr>
+                </a:solidFill>
+              </a:ln>
+            </p:spPr>
+            <p:style>
+              <a:lnRef idx="2">
+                <a:schemeClr val="accent6">
+                  <a:shade val="50000"/>
+                </a:schemeClr>
+              </a:lnRef>
+              <a:fillRef idx="1">
+                <a:schemeClr val="accent6"/>
+              </a:fillRef>
+              <a:effectRef idx="0">
+                <a:schemeClr val="accent6"/>
+              </a:effectRef>
+              <a:fontRef idx="minor">
+                <a:schemeClr val="lt1"/>
+              </a:fontRef>
+            </p:style>
+            <p:txBody>
+              <a:bodyPr rtlCol="0" anchor="ctr"/>
+              <a:lstStyle/>
+              <a:p>
+                <a:pPr algn="ctr"/>
+                <a:endParaRPr lang="fr-FR"/>
+              </a:p>
+            </p:txBody>
+          </p:sp>
+          <p:sp>
+            <p:nvSpPr>
+              <p:cNvPr id="89" name="Parallélogramme 88"/>
+              <p:cNvSpPr/>
+              <p:nvPr/>
+            </p:nvSpPr>
+            <p:spPr>
+              <a:xfrm rot="5400000" flipV="1">
+                <a:off x="1838403" y="1771678"/>
+                <a:ext cx="1485900" cy="365892"/>
+              </a:xfrm>
+              <a:prstGeom prst="parallelogram">
+                <a:avLst>
+                  <a:gd name="adj" fmla="val 99524"/>
+                </a:avLst>
+              </a:prstGeom>
+              <a:solidFill>
+                <a:srgbClr val="262626"/>
+              </a:solidFill>
+              <a:ln>
+                <a:solidFill>
+                  <a:schemeClr val="tx1">
+                    <a:lumMod val="95000"/>
+                    <a:lumOff val="5000"/>
+                  </a:schemeClr>
+                </a:solidFill>
+              </a:ln>
+            </p:spPr>
+            <p:style>
+              <a:lnRef idx="2">
+                <a:schemeClr val="accent6">
+                  <a:shade val="50000"/>
+                </a:schemeClr>
+              </a:lnRef>
+              <a:fillRef idx="1">
+                <a:schemeClr val="accent6"/>
+              </a:fillRef>
+              <a:effectRef idx="0">
+                <a:schemeClr val="accent6"/>
+              </a:effectRef>
+              <a:fontRef idx="minor">
+                <a:schemeClr val="lt1"/>
+              </a:fontRef>
+            </p:style>
+            <p:txBody>
+              <a:bodyPr rtlCol="0" anchor="ctr"/>
+              <a:lstStyle/>
+              <a:p>
+                <a:pPr algn="ctr"/>
+                <a:endParaRPr lang="fr-FR"/>
+              </a:p>
+            </p:txBody>
+          </p:sp>
+          <p:sp>
+            <p:nvSpPr>
+              <p:cNvPr id="90" name="Parallélogramme 89"/>
+              <p:cNvSpPr/>
+              <p:nvPr/>
+            </p:nvSpPr>
+            <p:spPr>
+              <a:xfrm>
+                <a:off x="2409229" y="1165803"/>
+                <a:ext cx="1584038" cy="376494"/>
+              </a:xfrm>
+              <a:prstGeom prst="parallelogram">
+                <a:avLst>
+                  <a:gd name="adj" fmla="val 98123"/>
+                </a:avLst>
+              </a:prstGeom>
+              <a:gradFill flip="none" rotWithShape="1">
+                <a:gsLst>
+                  <a:gs pos="0">
+                    <a:srgbClr val="7C0202">
+                      <a:shade val="30000"/>
+                      <a:satMod val="115000"/>
+                    </a:srgbClr>
+                  </a:gs>
+                  <a:gs pos="50000">
+                    <a:srgbClr val="7C0202">
+                      <a:shade val="67500"/>
+                      <a:satMod val="115000"/>
+                    </a:srgbClr>
+                  </a:gs>
+                  <a:gs pos="100000">
+                    <a:srgbClr val="7C0202">
+                      <a:shade val="100000"/>
+                      <a:satMod val="115000"/>
+                    </a:srgbClr>
+                  </a:gs>
+                </a:gsLst>
+                <a:lin ang="2700000" scaled="1"/>
+                <a:tileRect/>
+              </a:gradFill>
+              <a:ln>
+                <a:solidFill>
+                  <a:srgbClr val="262626"/>
+                </a:solidFill>
+              </a:ln>
+            </p:spPr>
+            <p:style>
+              <a:lnRef idx="2">
+                <a:schemeClr val="accent5">
+                  <a:shade val="50000"/>
+                </a:schemeClr>
+              </a:lnRef>
+              <a:fillRef idx="1">
+                <a:schemeClr val="accent5"/>
+              </a:fillRef>
+              <a:effectRef idx="0">
+                <a:schemeClr val="accent5"/>
+              </a:effectRef>
+              <a:fontRef idx="minor">
+                <a:schemeClr val="lt1"/>
+              </a:fontRef>
+            </p:style>
+            <p:txBody>
+              <a:bodyPr rtlCol="0" anchor="ctr"/>
+              <a:lstStyle/>
+              <a:p>
+                <a:pPr algn="ctr"/>
+                <a:endParaRPr lang="fr-FR"/>
+              </a:p>
+            </p:txBody>
+          </p:sp>
+          <p:sp>
+            <p:nvSpPr>
+              <p:cNvPr id="91" name="Parallélogramme 90"/>
+              <p:cNvSpPr/>
+              <p:nvPr/>
+            </p:nvSpPr>
+            <p:spPr>
+              <a:xfrm>
+                <a:off x="3615420" y="3467824"/>
+                <a:ext cx="4269036" cy="376494"/>
+              </a:xfrm>
+              <a:prstGeom prst="parallelogram">
+                <a:avLst>
+                  <a:gd name="adj" fmla="val 98123"/>
+                </a:avLst>
+              </a:prstGeom>
+              <a:gradFill flip="none" rotWithShape="1">
+                <a:gsLst>
+                  <a:gs pos="0">
+                    <a:srgbClr val="7C0202">
+                      <a:shade val="30000"/>
+                      <a:satMod val="115000"/>
+                    </a:srgbClr>
+                  </a:gs>
+                  <a:gs pos="50000">
+                    <a:srgbClr val="7C0202">
+                      <a:shade val="67500"/>
+                      <a:satMod val="115000"/>
+                    </a:srgbClr>
+                  </a:gs>
+                  <a:gs pos="100000">
+                    <a:srgbClr val="7C0202">
+                      <a:shade val="100000"/>
+                      <a:satMod val="115000"/>
+                    </a:srgbClr>
+                  </a:gs>
+                </a:gsLst>
+                <a:lin ang="2700000" scaled="1"/>
+                <a:tileRect/>
+              </a:gradFill>
+              <a:ln>
+                <a:solidFill>
+                  <a:srgbClr val="262626"/>
+                </a:solidFill>
+              </a:ln>
+            </p:spPr>
+            <p:style>
+              <a:lnRef idx="2">
+                <a:schemeClr val="accent5">
+                  <a:shade val="50000"/>
+                </a:schemeClr>
+              </a:lnRef>
+              <a:fillRef idx="1">
+                <a:schemeClr val="accent5"/>
+              </a:fillRef>
+              <a:effectRef idx="0">
+                <a:schemeClr val="accent5"/>
+              </a:effectRef>
+              <a:fontRef idx="minor">
+                <a:schemeClr val="lt1"/>
+              </a:fontRef>
+            </p:style>
+            <p:txBody>
+              <a:bodyPr rtlCol="0" anchor="ctr"/>
+              <a:lstStyle/>
+              <a:p>
+                <a:pPr algn="ctr"/>
+                <a:endParaRPr lang="fr-FR"/>
+              </a:p>
+            </p:txBody>
+          </p:sp>
+          <p:sp>
+            <p:nvSpPr>
+              <p:cNvPr id="92" name="Parallélogramme 91"/>
+              <p:cNvSpPr/>
+              <p:nvPr/>
+            </p:nvSpPr>
+            <p:spPr>
+              <a:xfrm rot="5400000" flipV="1">
+                <a:off x="6508292" y="2452140"/>
+                <a:ext cx="2405437" cy="365892"/>
+              </a:xfrm>
+              <a:prstGeom prst="parallelogram">
+                <a:avLst>
+                  <a:gd name="adj" fmla="val 99524"/>
+                </a:avLst>
+              </a:prstGeom>
+              <a:gradFill flip="none" rotWithShape="1">
+                <a:gsLst>
+                  <a:gs pos="0">
+                    <a:srgbClr val="7C0202">
+                      <a:shade val="30000"/>
+                      <a:satMod val="115000"/>
+                    </a:srgbClr>
+                  </a:gs>
+                  <a:gs pos="50000">
+                    <a:srgbClr val="7C0202">
+                      <a:shade val="67500"/>
+                      <a:satMod val="115000"/>
+                    </a:srgbClr>
+                  </a:gs>
+                  <a:gs pos="100000">
+                    <a:srgbClr val="7C0202">
+                      <a:shade val="100000"/>
+                      <a:satMod val="115000"/>
+                    </a:srgbClr>
+                  </a:gs>
+                </a:gsLst>
+                <a:lin ang="0" scaled="1"/>
+                <a:tileRect/>
+              </a:gradFill>
+              <a:ln>
+                <a:solidFill>
+                  <a:srgbClr val="262626"/>
+                </a:solidFill>
+              </a:ln>
+            </p:spPr>
+            <p:style>
+              <a:lnRef idx="2">
+                <a:schemeClr val="accent6">
+                  <a:shade val="50000"/>
+                </a:schemeClr>
+              </a:lnRef>
+              <a:fillRef idx="1">
+                <a:schemeClr val="accent6"/>
+              </a:fillRef>
+              <a:effectRef idx="0">
+                <a:schemeClr val="accent6"/>
+              </a:effectRef>
+              <a:fontRef idx="minor">
+                <a:schemeClr val="lt1"/>
+              </a:fontRef>
+            </p:style>
+            <p:txBody>
+              <a:bodyPr rtlCol="0" anchor="ctr"/>
+              <a:lstStyle/>
+              <a:p>
+                <a:pPr algn="ctr"/>
+                <a:endParaRPr lang="fr-FR"/>
+              </a:p>
+            </p:txBody>
+          </p:sp>
+          <p:sp>
+            <p:nvSpPr>
+              <p:cNvPr id="93" name="Parallélogramme 92"/>
+              <p:cNvSpPr/>
+              <p:nvPr/>
+            </p:nvSpPr>
+            <p:spPr>
+              <a:xfrm rot="5400000" flipV="1">
+                <a:off x="6361649" y="2590107"/>
+                <a:ext cx="1125629" cy="365892"/>
+              </a:xfrm>
+              <a:prstGeom prst="parallelogram">
+                <a:avLst>
+                  <a:gd name="adj" fmla="val 99524"/>
+                </a:avLst>
+              </a:prstGeom>
+              <a:solidFill>
+                <a:srgbClr val="262626"/>
+              </a:solidFill>
+              <a:ln>
+                <a:solidFill>
+                  <a:schemeClr val="tx1">
+                    <a:lumMod val="95000"/>
+                    <a:lumOff val="5000"/>
+                  </a:schemeClr>
+                </a:solidFill>
+              </a:ln>
+            </p:spPr>
+            <p:style>
+              <a:lnRef idx="2">
+                <a:schemeClr val="accent6">
+                  <a:shade val="50000"/>
+                </a:schemeClr>
+              </a:lnRef>
+              <a:fillRef idx="1">
+                <a:schemeClr val="accent6"/>
+              </a:fillRef>
+              <a:effectRef idx="0">
+                <a:schemeClr val="accent6"/>
+              </a:effectRef>
+              <a:fontRef idx="minor">
+                <a:schemeClr val="lt1"/>
+              </a:fontRef>
+            </p:style>
+            <p:txBody>
+              <a:bodyPr rtlCol="0" anchor="ctr"/>
+              <a:lstStyle/>
+              <a:p>
+                <a:pPr algn="ctr"/>
+                <a:endParaRPr lang="fr-FR"/>
+              </a:p>
+            </p:txBody>
+          </p:sp>
+          <p:sp>
+            <p:nvSpPr>
+              <p:cNvPr id="94" name="Parallélogramme 93"/>
+              <p:cNvSpPr/>
+              <p:nvPr/>
+            </p:nvSpPr>
+            <p:spPr>
+              <a:xfrm rot="5400000" flipV="1">
+                <a:off x="6310632" y="4350956"/>
+                <a:ext cx="1227663" cy="365892"/>
+              </a:xfrm>
+              <a:prstGeom prst="parallelogram">
+                <a:avLst>
+                  <a:gd name="adj" fmla="val 0"/>
+                </a:avLst>
+              </a:prstGeom>
+              <a:solidFill>
+                <a:srgbClr val="262626"/>
+              </a:solidFill>
+              <a:ln>
+                <a:solidFill>
+                  <a:schemeClr val="tx1">
+                    <a:lumMod val="95000"/>
+                    <a:lumOff val="5000"/>
+                  </a:schemeClr>
+                </a:solidFill>
+              </a:ln>
+            </p:spPr>
+            <p:style>
+              <a:lnRef idx="2">
+                <a:schemeClr val="accent6">
+                  <a:shade val="50000"/>
+                </a:schemeClr>
+              </a:lnRef>
+              <a:fillRef idx="1">
+                <a:schemeClr val="accent6"/>
+              </a:fillRef>
+              <a:effectRef idx="0">
+                <a:schemeClr val="accent6"/>
+              </a:effectRef>
+              <a:fontRef idx="minor">
+                <a:schemeClr val="lt1"/>
+              </a:fontRef>
+            </p:style>
+            <p:txBody>
+              <a:bodyPr rtlCol="0" anchor="ctr"/>
+              <a:lstStyle/>
+              <a:p>
+                <a:pPr algn="ctr"/>
+                <a:endParaRPr lang="fr-FR"/>
+              </a:p>
+            </p:txBody>
+          </p:sp>
+          <p:sp>
+            <p:nvSpPr>
+              <p:cNvPr id="95" name="Parallélogramme 94"/>
+              <p:cNvSpPr/>
+              <p:nvPr/>
+            </p:nvSpPr>
+            <p:spPr>
+              <a:xfrm rot="5400000" flipV="1">
+                <a:off x="6532677" y="2825696"/>
+                <a:ext cx="783574" cy="365892"/>
+              </a:xfrm>
+              <a:prstGeom prst="parallelogram">
+                <a:avLst>
+                  <a:gd name="adj" fmla="val 0"/>
+                </a:avLst>
+              </a:prstGeom>
+              <a:solidFill>
+                <a:srgbClr val="262626"/>
+              </a:solidFill>
+              <a:ln>
+                <a:solidFill>
+                  <a:schemeClr val="tx1">
+                    <a:lumMod val="95000"/>
+                    <a:lumOff val="5000"/>
+                  </a:schemeClr>
+                </a:solidFill>
+              </a:ln>
+            </p:spPr>
+            <p:style>
+              <a:lnRef idx="2">
+                <a:schemeClr val="accent6">
+                  <a:shade val="50000"/>
+                </a:schemeClr>
+              </a:lnRef>
+              <a:fillRef idx="1">
+                <a:schemeClr val="accent6"/>
+              </a:fillRef>
+              <a:effectRef idx="0">
+                <a:schemeClr val="accent6"/>
+              </a:effectRef>
+              <a:fontRef idx="minor">
+                <a:schemeClr val="lt1"/>
+              </a:fontRef>
+            </p:style>
+            <p:txBody>
+              <a:bodyPr rtlCol="0" anchor="ctr"/>
+              <a:lstStyle/>
+              <a:p>
+                <a:pPr algn="ctr"/>
+                <a:endParaRPr lang="fr-FR"/>
+              </a:p>
+            </p:txBody>
+          </p:sp>
+          <p:sp>
+            <p:nvSpPr>
+              <p:cNvPr id="96" name="Rectangle 95"/>
+              <p:cNvSpPr/>
+              <p:nvPr/>
+            </p:nvSpPr>
+            <p:spPr>
+              <a:xfrm>
+                <a:off x="6741516" y="2598682"/>
+                <a:ext cx="365893" cy="169918"/>
+              </a:xfrm>
+              <a:prstGeom prst="rect">
+                <a:avLst/>
+              </a:prstGeom>
+              <a:solidFill>
+                <a:srgbClr val="262626"/>
+              </a:solidFill>
+              <a:ln>
+                <a:noFill/>
+              </a:ln>
+            </p:spPr>
+            <p:style>
+              <a:lnRef idx="2">
+                <a:schemeClr val="accent1">
+                  <a:shade val="50000"/>
+                </a:schemeClr>
+              </a:lnRef>
+              <a:fillRef idx="1">
+                <a:schemeClr val="accent1"/>
+              </a:fillRef>
+              <a:effectRef idx="0">
+                <a:schemeClr val="accent1"/>
+              </a:effectRef>
+              <a:fontRef idx="minor">
+                <a:schemeClr val="lt1"/>
+              </a:fontRef>
+            </p:style>
+            <p:txBody>
+              <a:bodyPr rtlCol="0" anchor="ctr"/>
+              <a:lstStyle/>
+              <a:p>
+                <a:pPr algn="ctr"/>
+                <a:endParaRPr lang="fr-FR"/>
+              </a:p>
+            </p:txBody>
+          </p:sp>
+        </p:grpSp>
+        <p:sp>
+          <p:nvSpPr>
+            <p:cNvPr id="82" name="Parallélogramme 81"/>
+            <p:cNvSpPr/>
+            <p:nvPr/>
+          </p:nvSpPr>
+          <p:spPr>
+            <a:xfrm>
+              <a:off x="3694935" y="1025737"/>
+              <a:ext cx="921902" cy="235717"/>
+            </a:xfrm>
+            <a:prstGeom prst="parallelogram">
+              <a:avLst>
+                <a:gd name="adj" fmla="val 98123"/>
+              </a:avLst>
+            </a:prstGeom>
+            <a:gradFill flip="none" rotWithShape="1">
+              <a:gsLst>
+                <a:gs pos="0">
+                  <a:srgbClr val="7C0202">
+                    <a:shade val="30000"/>
+                    <a:satMod val="115000"/>
+                  </a:srgbClr>
+                </a:gs>
+                <a:gs pos="50000">
+                  <a:srgbClr val="7C0202">
+                    <a:shade val="67500"/>
+                    <a:satMod val="115000"/>
+                  </a:srgbClr>
+                </a:gs>
+                <a:gs pos="100000">
+                  <a:srgbClr val="7C0202">
+                    <a:shade val="100000"/>
+                    <a:satMod val="115000"/>
+                  </a:srgbClr>
+                </a:gs>
+              </a:gsLst>
+              <a:lin ang="2700000" scaled="1"/>
+              <a:tileRect/>
+            </a:gradFill>
+            <a:ln>
+              <a:solidFill>
+                <a:srgbClr val="262626"/>
+              </a:solidFill>
+            </a:ln>
+          </p:spPr>
+          <p:style>
+            <a:lnRef idx="2">
+              <a:schemeClr val="accent5">
+                <a:shade val="50000"/>
+              </a:schemeClr>
+            </a:lnRef>
+            <a:fillRef idx="1">
+              <a:schemeClr val="accent5"/>
+            </a:fillRef>
+            <a:effectRef idx="0">
+              <a:schemeClr val="accent5"/>
+            </a:effectRef>
+            <a:fontRef idx="minor">
+              <a:schemeClr val="lt1"/>
+            </a:fontRef>
+          </p:style>
+          <p:txBody>
+            <a:bodyPr rtlCol="0" anchor="ctr"/>
+            <a:lstStyle/>
+            <a:p>
+              <a:pPr algn="ctr"/>
+              <a:endParaRPr lang="fr-FR"/>
+            </a:p>
+          </p:txBody>
+        </p:sp>
+        <p:sp>
+          <p:nvSpPr>
+            <p:cNvPr id="83" name="Parallélogramme 82"/>
+            <p:cNvSpPr/>
+            <p:nvPr/>
+          </p:nvSpPr>
+          <p:spPr>
+            <a:xfrm>
+              <a:off x="2787446" y="358387"/>
+              <a:ext cx="1123104" cy="235717"/>
+            </a:xfrm>
+            <a:prstGeom prst="parallelogram">
+              <a:avLst>
+                <a:gd name="adj" fmla="val 98123"/>
+              </a:avLst>
+            </a:prstGeom>
+            <a:gradFill flip="none" rotWithShape="1">
+              <a:gsLst>
+                <a:gs pos="0">
+                  <a:srgbClr val="7C0202">
+                    <a:shade val="30000"/>
+                    <a:satMod val="115000"/>
+                  </a:srgbClr>
+                </a:gs>
+                <a:gs pos="50000">
+                  <a:srgbClr val="7C0202">
+                    <a:shade val="67500"/>
+                    <a:satMod val="115000"/>
+                  </a:srgbClr>
+                </a:gs>
+                <a:gs pos="100000">
+                  <a:srgbClr val="7C0202">
+                    <a:shade val="100000"/>
+                    <a:satMod val="115000"/>
+                  </a:srgbClr>
+                </a:gs>
+              </a:gsLst>
+              <a:lin ang="2700000" scaled="1"/>
+              <a:tileRect/>
+            </a:gradFill>
+            <a:ln>
+              <a:solidFill>
+                <a:srgbClr val="262626"/>
+              </a:solidFill>
+            </a:ln>
+          </p:spPr>
+          <p:style>
+            <a:lnRef idx="2">
+              <a:schemeClr val="accent5">
+                <a:shade val="50000"/>
+              </a:schemeClr>
+            </a:lnRef>
+            <a:fillRef idx="1">
+              <a:schemeClr val="accent5"/>
+            </a:fillRef>
+            <a:effectRef idx="0">
+              <a:schemeClr val="accent5"/>
+            </a:effectRef>
+            <a:fontRef idx="minor">
+              <a:schemeClr val="lt1"/>
+            </a:fontRef>
+          </p:style>
+          <p:txBody>
+            <a:bodyPr rtlCol="0" anchor="ctr"/>
+            <a:lstStyle/>
+            <a:p>
+              <a:pPr algn="ctr"/>
+              <a:endParaRPr lang="fr-FR"/>
+            </a:p>
+          </p:txBody>
+        </p:sp>
+      </p:grpSp>
+      <p:grpSp>
+        <p:nvGrpSpPr>
+          <p:cNvPr id="119" name="Grouper 118"/>
+          <p:cNvGrpSpPr/>
+          <p:nvPr/>
+        </p:nvGrpSpPr>
+        <p:grpSpPr>
+          <a:xfrm>
+            <a:off x="8590821" y="199582"/>
+            <a:ext cx="3194354" cy="3235713"/>
+            <a:chOff x="2426046" y="358387"/>
+            <a:chExt cx="3194354" cy="3235713"/>
+          </a:xfrm>
+          <a:effectLst>
+            <a:outerShdw blurRad="50800" dist="38100" dir="2700000" algn="tl" rotWithShape="0">
+              <a:prstClr val="black">
+                <a:alpha val="40000"/>
+              </a:prstClr>
+            </a:outerShdw>
+          </a:effectLst>
+        </p:grpSpPr>
+        <p:grpSp>
+          <p:nvGrpSpPr>
+            <p:cNvPr id="120" name="Grouper 119"/>
+            <p:cNvGrpSpPr/>
+            <p:nvPr/>
+          </p:nvGrpSpPr>
+          <p:grpSpPr>
+            <a:xfrm>
+              <a:off x="2426046" y="366109"/>
+              <a:ext cx="3194354" cy="3227991"/>
+              <a:chOff x="2393646" y="368960"/>
+              <a:chExt cx="5500312" cy="5155839"/>
+            </a:xfrm>
+          </p:grpSpPr>
+          <p:sp>
+            <p:nvSpPr>
+              <p:cNvPr id="123" name="Parallélogramme 122"/>
+              <p:cNvSpPr/>
+              <p:nvPr/>
+            </p:nvSpPr>
+            <p:spPr>
+              <a:xfrm rot="5400000" flipV="1">
+                <a:off x="6682524" y="4313366"/>
+                <a:ext cx="2056975" cy="365892"/>
+              </a:xfrm>
+              <a:prstGeom prst="parallelogram">
+                <a:avLst>
+                  <a:gd name="adj" fmla="val 99524"/>
+                </a:avLst>
+              </a:prstGeom>
+              <a:solidFill>
+                <a:srgbClr val="3E82A3"/>
+              </a:solidFill>
+              <a:ln>
+                <a:solidFill>
+                  <a:srgbClr val="0F638C"/>
+                </a:solidFill>
+              </a:ln>
+            </p:spPr>
+            <p:style>
+              <a:lnRef idx="2">
+                <a:schemeClr val="accent6">
+                  <a:shade val="50000"/>
+                </a:schemeClr>
+              </a:lnRef>
+              <a:fillRef idx="1">
+                <a:schemeClr val="accent6"/>
+              </a:fillRef>
+              <a:effectRef idx="0">
+                <a:schemeClr val="accent6"/>
+              </a:effectRef>
+              <a:fontRef idx="minor">
+                <a:schemeClr val="lt1"/>
+              </a:fontRef>
+            </p:style>
+            <p:txBody>
+              <a:bodyPr rtlCol="0" anchor="ctr"/>
+              <a:lstStyle/>
+              <a:p>
+                <a:pPr algn="ctr"/>
+                <a:endParaRPr lang="fr-FR"/>
+              </a:p>
+            </p:txBody>
+          </p:sp>
+          <p:grpSp>
+            <p:nvGrpSpPr>
+              <p:cNvPr id="124" name="Grouper 123"/>
+              <p:cNvGrpSpPr/>
+              <p:nvPr/>
+            </p:nvGrpSpPr>
+            <p:grpSpPr>
+              <a:xfrm>
+                <a:off x="4597579" y="1438881"/>
+                <a:ext cx="1568358" cy="1515581"/>
+                <a:chOff x="4615681" y="1516114"/>
+                <a:chExt cx="1584358" cy="1515581"/>
+              </a:xfrm>
+            </p:grpSpPr>
+            <p:sp>
+              <p:nvSpPr>
+                <p:cNvPr id="136" name="Parallélogramme 135"/>
+                <p:cNvSpPr/>
+                <p:nvPr/>
+              </p:nvSpPr>
+              <p:spPr>
+                <a:xfrm>
+                  <a:off x="4615681" y="2655201"/>
+                  <a:ext cx="1584358" cy="376494"/>
+                </a:xfrm>
+                <a:prstGeom prst="parallelogram">
+                  <a:avLst>
+                    <a:gd name="adj" fmla="val 98123"/>
+                  </a:avLst>
+                </a:prstGeom>
+                <a:solidFill>
+                  <a:srgbClr val="3E82A3"/>
+                </a:solidFill>
+                <a:ln>
+                  <a:solidFill>
+                    <a:srgbClr val="0F638C"/>
+                  </a:solidFill>
+                </a:ln>
+              </p:spPr>
+              <p:style>
+                <a:lnRef idx="2">
+                  <a:schemeClr val="accent5">
+                    <a:shade val="50000"/>
+                  </a:schemeClr>
+                </a:lnRef>
+                <a:fillRef idx="1">
+                  <a:schemeClr val="accent5"/>
+                </a:fillRef>
+                <a:effectRef idx="0">
+                  <a:schemeClr val="accent5"/>
+                </a:effectRef>
+                <a:fontRef idx="minor">
+                  <a:schemeClr val="lt1"/>
+                </a:fontRef>
+              </p:style>
+              <p:txBody>
+                <a:bodyPr rtlCol="0" anchor="ctr"/>
+                <a:lstStyle/>
+                <a:p>
+                  <a:pPr algn="ctr"/>
+                  <a:endParaRPr lang="fr-FR"/>
+                </a:p>
+              </p:txBody>
+            </p:sp>
+            <p:sp>
+              <p:nvSpPr>
+                <p:cNvPr id="137" name="Parallélogramme 136"/>
+                <p:cNvSpPr/>
+                <p:nvPr/>
+              </p:nvSpPr>
+              <p:spPr>
+                <a:xfrm rot="5400000" flipV="1">
+                  <a:off x="5264332" y="2079335"/>
+                  <a:ext cx="1498928" cy="372486"/>
+                </a:xfrm>
+                <a:prstGeom prst="parallelogram">
+                  <a:avLst>
+                    <a:gd name="adj" fmla="val 99524"/>
+                  </a:avLst>
+                </a:prstGeom>
+                <a:solidFill>
+                  <a:srgbClr val="262626"/>
+                </a:solidFill>
+                <a:ln>
+                  <a:solidFill>
+                    <a:schemeClr val="tx1">
+                      <a:lumMod val="95000"/>
+                      <a:lumOff val="5000"/>
+                    </a:schemeClr>
+                  </a:solidFill>
+                </a:ln>
+              </p:spPr>
+              <p:style>
+                <a:lnRef idx="2">
+                  <a:schemeClr val="accent6">
+                    <a:shade val="50000"/>
+                  </a:schemeClr>
+                </a:lnRef>
+                <a:fillRef idx="1">
+                  <a:schemeClr val="accent6"/>
+                </a:fillRef>
+                <a:effectRef idx="0">
+                  <a:schemeClr val="accent6"/>
+                </a:effectRef>
+                <a:fontRef idx="minor">
+                  <a:schemeClr val="lt1"/>
+                </a:fontRef>
+              </p:style>
+              <p:txBody>
+                <a:bodyPr rtlCol="0" anchor="ctr"/>
+                <a:lstStyle/>
+                <a:p>
+                  <a:pPr algn="ctr"/>
+                  <a:endParaRPr lang="fr-FR"/>
+                </a:p>
+              </p:txBody>
+            </p:sp>
+          </p:grpSp>
+          <p:sp>
+            <p:nvSpPr>
+              <p:cNvPr id="125" name="Parallélogramme 124"/>
+              <p:cNvSpPr/>
+              <p:nvPr/>
+            </p:nvSpPr>
+            <p:spPr>
+              <a:xfrm rot="5400000" flipV="1">
+                <a:off x="4047131" y="888043"/>
+                <a:ext cx="1421744" cy="383578"/>
+              </a:xfrm>
+              <a:prstGeom prst="parallelogram">
+                <a:avLst>
+                  <a:gd name="adj" fmla="val 99524"/>
+                </a:avLst>
+              </a:prstGeom>
+              <a:solidFill>
+                <a:srgbClr val="262626"/>
+              </a:solidFill>
+              <a:ln>
+                <a:solidFill>
+                  <a:schemeClr val="tx1">
+                    <a:lumMod val="95000"/>
+                    <a:lumOff val="5000"/>
+                  </a:schemeClr>
+                </a:solidFill>
+              </a:ln>
+            </p:spPr>
+            <p:style>
+              <a:lnRef idx="2">
+                <a:schemeClr val="accent3">
+                  <a:shade val="50000"/>
+                </a:schemeClr>
+              </a:lnRef>
+              <a:fillRef idx="1">
+                <a:schemeClr val="accent3"/>
+              </a:fillRef>
+              <a:effectRef idx="0">
+                <a:schemeClr val="accent3"/>
+              </a:effectRef>
+              <a:fontRef idx="minor">
+                <a:schemeClr val="lt1"/>
+              </a:fontRef>
+            </p:style>
+            <p:txBody>
+              <a:bodyPr rtlCol="0" anchor="ctr"/>
+              <a:lstStyle/>
+              <a:p>
+                <a:pPr algn="ctr"/>
+                <a:endParaRPr lang="fr-FR"/>
+              </a:p>
+            </p:txBody>
+          </p:sp>
+          <p:sp>
+            <p:nvSpPr>
+              <p:cNvPr id="126" name="Parallélogramme 125"/>
+              <p:cNvSpPr/>
+              <p:nvPr/>
+            </p:nvSpPr>
+            <p:spPr>
+              <a:xfrm>
+                <a:off x="2393646" y="2337877"/>
+                <a:ext cx="1584039" cy="376494"/>
+              </a:xfrm>
+              <a:prstGeom prst="parallelogram">
+                <a:avLst>
+                  <a:gd name="adj" fmla="val 98123"/>
+                </a:avLst>
+              </a:prstGeom>
+              <a:solidFill>
+                <a:srgbClr val="3E82A3"/>
+              </a:solidFill>
+              <a:ln>
+                <a:solidFill>
+                  <a:srgbClr val="0F638C"/>
+                </a:solidFill>
+              </a:ln>
+            </p:spPr>
+            <p:style>
+              <a:lnRef idx="2">
+                <a:schemeClr val="accent5">
+                  <a:shade val="50000"/>
+                </a:schemeClr>
+              </a:lnRef>
+              <a:fillRef idx="1">
+                <a:schemeClr val="accent5"/>
+              </a:fillRef>
+              <a:effectRef idx="0">
+                <a:schemeClr val="accent5"/>
+              </a:effectRef>
+              <a:fontRef idx="minor">
+                <a:schemeClr val="lt1"/>
+              </a:fontRef>
+            </p:style>
+            <p:txBody>
+              <a:bodyPr rtlCol="0" anchor="ctr"/>
+              <a:lstStyle/>
+              <a:p>
+                <a:pPr algn="ctr"/>
+                <a:endParaRPr lang="fr-FR"/>
+              </a:p>
+            </p:txBody>
+          </p:sp>
+          <p:sp>
+            <p:nvSpPr>
+              <p:cNvPr id="127" name="Parallélogramme 126"/>
+              <p:cNvSpPr/>
+              <p:nvPr/>
+            </p:nvSpPr>
+            <p:spPr>
+              <a:xfrm rot="5400000" flipV="1">
+                <a:off x="3055416" y="2904792"/>
+                <a:ext cx="1485900" cy="365892"/>
+              </a:xfrm>
+              <a:prstGeom prst="parallelogram">
+                <a:avLst>
+                  <a:gd name="adj" fmla="val 102916"/>
+                </a:avLst>
+              </a:prstGeom>
+              <a:solidFill>
+                <a:srgbClr val="262626"/>
+              </a:solidFill>
+              <a:ln>
+                <a:solidFill>
+                  <a:schemeClr val="tx1">
+                    <a:lumMod val="95000"/>
+                    <a:lumOff val="5000"/>
+                  </a:schemeClr>
+                </a:solidFill>
+              </a:ln>
+            </p:spPr>
+            <p:style>
+              <a:lnRef idx="2">
+                <a:schemeClr val="accent6">
+                  <a:shade val="50000"/>
+                </a:schemeClr>
+              </a:lnRef>
+              <a:fillRef idx="1">
+                <a:schemeClr val="accent6"/>
+              </a:fillRef>
+              <a:effectRef idx="0">
+                <a:schemeClr val="accent6"/>
+              </a:effectRef>
+              <a:fontRef idx="minor">
+                <a:schemeClr val="lt1"/>
+              </a:fontRef>
+            </p:style>
+            <p:txBody>
+              <a:bodyPr rtlCol="0" anchor="ctr"/>
+              <a:lstStyle/>
+              <a:p>
+                <a:pPr algn="ctr"/>
+                <a:endParaRPr lang="fr-FR"/>
+              </a:p>
+            </p:txBody>
+          </p:sp>
+          <p:sp>
+            <p:nvSpPr>
+              <p:cNvPr id="128" name="Parallélogramme 127"/>
+              <p:cNvSpPr/>
+              <p:nvPr/>
+            </p:nvSpPr>
+            <p:spPr>
+              <a:xfrm rot="5400000" flipV="1">
+                <a:off x="1838403" y="1771678"/>
+                <a:ext cx="1485900" cy="365892"/>
+              </a:xfrm>
+              <a:prstGeom prst="parallelogram">
+                <a:avLst>
+                  <a:gd name="adj" fmla="val 99524"/>
+                </a:avLst>
+              </a:prstGeom>
+              <a:solidFill>
+                <a:srgbClr val="262626"/>
+              </a:solidFill>
+              <a:ln>
+                <a:solidFill>
+                  <a:schemeClr val="tx1">
+                    <a:lumMod val="95000"/>
+                    <a:lumOff val="5000"/>
+                  </a:schemeClr>
+                </a:solidFill>
+              </a:ln>
+            </p:spPr>
+            <p:style>
+              <a:lnRef idx="2">
+                <a:schemeClr val="accent6">
+                  <a:shade val="50000"/>
+                </a:schemeClr>
+              </a:lnRef>
+              <a:fillRef idx="1">
+                <a:schemeClr val="accent6"/>
+              </a:fillRef>
+              <a:effectRef idx="0">
+                <a:schemeClr val="accent6"/>
+              </a:effectRef>
+              <a:fontRef idx="minor">
+                <a:schemeClr val="lt1"/>
+              </a:fontRef>
+            </p:style>
+            <p:txBody>
+              <a:bodyPr rtlCol="0" anchor="ctr"/>
+              <a:lstStyle/>
+              <a:p>
+                <a:pPr algn="ctr"/>
+                <a:endParaRPr lang="fr-FR"/>
+              </a:p>
+            </p:txBody>
+          </p:sp>
+          <p:sp>
+            <p:nvSpPr>
+              <p:cNvPr id="129" name="Parallélogramme 128"/>
+              <p:cNvSpPr/>
+              <p:nvPr/>
+            </p:nvSpPr>
+            <p:spPr>
+              <a:xfrm>
+                <a:off x="2409229" y="1165803"/>
+                <a:ext cx="1584038" cy="376494"/>
+              </a:xfrm>
+              <a:prstGeom prst="parallelogram">
+                <a:avLst>
+                  <a:gd name="adj" fmla="val 98123"/>
+                </a:avLst>
+              </a:prstGeom>
+              <a:solidFill>
+                <a:srgbClr val="3E82A3"/>
+              </a:solidFill>
+              <a:ln>
+                <a:solidFill>
+                  <a:srgbClr val="0F638C"/>
+                </a:solidFill>
+              </a:ln>
+            </p:spPr>
+            <p:style>
+              <a:lnRef idx="2">
+                <a:schemeClr val="accent5">
+                  <a:shade val="50000"/>
+                </a:schemeClr>
+              </a:lnRef>
+              <a:fillRef idx="1">
+                <a:schemeClr val="accent5"/>
+              </a:fillRef>
+              <a:effectRef idx="0">
+                <a:schemeClr val="accent5"/>
+              </a:effectRef>
+              <a:fontRef idx="minor">
+                <a:schemeClr val="lt1"/>
+              </a:fontRef>
+            </p:style>
+            <p:txBody>
+              <a:bodyPr rtlCol="0" anchor="ctr"/>
+              <a:lstStyle/>
+              <a:p>
+                <a:pPr algn="ctr"/>
+                <a:endParaRPr lang="fr-FR"/>
+              </a:p>
+            </p:txBody>
+          </p:sp>
+          <p:sp>
+            <p:nvSpPr>
+              <p:cNvPr id="130" name="Parallélogramme 129"/>
+              <p:cNvSpPr/>
+              <p:nvPr/>
+            </p:nvSpPr>
+            <p:spPr>
+              <a:xfrm>
+                <a:off x="3615420" y="3467824"/>
+                <a:ext cx="4269036" cy="376494"/>
+              </a:xfrm>
+              <a:prstGeom prst="parallelogram">
+                <a:avLst>
+                  <a:gd name="adj" fmla="val 98123"/>
+                </a:avLst>
+              </a:prstGeom>
+              <a:solidFill>
+                <a:srgbClr val="3E82A3"/>
+              </a:solidFill>
+              <a:ln>
+                <a:solidFill>
+                  <a:srgbClr val="0F638C"/>
+                </a:solidFill>
+              </a:ln>
+            </p:spPr>
+            <p:style>
+              <a:lnRef idx="2">
+                <a:schemeClr val="accent5">
+                  <a:shade val="50000"/>
+                </a:schemeClr>
+              </a:lnRef>
+              <a:fillRef idx="1">
+                <a:schemeClr val="accent5"/>
+              </a:fillRef>
+              <a:effectRef idx="0">
+                <a:schemeClr val="accent5"/>
+              </a:effectRef>
+              <a:fontRef idx="minor">
+                <a:schemeClr val="lt1"/>
+              </a:fontRef>
+            </p:style>
+            <p:txBody>
+              <a:bodyPr rtlCol="0" anchor="ctr"/>
+              <a:lstStyle/>
+              <a:p>
+                <a:pPr algn="ctr"/>
+                <a:endParaRPr lang="fr-FR"/>
+              </a:p>
+            </p:txBody>
+          </p:sp>
+          <p:sp>
+            <p:nvSpPr>
+              <p:cNvPr id="131" name="Parallélogramme 130"/>
+              <p:cNvSpPr/>
+              <p:nvPr/>
+            </p:nvSpPr>
+            <p:spPr>
+              <a:xfrm rot="5400000" flipV="1">
+                <a:off x="6508292" y="2452140"/>
+                <a:ext cx="2405437" cy="365892"/>
+              </a:xfrm>
+              <a:prstGeom prst="parallelogram">
+                <a:avLst>
+                  <a:gd name="adj" fmla="val 99524"/>
+                </a:avLst>
+              </a:prstGeom>
+              <a:solidFill>
+                <a:srgbClr val="3E82A3"/>
+              </a:solidFill>
+              <a:ln>
+                <a:solidFill>
+                  <a:srgbClr val="0F638C"/>
+                </a:solidFill>
+              </a:ln>
+            </p:spPr>
+            <p:style>
+              <a:lnRef idx="2">
+                <a:schemeClr val="accent6">
+                  <a:shade val="50000"/>
+                </a:schemeClr>
+              </a:lnRef>
+              <a:fillRef idx="1">
+                <a:schemeClr val="accent6"/>
+              </a:fillRef>
+              <a:effectRef idx="0">
+                <a:schemeClr val="accent6"/>
+              </a:effectRef>
+              <a:fontRef idx="minor">
+                <a:schemeClr val="lt1"/>
+              </a:fontRef>
+            </p:style>
+            <p:txBody>
+              <a:bodyPr rtlCol="0" anchor="ctr"/>
+              <a:lstStyle/>
+              <a:p>
+                <a:pPr algn="ctr"/>
+                <a:endParaRPr lang="fr-FR"/>
+              </a:p>
+            </p:txBody>
+          </p:sp>
+          <p:sp>
+            <p:nvSpPr>
+              <p:cNvPr id="132" name="Parallélogramme 131"/>
+              <p:cNvSpPr/>
+              <p:nvPr/>
+            </p:nvSpPr>
+            <p:spPr>
+              <a:xfrm rot="5400000" flipV="1">
+                <a:off x="6361649" y="2590107"/>
+                <a:ext cx="1125629" cy="365892"/>
+              </a:xfrm>
+              <a:prstGeom prst="parallelogram">
+                <a:avLst>
+                  <a:gd name="adj" fmla="val 99524"/>
+                </a:avLst>
+              </a:prstGeom>
+              <a:solidFill>
+                <a:srgbClr val="262626"/>
+              </a:solidFill>
+              <a:ln>
+                <a:solidFill>
+                  <a:schemeClr val="tx1">
+                    <a:lumMod val="95000"/>
+                    <a:lumOff val="5000"/>
+                  </a:schemeClr>
+                </a:solidFill>
+              </a:ln>
+            </p:spPr>
+            <p:style>
+              <a:lnRef idx="2">
+                <a:schemeClr val="accent6">
+                  <a:shade val="50000"/>
+                </a:schemeClr>
+              </a:lnRef>
+              <a:fillRef idx="1">
+                <a:schemeClr val="accent6"/>
+              </a:fillRef>
+              <a:effectRef idx="0">
+                <a:schemeClr val="accent6"/>
+              </a:effectRef>
+              <a:fontRef idx="minor">
+                <a:schemeClr val="lt1"/>
+              </a:fontRef>
+            </p:style>
+            <p:txBody>
+              <a:bodyPr rtlCol="0" anchor="ctr"/>
+              <a:lstStyle/>
+              <a:p>
+                <a:pPr algn="ctr"/>
+                <a:endParaRPr lang="fr-FR"/>
+              </a:p>
+            </p:txBody>
+          </p:sp>
+          <p:sp>
+            <p:nvSpPr>
+              <p:cNvPr id="133" name="Parallélogramme 132"/>
+              <p:cNvSpPr/>
+              <p:nvPr/>
+            </p:nvSpPr>
+            <p:spPr>
+              <a:xfrm rot="5400000" flipV="1">
+                <a:off x="6310632" y="4350956"/>
+                <a:ext cx="1227663" cy="365892"/>
+              </a:xfrm>
+              <a:prstGeom prst="parallelogram">
+                <a:avLst>
+                  <a:gd name="adj" fmla="val 0"/>
+                </a:avLst>
+              </a:prstGeom>
+              <a:solidFill>
+                <a:srgbClr val="262626"/>
+              </a:solidFill>
+              <a:ln>
+                <a:solidFill>
+                  <a:schemeClr val="tx1">
+                    <a:lumMod val="95000"/>
+                    <a:lumOff val="5000"/>
+                  </a:schemeClr>
+                </a:solidFill>
+              </a:ln>
+            </p:spPr>
+            <p:style>
+              <a:lnRef idx="2">
+                <a:schemeClr val="accent6">
+                  <a:shade val="50000"/>
+                </a:schemeClr>
+              </a:lnRef>
+              <a:fillRef idx="1">
+                <a:schemeClr val="accent6"/>
+              </a:fillRef>
+              <a:effectRef idx="0">
+                <a:schemeClr val="accent6"/>
+              </a:effectRef>
+              <a:fontRef idx="minor">
+                <a:schemeClr val="lt1"/>
+              </a:fontRef>
+            </p:style>
+            <p:txBody>
+              <a:bodyPr rtlCol="0" anchor="ctr"/>
+              <a:lstStyle/>
+              <a:p>
+                <a:pPr algn="ctr"/>
+                <a:endParaRPr lang="fr-FR"/>
+              </a:p>
+            </p:txBody>
+          </p:sp>
+          <p:sp>
+            <p:nvSpPr>
+              <p:cNvPr id="134" name="Parallélogramme 133"/>
+              <p:cNvSpPr/>
+              <p:nvPr/>
+            </p:nvSpPr>
+            <p:spPr>
+              <a:xfrm rot="5400000" flipV="1">
+                <a:off x="6532677" y="2825696"/>
+                <a:ext cx="783574" cy="365892"/>
+              </a:xfrm>
+              <a:prstGeom prst="parallelogram">
+                <a:avLst>
+                  <a:gd name="adj" fmla="val 0"/>
+                </a:avLst>
+              </a:prstGeom>
+              <a:solidFill>
+                <a:srgbClr val="262626"/>
+              </a:solidFill>
+              <a:ln>
+                <a:solidFill>
+                  <a:schemeClr val="tx1">
+                    <a:lumMod val="95000"/>
+                    <a:lumOff val="5000"/>
+                  </a:schemeClr>
+                </a:solidFill>
+              </a:ln>
+            </p:spPr>
+            <p:style>
+              <a:lnRef idx="2">
+                <a:schemeClr val="accent6">
+                  <a:shade val="50000"/>
+                </a:schemeClr>
+              </a:lnRef>
+              <a:fillRef idx="1">
+                <a:schemeClr val="accent6"/>
+              </a:fillRef>
+              <a:effectRef idx="0">
+                <a:schemeClr val="accent6"/>
+              </a:effectRef>
+              <a:fontRef idx="minor">
+                <a:schemeClr val="lt1"/>
+              </a:fontRef>
+            </p:style>
+            <p:txBody>
+              <a:bodyPr rtlCol="0" anchor="ctr"/>
+              <a:lstStyle/>
+              <a:p>
+                <a:pPr algn="ctr"/>
+                <a:endParaRPr lang="fr-FR"/>
+              </a:p>
+            </p:txBody>
+          </p:sp>
+          <p:sp>
+            <p:nvSpPr>
+              <p:cNvPr id="135" name="Rectangle 134"/>
+              <p:cNvSpPr/>
+              <p:nvPr/>
+            </p:nvSpPr>
+            <p:spPr>
+              <a:xfrm>
+                <a:off x="6741516" y="2598682"/>
+                <a:ext cx="365893" cy="169918"/>
+              </a:xfrm>
+              <a:prstGeom prst="rect">
+                <a:avLst/>
+              </a:prstGeom>
+              <a:solidFill>
+                <a:srgbClr val="262626"/>
+              </a:solidFill>
+              <a:ln>
+                <a:noFill/>
+              </a:ln>
+            </p:spPr>
+            <p:style>
+              <a:lnRef idx="2">
+                <a:schemeClr val="accent1">
+                  <a:shade val="50000"/>
+                </a:schemeClr>
+              </a:lnRef>
+              <a:fillRef idx="1">
+                <a:schemeClr val="accent1"/>
+              </a:fillRef>
+              <a:effectRef idx="0">
+                <a:schemeClr val="accent1"/>
+              </a:effectRef>
+              <a:fontRef idx="minor">
+                <a:schemeClr val="lt1"/>
+              </a:fontRef>
+            </p:style>
+            <p:txBody>
+              <a:bodyPr rtlCol="0" anchor="ctr"/>
+              <a:lstStyle/>
+              <a:p>
+                <a:pPr algn="ctr"/>
+                <a:endParaRPr lang="fr-FR"/>
+              </a:p>
+            </p:txBody>
+          </p:sp>
+        </p:grpSp>
+        <p:sp>
+          <p:nvSpPr>
+            <p:cNvPr id="121" name="Parallélogramme 120"/>
+            <p:cNvSpPr/>
+            <p:nvPr/>
+          </p:nvSpPr>
+          <p:spPr>
+            <a:xfrm>
+              <a:off x="3694935" y="1025737"/>
+              <a:ext cx="921902" cy="235717"/>
+            </a:xfrm>
+            <a:prstGeom prst="parallelogram">
+              <a:avLst>
+                <a:gd name="adj" fmla="val 98123"/>
+              </a:avLst>
+            </a:prstGeom>
             <a:solidFill>
               <a:srgbClr val="3E82A3"/>
             </a:solidFill>
@@ -3800,7 +6772,7 @@
         </p:sp>
         <p:sp>
           <p:nvSpPr>
-            <p:cNvPr id="46" name="Parallélogramme 45"/>
+            <p:cNvPr id="122" name="Parallélogramme 121"/>
             <p:cNvSpPr/>
             <p:nvPr/>
           </p:nvSpPr>
@@ -3851,293 +6823,164 @@
       </p:grpSp>
       <p:grpSp>
         <p:nvGrpSpPr>
-          <p:cNvPr id="3" name="Grouper 2"/>
+          <p:cNvPr id="138" name="Grouper 137"/>
           <p:cNvGrpSpPr/>
           <p:nvPr/>
         </p:nvGrpSpPr>
         <p:grpSpPr>
           <a:xfrm>
-            <a:off x="7420580" y="219119"/>
-            <a:ext cx="4500000" cy="4284000"/>
-            <a:chOff x="4548475" y="2353900"/>
-            <a:chExt cx="4500000" cy="4284000"/>
+            <a:off x="8025293" y="3412834"/>
+            <a:ext cx="3194354" cy="3235713"/>
+            <a:chOff x="2426046" y="358387"/>
+            <a:chExt cx="3194354" cy="3235713"/>
           </a:xfrm>
+          <a:effectLst>
+            <a:outerShdw blurRad="50800" dist="38100" dir="2700000" algn="tl" rotWithShape="0">
+              <a:prstClr val="black">
+                <a:alpha val="40000"/>
+              </a:prstClr>
+            </a:outerShdw>
+          </a:effectLst>
         </p:grpSpPr>
         <p:grpSp>
           <p:nvGrpSpPr>
-            <p:cNvPr id="21" name="Grouper 20"/>
+            <p:cNvPr id="139" name="Grouper 138"/>
             <p:cNvGrpSpPr/>
             <p:nvPr/>
           </p:nvGrpSpPr>
           <p:grpSpPr>
             <a:xfrm>
-              <a:off x="5064147" y="2826724"/>
-              <a:ext cx="3194354" cy="3235713"/>
-              <a:chOff x="2426046" y="358387"/>
-              <a:chExt cx="3194354" cy="3235713"/>
+              <a:off x="2426046" y="366109"/>
+              <a:ext cx="3194354" cy="3227991"/>
+              <a:chOff x="2393646" y="368960"/>
+              <a:chExt cx="5500312" cy="5155839"/>
             </a:xfrm>
-            <a:effectLst>
-              <a:outerShdw blurRad="50800" dist="38100" dir="2700000" algn="tl" rotWithShape="0">
-                <a:prstClr val="black">
-                  <a:alpha val="40000"/>
-                </a:prstClr>
-              </a:outerShdw>
-            </a:effectLst>
           </p:grpSpPr>
+          <p:sp>
+            <p:nvSpPr>
+              <p:cNvPr id="142" name="Parallélogramme 141"/>
+              <p:cNvSpPr/>
+              <p:nvPr/>
+            </p:nvSpPr>
+            <p:spPr>
+              <a:xfrm rot="5400000" flipV="1">
+                <a:off x="6682524" y="4313366"/>
+                <a:ext cx="2056975" cy="365892"/>
+              </a:xfrm>
+              <a:prstGeom prst="parallelogram">
+                <a:avLst>
+                  <a:gd name="adj" fmla="val 99524"/>
+                </a:avLst>
+              </a:prstGeom>
+              <a:gradFill flip="none" rotWithShape="1">
+                <a:gsLst>
+                  <a:gs pos="0">
+                    <a:srgbClr val="3E82A3">
+                      <a:shade val="30000"/>
+                      <a:satMod val="115000"/>
+                    </a:srgbClr>
+                  </a:gs>
+                  <a:gs pos="50000">
+                    <a:srgbClr val="3E82A3">
+                      <a:shade val="67500"/>
+                      <a:satMod val="115000"/>
+                    </a:srgbClr>
+                  </a:gs>
+                  <a:gs pos="100000">
+                    <a:srgbClr val="3E82A3">
+                      <a:shade val="100000"/>
+                      <a:satMod val="115000"/>
+                    </a:srgbClr>
+                  </a:gs>
+                </a:gsLst>
+                <a:lin ang="10800000" scaled="1"/>
+                <a:tileRect/>
+              </a:gradFill>
+              <a:ln>
+                <a:solidFill>
+                  <a:srgbClr val="0F638C"/>
+                </a:solidFill>
+              </a:ln>
+            </p:spPr>
+            <p:style>
+              <a:lnRef idx="2">
+                <a:schemeClr val="accent6">
+                  <a:shade val="50000"/>
+                </a:schemeClr>
+              </a:lnRef>
+              <a:fillRef idx="1">
+                <a:schemeClr val="accent6"/>
+              </a:fillRef>
+              <a:effectRef idx="0">
+                <a:schemeClr val="accent6"/>
+              </a:effectRef>
+              <a:fontRef idx="minor">
+                <a:schemeClr val="lt1"/>
+              </a:fontRef>
+            </p:style>
+            <p:txBody>
+              <a:bodyPr rtlCol="0" anchor="ctr"/>
+              <a:lstStyle/>
+              <a:p>
+                <a:pPr algn="ctr"/>
+                <a:endParaRPr lang="fr-FR"/>
+              </a:p>
+            </p:txBody>
+          </p:sp>
           <p:grpSp>
             <p:nvGrpSpPr>
-              <p:cNvPr id="24" name="Grouper 23"/>
+              <p:cNvPr id="143" name="Grouper 142"/>
               <p:cNvGrpSpPr/>
               <p:nvPr/>
             </p:nvGrpSpPr>
             <p:grpSpPr>
               <a:xfrm>
-                <a:off x="2426046" y="366109"/>
-                <a:ext cx="3194354" cy="3227991"/>
-                <a:chOff x="2393646" y="368960"/>
-                <a:chExt cx="5500312" cy="5155839"/>
+                <a:off x="4597579" y="1438881"/>
+                <a:ext cx="1568358" cy="1515581"/>
+                <a:chOff x="4615681" y="1516114"/>
+                <a:chExt cx="1584358" cy="1515581"/>
               </a:xfrm>
             </p:grpSpPr>
             <p:sp>
               <p:nvSpPr>
-                <p:cNvPr id="28" name="Parallélogramme 27"/>
-                <p:cNvSpPr/>
-                <p:nvPr/>
-              </p:nvSpPr>
-              <p:spPr>
-                <a:xfrm rot="5400000" flipV="1">
-                  <a:off x="6682524" y="4313366"/>
-                  <a:ext cx="2056975" cy="365892"/>
-                </a:xfrm>
-                <a:prstGeom prst="parallelogram">
-                  <a:avLst>
-                    <a:gd name="adj" fmla="val 99524"/>
-                  </a:avLst>
-                </a:prstGeom>
-                <a:solidFill>
-                  <a:srgbClr val="3E82A3"/>
-                </a:solidFill>
-                <a:ln>
-                  <a:solidFill>
-                    <a:srgbClr val="0F638C"/>
-                  </a:solidFill>
-                </a:ln>
-              </p:spPr>
-              <p:style>
-                <a:lnRef idx="2">
-                  <a:schemeClr val="accent6">
-                    <a:shade val="50000"/>
-                  </a:schemeClr>
-                </a:lnRef>
-                <a:fillRef idx="1">
-                  <a:schemeClr val="accent6"/>
-                </a:fillRef>
-                <a:effectRef idx="0">
-                  <a:schemeClr val="accent6"/>
-                </a:effectRef>
-                <a:fontRef idx="minor">
-                  <a:schemeClr val="lt1"/>
-                </a:fontRef>
-              </p:style>
-              <p:txBody>
-                <a:bodyPr rtlCol="0" anchor="ctr"/>
-                <a:lstStyle/>
-                <a:p>
-                  <a:pPr algn="ctr"/>
-                  <a:endParaRPr lang="fr-FR"/>
-                </a:p>
-              </p:txBody>
-            </p:sp>
-            <p:grpSp>
-              <p:nvGrpSpPr>
-                <p:cNvPr id="29" name="Grouper 28"/>
-                <p:cNvGrpSpPr/>
-                <p:nvPr/>
-              </p:nvGrpSpPr>
-              <p:grpSpPr>
-                <a:xfrm>
-                  <a:off x="4597579" y="1438881"/>
-                  <a:ext cx="1568358" cy="1515581"/>
-                  <a:chOff x="4615681" y="1516114"/>
-                  <a:chExt cx="1584358" cy="1515581"/>
-                </a:xfrm>
-              </p:grpSpPr>
-              <p:sp>
-                <p:nvSpPr>
-                  <p:cNvPr id="56" name="Parallélogramme 55"/>
-                  <p:cNvSpPr/>
-                  <p:nvPr/>
-                </p:nvSpPr>
-                <p:spPr>
-                  <a:xfrm>
-                    <a:off x="4615681" y="2655201"/>
-                    <a:ext cx="1584358" cy="376494"/>
-                  </a:xfrm>
-                  <a:prstGeom prst="parallelogram">
-                    <a:avLst>
-                      <a:gd name="adj" fmla="val 98123"/>
-                    </a:avLst>
-                  </a:prstGeom>
-                  <a:solidFill>
-                    <a:srgbClr val="3E82A3"/>
-                  </a:solidFill>
-                  <a:ln>
-                    <a:solidFill>
-                      <a:srgbClr val="0F638C"/>
-                    </a:solidFill>
-                  </a:ln>
-                </p:spPr>
-                <p:style>
-                  <a:lnRef idx="2">
-                    <a:schemeClr val="accent5">
-                      <a:shade val="50000"/>
-                    </a:schemeClr>
-                  </a:lnRef>
-                  <a:fillRef idx="1">
-                    <a:schemeClr val="accent5"/>
-                  </a:fillRef>
-                  <a:effectRef idx="0">
-                    <a:schemeClr val="accent5"/>
-                  </a:effectRef>
-                  <a:fontRef idx="minor">
-                    <a:schemeClr val="lt1"/>
-                  </a:fontRef>
-                </p:style>
-                <p:txBody>
-                  <a:bodyPr rtlCol="0" anchor="ctr"/>
-                  <a:lstStyle/>
-                  <a:p>
-                    <a:pPr algn="ctr"/>
-                    <a:endParaRPr lang="fr-FR"/>
-                  </a:p>
-                </p:txBody>
-              </p:sp>
-              <p:sp>
-                <p:nvSpPr>
-                  <p:cNvPr id="57" name="Parallélogramme 56"/>
-                  <p:cNvSpPr/>
-                  <p:nvPr/>
-                </p:nvSpPr>
-                <p:spPr>
-                  <a:xfrm rot="5400000" flipV="1">
-                    <a:off x="5264332" y="2079335"/>
-                    <a:ext cx="1498928" cy="372486"/>
-                  </a:xfrm>
-                  <a:prstGeom prst="parallelogram">
-                    <a:avLst>
-                      <a:gd name="adj" fmla="val 99524"/>
-                    </a:avLst>
-                  </a:prstGeom>
-                  <a:solidFill>
-                    <a:srgbClr val="262626"/>
-                  </a:solidFill>
-                  <a:ln>
-                    <a:solidFill>
-                      <a:schemeClr val="tx1">
-                        <a:lumMod val="95000"/>
-                        <a:lumOff val="5000"/>
-                      </a:schemeClr>
-                    </a:solidFill>
-                  </a:ln>
-                </p:spPr>
-                <p:style>
-                  <a:lnRef idx="2">
-                    <a:schemeClr val="accent6">
-                      <a:shade val="50000"/>
-                    </a:schemeClr>
-                  </a:lnRef>
-                  <a:fillRef idx="1">
-                    <a:schemeClr val="accent6"/>
-                  </a:fillRef>
-                  <a:effectRef idx="0">
-                    <a:schemeClr val="accent6"/>
-                  </a:effectRef>
-                  <a:fontRef idx="minor">
-                    <a:schemeClr val="lt1"/>
-                  </a:fontRef>
-                </p:style>
-                <p:txBody>
-                  <a:bodyPr rtlCol="0" anchor="ctr"/>
-                  <a:lstStyle/>
-                  <a:p>
-                    <a:pPr algn="ctr"/>
-                    <a:endParaRPr lang="fr-FR"/>
-                  </a:p>
-                </p:txBody>
-              </p:sp>
-            </p:grpSp>
-            <p:sp>
-              <p:nvSpPr>
-                <p:cNvPr id="30" name="Parallélogramme 29"/>
-                <p:cNvSpPr/>
-                <p:nvPr/>
-              </p:nvSpPr>
-              <p:spPr>
-                <a:xfrm rot="5400000" flipV="1">
-                  <a:off x="4047131" y="888043"/>
-                  <a:ext cx="1421744" cy="383578"/>
-                </a:xfrm>
-                <a:prstGeom prst="parallelogram">
-                  <a:avLst>
-                    <a:gd name="adj" fmla="val 99524"/>
-                  </a:avLst>
-                </a:prstGeom>
-                <a:solidFill>
-                  <a:srgbClr val="262626"/>
-                </a:solidFill>
-                <a:ln>
-                  <a:solidFill>
-                    <a:schemeClr val="tx1">
-                      <a:lumMod val="95000"/>
-                      <a:lumOff val="5000"/>
-                    </a:schemeClr>
-                  </a:solidFill>
-                </a:ln>
-              </p:spPr>
-              <p:style>
-                <a:lnRef idx="2">
-                  <a:schemeClr val="accent3">
-                    <a:shade val="50000"/>
-                  </a:schemeClr>
-                </a:lnRef>
-                <a:fillRef idx="1">
-                  <a:schemeClr val="accent3"/>
-                </a:fillRef>
-                <a:effectRef idx="0">
-                  <a:schemeClr val="accent3"/>
-                </a:effectRef>
-                <a:fontRef idx="minor">
-                  <a:schemeClr val="lt1"/>
-                </a:fontRef>
-              </p:style>
-              <p:txBody>
-                <a:bodyPr rtlCol="0" anchor="ctr"/>
-                <a:lstStyle/>
-                <a:p>
-                  <a:pPr algn="ctr"/>
-                  <a:endParaRPr lang="fr-FR"/>
-                </a:p>
-              </p:txBody>
-            </p:sp>
-            <p:sp>
-              <p:nvSpPr>
-                <p:cNvPr id="31" name="Parallélogramme 30"/>
+                <p:cNvPr id="155" name="Parallélogramme 154"/>
                 <p:cNvSpPr/>
                 <p:nvPr/>
               </p:nvSpPr>
               <p:spPr>
                 <a:xfrm>
-                  <a:off x="2393646" y="2337877"/>
-                  <a:ext cx="1584039" cy="376494"/>
+                  <a:off x="4615681" y="2655201"/>
+                  <a:ext cx="1584358" cy="376494"/>
                 </a:xfrm>
                 <a:prstGeom prst="parallelogram">
                   <a:avLst>
                     <a:gd name="adj" fmla="val 98123"/>
                   </a:avLst>
                 </a:prstGeom>
-                <a:solidFill>
-                  <a:srgbClr val="3E82A3"/>
-                </a:solidFill>
+                <a:gradFill flip="none" rotWithShape="1">
+                  <a:gsLst>
+                    <a:gs pos="0">
+                      <a:srgbClr val="3E82A3">
+                        <a:shade val="30000"/>
+                        <a:satMod val="115000"/>
+                      </a:srgbClr>
+                    </a:gs>
+                    <a:gs pos="50000">
+                      <a:srgbClr val="3E82A3">
+                        <a:shade val="67500"/>
+                        <a:satMod val="115000"/>
+                      </a:srgbClr>
+                    </a:gs>
+                    <a:gs pos="100000">
+                      <a:srgbClr val="3E82A3">
+                        <a:shade val="100000"/>
+                        <a:satMod val="115000"/>
+                      </a:srgbClr>
+                    </a:gs>
+                  </a:gsLst>
+                  <a:lin ang="2700000" scaled="1"/>
+                  <a:tileRect/>
+                </a:gradFill>
                 <a:ln>
                   <a:solidFill>
                     <a:srgbClr val="0F638C"/>
@@ -4171,67 +7014,14 @@
             </p:sp>
             <p:sp>
               <p:nvSpPr>
-                <p:cNvPr id="38" name="Parallélogramme 37"/>
+                <p:cNvPr id="156" name="Parallélogramme 155"/>
                 <p:cNvSpPr/>
                 <p:nvPr/>
               </p:nvSpPr>
               <p:spPr>
                 <a:xfrm rot="5400000" flipV="1">
-                  <a:off x="3055416" y="2904792"/>
-                  <a:ext cx="1485900" cy="365892"/>
-                </a:xfrm>
-                <a:prstGeom prst="parallelogram">
-                  <a:avLst>
-                    <a:gd name="adj" fmla="val 102916"/>
-                  </a:avLst>
-                </a:prstGeom>
-                <a:solidFill>
-                  <a:srgbClr val="262626"/>
-                </a:solidFill>
-                <a:ln>
-                  <a:solidFill>
-                    <a:schemeClr val="tx1">
-                      <a:lumMod val="95000"/>
-                      <a:lumOff val="5000"/>
-                    </a:schemeClr>
-                  </a:solidFill>
-                </a:ln>
-              </p:spPr>
-              <p:style>
-                <a:lnRef idx="2">
-                  <a:schemeClr val="accent6">
-                    <a:shade val="50000"/>
-                  </a:schemeClr>
-                </a:lnRef>
-                <a:fillRef idx="1">
-                  <a:schemeClr val="accent6"/>
-                </a:fillRef>
-                <a:effectRef idx="0">
-                  <a:schemeClr val="accent6"/>
-                </a:effectRef>
-                <a:fontRef idx="minor">
-                  <a:schemeClr val="lt1"/>
-                </a:fontRef>
-              </p:style>
-              <p:txBody>
-                <a:bodyPr rtlCol="0" anchor="ctr"/>
-                <a:lstStyle/>
-                <a:p>
-                  <a:pPr algn="ctr"/>
-                  <a:endParaRPr lang="fr-FR"/>
-                </a:p>
-              </p:txBody>
-            </p:sp>
-            <p:sp>
-              <p:nvSpPr>
-                <p:cNvPr id="48" name="Parallélogramme 47"/>
-                <p:cNvSpPr/>
-                <p:nvPr/>
-              </p:nvSpPr>
-              <p:spPr>
-                <a:xfrm rot="5400000" flipV="1">
-                  <a:off x="1838403" y="1771678"/>
-                  <a:ext cx="1485900" cy="365892"/>
+                  <a:off x="5264332" y="2079335"/>
+                  <a:ext cx="1498928" cy="372486"/>
                 </a:xfrm>
                 <a:prstGeom prst="parallelogram">
                   <a:avLst>
@@ -4275,381 +7065,100 @@
                 </a:p>
               </p:txBody>
             </p:sp>
-            <p:sp>
-              <p:nvSpPr>
-                <p:cNvPr id="49" name="Parallélogramme 48"/>
-                <p:cNvSpPr/>
-                <p:nvPr/>
-              </p:nvSpPr>
-              <p:spPr>
-                <a:xfrm>
-                  <a:off x="2409229" y="1165803"/>
-                  <a:ext cx="1584038" cy="376494"/>
-                </a:xfrm>
-                <a:prstGeom prst="parallelogram">
-                  <a:avLst>
-                    <a:gd name="adj" fmla="val 98123"/>
-                  </a:avLst>
-                </a:prstGeom>
-                <a:solidFill>
-                  <a:srgbClr val="3E82A3"/>
-                </a:solidFill>
-                <a:ln>
-                  <a:solidFill>
-                    <a:srgbClr val="0F638C"/>
-                  </a:solidFill>
-                </a:ln>
-              </p:spPr>
-              <p:style>
-                <a:lnRef idx="2">
-                  <a:schemeClr val="accent5">
-                    <a:shade val="50000"/>
-                  </a:schemeClr>
-                </a:lnRef>
-                <a:fillRef idx="1">
-                  <a:schemeClr val="accent5"/>
-                </a:fillRef>
-                <a:effectRef idx="0">
-                  <a:schemeClr val="accent5"/>
-                </a:effectRef>
-                <a:fontRef idx="minor">
-                  <a:schemeClr val="lt1"/>
-                </a:fontRef>
-              </p:style>
-              <p:txBody>
-                <a:bodyPr rtlCol="0" anchor="ctr"/>
-                <a:lstStyle/>
-                <a:p>
-                  <a:pPr algn="ctr"/>
-                  <a:endParaRPr lang="fr-FR"/>
-                </a:p>
-              </p:txBody>
-            </p:sp>
-            <p:sp>
-              <p:nvSpPr>
-                <p:cNvPr id="50" name="Parallélogramme 49"/>
-                <p:cNvSpPr/>
-                <p:nvPr/>
-              </p:nvSpPr>
-              <p:spPr>
-                <a:xfrm>
-                  <a:off x="3615420" y="3467824"/>
-                  <a:ext cx="4269036" cy="376494"/>
-                </a:xfrm>
-                <a:prstGeom prst="parallelogram">
-                  <a:avLst>
-                    <a:gd name="adj" fmla="val 98123"/>
-                  </a:avLst>
-                </a:prstGeom>
-                <a:solidFill>
-                  <a:srgbClr val="3E82A3"/>
-                </a:solidFill>
-                <a:ln>
-                  <a:solidFill>
-                    <a:srgbClr val="0F638C"/>
-                  </a:solidFill>
-                </a:ln>
-              </p:spPr>
-              <p:style>
-                <a:lnRef idx="2">
-                  <a:schemeClr val="accent5">
-                    <a:shade val="50000"/>
-                  </a:schemeClr>
-                </a:lnRef>
-                <a:fillRef idx="1">
-                  <a:schemeClr val="accent5"/>
-                </a:fillRef>
-                <a:effectRef idx="0">
-                  <a:schemeClr val="accent5"/>
-                </a:effectRef>
-                <a:fontRef idx="minor">
-                  <a:schemeClr val="lt1"/>
-                </a:fontRef>
-              </p:style>
-              <p:txBody>
-                <a:bodyPr rtlCol="0" anchor="ctr"/>
-                <a:lstStyle/>
-                <a:p>
-                  <a:pPr algn="ctr"/>
-                  <a:endParaRPr lang="fr-FR"/>
-                </a:p>
-              </p:txBody>
-            </p:sp>
-            <p:sp>
-              <p:nvSpPr>
-                <p:cNvPr id="51" name="Parallélogramme 50"/>
-                <p:cNvSpPr/>
-                <p:nvPr/>
-              </p:nvSpPr>
-              <p:spPr>
-                <a:xfrm rot="5400000" flipV="1">
-                  <a:off x="6508292" y="2452140"/>
-                  <a:ext cx="2405437" cy="365892"/>
-                </a:xfrm>
-                <a:prstGeom prst="parallelogram">
-                  <a:avLst>
-                    <a:gd name="adj" fmla="val 99524"/>
-                  </a:avLst>
-                </a:prstGeom>
-                <a:solidFill>
-                  <a:srgbClr val="3E82A3"/>
-                </a:solidFill>
-                <a:ln>
-                  <a:solidFill>
-                    <a:srgbClr val="0F638C"/>
-                  </a:solidFill>
-                </a:ln>
-              </p:spPr>
-              <p:style>
-                <a:lnRef idx="2">
-                  <a:schemeClr val="accent6">
-                    <a:shade val="50000"/>
-                  </a:schemeClr>
-                </a:lnRef>
-                <a:fillRef idx="1">
-                  <a:schemeClr val="accent6"/>
-                </a:fillRef>
-                <a:effectRef idx="0">
-                  <a:schemeClr val="accent6"/>
-                </a:effectRef>
-                <a:fontRef idx="minor">
-                  <a:schemeClr val="lt1"/>
-                </a:fontRef>
-              </p:style>
-              <p:txBody>
-                <a:bodyPr rtlCol="0" anchor="ctr"/>
-                <a:lstStyle/>
-                <a:p>
-                  <a:pPr algn="ctr"/>
-                  <a:endParaRPr lang="fr-FR"/>
-                </a:p>
-              </p:txBody>
-            </p:sp>
-            <p:sp>
-              <p:nvSpPr>
-                <p:cNvPr id="52" name="Parallélogramme 51"/>
-                <p:cNvSpPr/>
-                <p:nvPr/>
-              </p:nvSpPr>
-              <p:spPr>
-                <a:xfrm rot="5400000" flipV="1">
-                  <a:off x="6361649" y="2590107"/>
-                  <a:ext cx="1125629" cy="365892"/>
-                </a:xfrm>
-                <a:prstGeom prst="parallelogram">
-                  <a:avLst>
-                    <a:gd name="adj" fmla="val 99524"/>
-                  </a:avLst>
-                </a:prstGeom>
-                <a:solidFill>
-                  <a:srgbClr val="262626"/>
-                </a:solidFill>
-                <a:ln>
-                  <a:solidFill>
-                    <a:schemeClr val="tx1">
-                      <a:lumMod val="95000"/>
-                      <a:lumOff val="5000"/>
-                    </a:schemeClr>
-                  </a:solidFill>
-                </a:ln>
-              </p:spPr>
-              <p:style>
-                <a:lnRef idx="2">
-                  <a:schemeClr val="accent6">
-                    <a:shade val="50000"/>
-                  </a:schemeClr>
-                </a:lnRef>
-                <a:fillRef idx="1">
-                  <a:schemeClr val="accent6"/>
-                </a:fillRef>
-                <a:effectRef idx="0">
-                  <a:schemeClr val="accent6"/>
-                </a:effectRef>
-                <a:fontRef idx="minor">
-                  <a:schemeClr val="lt1"/>
-                </a:fontRef>
-              </p:style>
-              <p:txBody>
-                <a:bodyPr rtlCol="0" anchor="ctr"/>
-                <a:lstStyle/>
-                <a:p>
-                  <a:pPr algn="ctr"/>
-                  <a:endParaRPr lang="fr-FR"/>
-                </a:p>
-              </p:txBody>
-            </p:sp>
-            <p:sp>
-              <p:nvSpPr>
-                <p:cNvPr id="53" name="Parallélogramme 52"/>
-                <p:cNvSpPr/>
-                <p:nvPr/>
-              </p:nvSpPr>
-              <p:spPr>
-                <a:xfrm rot="5400000" flipV="1">
-                  <a:off x="6310632" y="4350956"/>
-                  <a:ext cx="1227663" cy="365892"/>
-                </a:xfrm>
-                <a:prstGeom prst="parallelogram">
-                  <a:avLst>
-                    <a:gd name="adj" fmla="val 0"/>
-                  </a:avLst>
-                </a:prstGeom>
-                <a:solidFill>
-                  <a:srgbClr val="262626"/>
-                </a:solidFill>
-                <a:ln>
-                  <a:solidFill>
-                    <a:schemeClr val="tx1">
-                      <a:lumMod val="95000"/>
-                      <a:lumOff val="5000"/>
-                    </a:schemeClr>
-                  </a:solidFill>
-                </a:ln>
-              </p:spPr>
-              <p:style>
-                <a:lnRef idx="2">
-                  <a:schemeClr val="accent6">
-                    <a:shade val="50000"/>
-                  </a:schemeClr>
-                </a:lnRef>
-                <a:fillRef idx="1">
-                  <a:schemeClr val="accent6"/>
-                </a:fillRef>
-                <a:effectRef idx="0">
-                  <a:schemeClr val="accent6"/>
-                </a:effectRef>
-                <a:fontRef idx="minor">
-                  <a:schemeClr val="lt1"/>
-                </a:fontRef>
-              </p:style>
-              <p:txBody>
-                <a:bodyPr rtlCol="0" anchor="ctr"/>
-                <a:lstStyle/>
-                <a:p>
-                  <a:pPr algn="ctr"/>
-                  <a:endParaRPr lang="fr-FR"/>
-                </a:p>
-              </p:txBody>
-            </p:sp>
-            <p:sp>
-              <p:nvSpPr>
-                <p:cNvPr id="54" name="Parallélogramme 53"/>
-                <p:cNvSpPr/>
-                <p:nvPr/>
-              </p:nvSpPr>
-              <p:spPr>
-                <a:xfrm rot="5400000" flipV="1">
-                  <a:off x="6532677" y="2825696"/>
-                  <a:ext cx="783574" cy="365892"/>
-                </a:xfrm>
-                <a:prstGeom prst="parallelogram">
-                  <a:avLst>
-                    <a:gd name="adj" fmla="val 0"/>
-                  </a:avLst>
-                </a:prstGeom>
-                <a:solidFill>
-                  <a:srgbClr val="262626"/>
-                </a:solidFill>
-                <a:ln>
-                  <a:solidFill>
-                    <a:schemeClr val="tx1">
-                      <a:lumMod val="95000"/>
-                      <a:lumOff val="5000"/>
-                    </a:schemeClr>
-                  </a:solidFill>
-                </a:ln>
-              </p:spPr>
-              <p:style>
-                <a:lnRef idx="2">
-                  <a:schemeClr val="accent6">
-                    <a:shade val="50000"/>
-                  </a:schemeClr>
-                </a:lnRef>
-                <a:fillRef idx="1">
-                  <a:schemeClr val="accent6"/>
-                </a:fillRef>
-                <a:effectRef idx="0">
-                  <a:schemeClr val="accent6"/>
-                </a:effectRef>
-                <a:fontRef idx="minor">
-                  <a:schemeClr val="lt1"/>
-                </a:fontRef>
-              </p:style>
-              <p:txBody>
-                <a:bodyPr rtlCol="0" anchor="ctr"/>
-                <a:lstStyle/>
-                <a:p>
-                  <a:pPr algn="ctr"/>
-                  <a:endParaRPr lang="fr-FR"/>
-                </a:p>
-              </p:txBody>
-            </p:sp>
-            <p:sp>
-              <p:nvSpPr>
-                <p:cNvPr id="55" name="Rectangle 54"/>
-                <p:cNvSpPr/>
-                <p:nvPr/>
-              </p:nvSpPr>
-              <p:spPr>
-                <a:xfrm>
-                  <a:off x="6741516" y="2598682"/>
-                  <a:ext cx="365893" cy="169918"/>
-                </a:xfrm>
-                <a:prstGeom prst="rect">
-                  <a:avLst/>
-                </a:prstGeom>
-                <a:solidFill>
-                  <a:srgbClr val="262626"/>
-                </a:solidFill>
-                <a:ln>
-                  <a:noFill/>
-                </a:ln>
-              </p:spPr>
-              <p:style>
-                <a:lnRef idx="2">
-                  <a:schemeClr val="accent1">
-                    <a:shade val="50000"/>
-                  </a:schemeClr>
-                </a:lnRef>
-                <a:fillRef idx="1">
-                  <a:schemeClr val="accent1"/>
-                </a:fillRef>
-                <a:effectRef idx="0">
-                  <a:schemeClr val="accent1"/>
-                </a:effectRef>
-                <a:fontRef idx="minor">
-                  <a:schemeClr val="lt1"/>
-                </a:fontRef>
-              </p:style>
-              <p:txBody>
-                <a:bodyPr rtlCol="0" anchor="ctr"/>
-                <a:lstStyle/>
-                <a:p>
-                  <a:pPr algn="ctr"/>
-                  <a:endParaRPr lang="fr-FR"/>
-                </a:p>
-              </p:txBody>
-            </p:sp>
           </p:grpSp>
           <p:sp>
             <p:nvSpPr>
-              <p:cNvPr id="25" name="Parallélogramme 24"/>
+              <p:cNvPr id="144" name="Parallélogramme 143"/>
+              <p:cNvSpPr/>
+              <p:nvPr/>
+            </p:nvSpPr>
+            <p:spPr>
+              <a:xfrm rot="5400000" flipV="1">
+                <a:off x="4047131" y="888043"/>
+                <a:ext cx="1421744" cy="383578"/>
+              </a:xfrm>
+              <a:prstGeom prst="parallelogram">
+                <a:avLst>
+                  <a:gd name="adj" fmla="val 99524"/>
+                </a:avLst>
+              </a:prstGeom>
+              <a:solidFill>
+                <a:srgbClr val="262626"/>
+              </a:solidFill>
+              <a:ln>
+                <a:solidFill>
+                  <a:schemeClr val="tx1">
+                    <a:lumMod val="95000"/>
+                    <a:lumOff val="5000"/>
+                  </a:schemeClr>
+                </a:solidFill>
+              </a:ln>
+            </p:spPr>
+            <p:style>
+              <a:lnRef idx="2">
+                <a:schemeClr val="accent3">
+                  <a:shade val="50000"/>
+                </a:schemeClr>
+              </a:lnRef>
+              <a:fillRef idx="1">
+                <a:schemeClr val="accent3"/>
+              </a:fillRef>
+              <a:effectRef idx="0">
+                <a:schemeClr val="accent3"/>
+              </a:effectRef>
+              <a:fontRef idx="minor">
+                <a:schemeClr val="lt1"/>
+              </a:fontRef>
+            </p:style>
+            <p:txBody>
+              <a:bodyPr rtlCol="0" anchor="ctr"/>
+              <a:lstStyle/>
+              <a:p>
+                <a:pPr algn="ctr"/>
+                <a:endParaRPr lang="fr-FR"/>
+              </a:p>
+            </p:txBody>
+          </p:sp>
+          <p:sp>
+            <p:nvSpPr>
+              <p:cNvPr id="145" name="Parallélogramme 144"/>
               <p:cNvSpPr/>
               <p:nvPr/>
             </p:nvSpPr>
             <p:spPr>
               <a:xfrm>
-                <a:off x="3694935" y="1025737"/>
-                <a:ext cx="921902" cy="235717"/>
+                <a:off x="2393646" y="2337877"/>
+                <a:ext cx="1584039" cy="376494"/>
               </a:xfrm>
               <a:prstGeom prst="parallelogram">
                 <a:avLst>
                   <a:gd name="adj" fmla="val 98123"/>
                 </a:avLst>
               </a:prstGeom>
-              <a:solidFill>
-                <a:srgbClr val="3E82A3"/>
-              </a:solidFill>
+              <a:gradFill flip="none" rotWithShape="1">
+                <a:gsLst>
+                  <a:gs pos="0">
+                    <a:srgbClr val="3E82A3">
+                      <a:shade val="30000"/>
+                      <a:satMod val="115000"/>
+                    </a:srgbClr>
+                  </a:gs>
+                  <a:gs pos="50000">
+                    <a:srgbClr val="3E82A3">
+                      <a:shade val="67500"/>
+                      <a:satMod val="115000"/>
+                    </a:srgbClr>
+                  </a:gs>
+                  <a:gs pos="100000">
+                    <a:srgbClr val="3E82A3">
+                      <a:shade val="100000"/>
+                      <a:satMod val="115000"/>
+                    </a:srgbClr>
+                  </a:gs>
+                </a:gsLst>
+                <a:lin ang="2700000" scaled="1"/>
+                <a:tileRect/>
+              </a:gradFill>
               <a:ln>
                 <a:solidFill>
                   <a:srgbClr val="0F638C"/>
@@ -4683,23 +7192,150 @@
           </p:sp>
           <p:sp>
             <p:nvSpPr>
-              <p:cNvPr id="27" name="Parallélogramme 26"/>
+              <p:cNvPr id="146" name="Parallélogramme 145"/>
+              <p:cNvSpPr/>
+              <p:nvPr/>
+            </p:nvSpPr>
+            <p:spPr>
+              <a:xfrm rot="5400000" flipV="1">
+                <a:off x="3055416" y="2904792"/>
+                <a:ext cx="1485900" cy="365892"/>
+              </a:xfrm>
+              <a:prstGeom prst="parallelogram">
+                <a:avLst>
+                  <a:gd name="adj" fmla="val 102916"/>
+                </a:avLst>
+              </a:prstGeom>
+              <a:solidFill>
+                <a:srgbClr val="262626"/>
+              </a:solidFill>
+              <a:ln>
+                <a:solidFill>
+                  <a:schemeClr val="tx1">
+                    <a:lumMod val="95000"/>
+                    <a:lumOff val="5000"/>
+                  </a:schemeClr>
+                </a:solidFill>
+              </a:ln>
+            </p:spPr>
+            <p:style>
+              <a:lnRef idx="2">
+                <a:schemeClr val="accent6">
+                  <a:shade val="50000"/>
+                </a:schemeClr>
+              </a:lnRef>
+              <a:fillRef idx="1">
+                <a:schemeClr val="accent6"/>
+              </a:fillRef>
+              <a:effectRef idx="0">
+                <a:schemeClr val="accent6"/>
+              </a:effectRef>
+              <a:fontRef idx="minor">
+                <a:schemeClr val="lt1"/>
+              </a:fontRef>
+            </p:style>
+            <p:txBody>
+              <a:bodyPr rtlCol="0" anchor="ctr"/>
+              <a:lstStyle/>
+              <a:p>
+                <a:pPr algn="ctr"/>
+                <a:endParaRPr lang="fr-FR"/>
+              </a:p>
+            </p:txBody>
+          </p:sp>
+          <p:sp>
+            <p:nvSpPr>
+              <p:cNvPr id="147" name="Parallélogramme 146"/>
+              <p:cNvSpPr/>
+              <p:nvPr/>
+            </p:nvSpPr>
+            <p:spPr>
+              <a:xfrm rot="5400000" flipV="1">
+                <a:off x="1838403" y="1771678"/>
+                <a:ext cx="1485900" cy="365892"/>
+              </a:xfrm>
+              <a:prstGeom prst="parallelogram">
+                <a:avLst>
+                  <a:gd name="adj" fmla="val 99524"/>
+                </a:avLst>
+              </a:prstGeom>
+              <a:solidFill>
+                <a:srgbClr val="262626"/>
+              </a:solidFill>
+              <a:ln>
+                <a:solidFill>
+                  <a:schemeClr val="tx1">
+                    <a:lumMod val="95000"/>
+                    <a:lumOff val="5000"/>
+                  </a:schemeClr>
+                </a:solidFill>
+              </a:ln>
+            </p:spPr>
+            <p:style>
+              <a:lnRef idx="2">
+                <a:schemeClr val="accent6">
+                  <a:shade val="50000"/>
+                </a:schemeClr>
+              </a:lnRef>
+              <a:fillRef idx="1">
+                <a:schemeClr val="accent6"/>
+              </a:fillRef>
+              <a:effectRef idx="0">
+                <a:schemeClr val="accent6"/>
+              </a:effectRef>
+              <a:fontRef idx="minor">
+                <a:schemeClr val="lt1"/>
+              </a:fontRef>
+            </p:style>
+            <p:txBody>
+              <a:bodyPr rtlCol="0" anchor="ctr"/>
+              <a:lstStyle/>
+              <a:p>
+                <a:pPr algn="ctr"/>
+                <a:endParaRPr lang="fr-FR"/>
+              </a:p>
+            </p:txBody>
+          </p:sp>
+          <p:sp>
+            <p:nvSpPr>
+              <p:cNvPr id="148" name="Parallélogramme 147"/>
               <p:cNvSpPr/>
               <p:nvPr/>
             </p:nvSpPr>
             <p:spPr>
               <a:xfrm>
-                <a:off x="2787446" y="358387"/>
-                <a:ext cx="1123104" cy="235717"/>
+                <a:off x="2409229" y="1165803"/>
+                <a:ext cx="1584038" cy="376494"/>
               </a:xfrm>
               <a:prstGeom prst="parallelogram">
                 <a:avLst>
                   <a:gd name="adj" fmla="val 98123"/>
                 </a:avLst>
               </a:prstGeom>
-              <a:solidFill>
-                <a:srgbClr val="3E82A3"/>
-              </a:solidFill>
+              <a:gradFill flip="none" rotWithShape="1">
+                <a:gsLst>
+                  <a:gs pos="0">
+                    <a:srgbClr val="3E82A3">
+                      <a:shade val="30000"/>
+                      <a:satMod val="115000"/>
+                    </a:srgbClr>
+                  </a:gs>
+                  <a:gs pos="50000">
+                    <a:srgbClr val="3E82A3">
+                      <a:shade val="67500"/>
+                      <a:satMod val="115000"/>
+                    </a:srgbClr>
+                  </a:gs>
+                  <a:gs pos="100000">
+                    <a:srgbClr val="3E82A3">
+                      <a:shade val="100000"/>
+                      <a:satMod val="115000"/>
+                    </a:srgbClr>
+                  </a:gs>
+                </a:gsLst>
+                <a:lin ang="2700000" scaled="1"/>
+                <a:tileRect/>
+              </a:gradFill>
               <a:ln>
                 <a:solidFill>
                   <a:srgbClr val="0F638C"/>
@@ -4731,39 +7367,411 @@
               </a:p>
             </p:txBody>
           </p:sp>
+          <p:sp>
+            <p:nvSpPr>
+              <p:cNvPr id="149" name="Parallélogramme 148"/>
+              <p:cNvSpPr/>
+              <p:nvPr/>
+            </p:nvSpPr>
+            <p:spPr>
+              <a:xfrm>
+                <a:off x="3615420" y="3467824"/>
+                <a:ext cx="4269036" cy="376494"/>
+              </a:xfrm>
+              <a:prstGeom prst="parallelogram">
+                <a:avLst>
+                  <a:gd name="adj" fmla="val 98123"/>
+                </a:avLst>
+              </a:prstGeom>
+              <a:gradFill flip="none" rotWithShape="1">
+                <a:gsLst>
+                  <a:gs pos="0">
+                    <a:srgbClr val="3E82A3">
+                      <a:shade val="30000"/>
+                      <a:satMod val="115000"/>
+                    </a:srgbClr>
+                  </a:gs>
+                  <a:gs pos="50000">
+                    <a:srgbClr val="3E82A3">
+                      <a:shade val="67500"/>
+                      <a:satMod val="115000"/>
+                    </a:srgbClr>
+                  </a:gs>
+                  <a:gs pos="100000">
+                    <a:srgbClr val="3E82A3">
+                      <a:shade val="100000"/>
+                      <a:satMod val="115000"/>
+                    </a:srgbClr>
+                  </a:gs>
+                </a:gsLst>
+                <a:lin ang="2700000" scaled="1"/>
+                <a:tileRect/>
+              </a:gradFill>
+              <a:ln>
+                <a:solidFill>
+                  <a:srgbClr val="0F638C"/>
+                </a:solidFill>
+              </a:ln>
+            </p:spPr>
+            <p:style>
+              <a:lnRef idx="2">
+                <a:schemeClr val="accent5">
+                  <a:shade val="50000"/>
+                </a:schemeClr>
+              </a:lnRef>
+              <a:fillRef idx="1">
+                <a:schemeClr val="accent5"/>
+              </a:fillRef>
+              <a:effectRef idx="0">
+                <a:schemeClr val="accent5"/>
+              </a:effectRef>
+              <a:fontRef idx="minor">
+                <a:schemeClr val="lt1"/>
+              </a:fontRef>
+            </p:style>
+            <p:txBody>
+              <a:bodyPr rtlCol="0" anchor="ctr"/>
+              <a:lstStyle/>
+              <a:p>
+                <a:pPr algn="ctr"/>
+                <a:endParaRPr lang="fr-FR"/>
+              </a:p>
+            </p:txBody>
+          </p:sp>
+          <p:sp>
+            <p:nvSpPr>
+              <p:cNvPr id="150" name="Parallélogramme 149"/>
+              <p:cNvSpPr/>
+              <p:nvPr/>
+            </p:nvSpPr>
+            <p:spPr>
+              <a:xfrm rot="5400000" flipV="1">
+                <a:off x="6508292" y="2452140"/>
+                <a:ext cx="2405437" cy="365892"/>
+              </a:xfrm>
+              <a:prstGeom prst="parallelogram">
+                <a:avLst>
+                  <a:gd name="adj" fmla="val 99524"/>
+                </a:avLst>
+              </a:prstGeom>
+              <a:gradFill flip="none" rotWithShape="1">
+                <a:gsLst>
+                  <a:gs pos="0">
+                    <a:srgbClr val="3E82A3">
+                      <a:shade val="30000"/>
+                      <a:satMod val="115000"/>
+                    </a:srgbClr>
+                  </a:gs>
+                  <a:gs pos="50000">
+                    <a:srgbClr val="3E82A3">
+                      <a:shade val="67500"/>
+                      <a:satMod val="115000"/>
+                    </a:srgbClr>
+                  </a:gs>
+                  <a:gs pos="100000">
+                    <a:srgbClr val="3E82A3">
+                      <a:shade val="100000"/>
+                      <a:satMod val="115000"/>
+                    </a:srgbClr>
+                  </a:gs>
+                </a:gsLst>
+                <a:lin ang="0" scaled="1"/>
+                <a:tileRect/>
+              </a:gradFill>
+              <a:ln>
+                <a:solidFill>
+                  <a:srgbClr val="0F638C"/>
+                </a:solidFill>
+              </a:ln>
+            </p:spPr>
+            <p:style>
+              <a:lnRef idx="2">
+                <a:schemeClr val="accent6">
+                  <a:shade val="50000"/>
+                </a:schemeClr>
+              </a:lnRef>
+              <a:fillRef idx="1">
+                <a:schemeClr val="accent6"/>
+              </a:fillRef>
+              <a:effectRef idx="0">
+                <a:schemeClr val="accent6"/>
+              </a:effectRef>
+              <a:fontRef idx="minor">
+                <a:schemeClr val="lt1"/>
+              </a:fontRef>
+            </p:style>
+            <p:txBody>
+              <a:bodyPr rtlCol="0" anchor="ctr"/>
+              <a:lstStyle/>
+              <a:p>
+                <a:pPr algn="ctr"/>
+                <a:endParaRPr lang="fr-FR"/>
+              </a:p>
+            </p:txBody>
+          </p:sp>
+          <p:sp>
+            <p:nvSpPr>
+              <p:cNvPr id="151" name="Parallélogramme 150"/>
+              <p:cNvSpPr/>
+              <p:nvPr/>
+            </p:nvSpPr>
+            <p:spPr>
+              <a:xfrm rot="5400000" flipV="1">
+                <a:off x="6361649" y="2590107"/>
+                <a:ext cx="1125629" cy="365892"/>
+              </a:xfrm>
+              <a:prstGeom prst="parallelogram">
+                <a:avLst>
+                  <a:gd name="adj" fmla="val 99524"/>
+                </a:avLst>
+              </a:prstGeom>
+              <a:solidFill>
+                <a:srgbClr val="262626"/>
+              </a:solidFill>
+              <a:ln>
+                <a:solidFill>
+                  <a:schemeClr val="tx1">
+                    <a:lumMod val="95000"/>
+                    <a:lumOff val="5000"/>
+                  </a:schemeClr>
+                </a:solidFill>
+              </a:ln>
+            </p:spPr>
+            <p:style>
+              <a:lnRef idx="2">
+                <a:schemeClr val="accent6">
+                  <a:shade val="50000"/>
+                </a:schemeClr>
+              </a:lnRef>
+              <a:fillRef idx="1">
+                <a:schemeClr val="accent6"/>
+              </a:fillRef>
+              <a:effectRef idx="0">
+                <a:schemeClr val="accent6"/>
+              </a:effectRef>
+              <a:fontRef idx="minor">
+                <a:schemeClr val="lt1"/>
+              </a:fontRef>
+            </p:style>
+            <p:txBody>
+              <a:bodyPr rtlCol="0" anchor="ctr"/>
+              <a:lstStyle/>
+              <a:p>
+                <a:pPr algn="ctr"/>
+                <a:endParaRPr lang="fr-FR"/>
+              </a:p>
+            </p:txBody>
+          </p:sp>
+          <p:sp>
+            <p:nvSpPr>
+              <p:cNvPr id="152" name="Parallélogramme 151"/>
+              <p:cNvSpPr/>
+              <p:nvPr/>
+            </p:nvSpPr>
+            <p:spPr>
+              <a:xfrm rot="5400000" flipV="1">
+                <a:off x="6310632" y="4350956"/>
+                <a:ext cx="1227663" cy="365892"/>
+              </a:xfrm>
+              <a:prstGeom prst="parallelogram">
+                <a:avLst>
+                  <a:gd name="adj" fmla="val 0"/>
+                </a:avLst>
+              </a:prstGeom>
+              <a:solidFill>
+                <a:srgbClr val="262626"/>
+              </a:solidFill>
+              <a:ln>
+                <a:solidFill>
+                  <a:schemeClr val="tx1">
+                    <a:lumMod val="95000"/>
+                    <a:lumOff val="5000"/>
+                  </a:schemeClr>
+                </a:solidFill>
+              </a:ln>
+            </p:spPr>
+            <p:style>
+              <a:lnRef idx="2">
+                <a:schemeClr val="accent6">
+                  <a:shade val="50000"/>
+                </a:schemeClr>
+              </a:lnRef>
+              <a:fillRef idx="1">
+                <a:schemeClr val="accent6"/>
+              </a:fillRef>
+              <a:effectRef idx="0">
+                <a:schemeClr val="accent6"/>
+              </a:effectRef>
+              <a:fontRef idx="minor">
+                <a:schemeClr val="lt1"/>
+              </a:fontRef>
+            </p:style>
+            <p:txBody>
+              <a:bodyPr rtlCol="0" anchor="ctr"/>
+              <a:lstStyle/>
+              <a:p>
+                <a:pPr algn="ctr"/>
+                <a:endParaRPr lang="fr-FR"/>
+              </a:p>
+            </p:txBody>
+          </p:sp>
+          <p:sp>
+            <p:nvSpPr>
+              <p:cNvPr id="153" name="Parallélogramme 152"/>
+              <p:cNvSpPr/>
+              <p:nvPr/>
+            </p:nvSpPr>
+            <p:spPr>
+              <a:xfrm rot="5400000" flipV="1">
+                <a:off x="6532677" y="2825696"/>
+                <a:ext cx="783574" cy="365892"/>
+              </a:xfrm>
+              <a:prstGeom prst="parallelogram">
+                <a:avLst>
+                  <a:gd name="adj" fmla="val 0"/>
+                </a:avLst>
+              </a:prstGeom>
+              <a:solidFill>
+                <a:srgbClr val="262626"/>
+              </a:solidFill>
+              <a:ln>
+                <a:solidFill>
+                  <a:schemeClr val="tx1">
+                    <a:lumMod val="95000"/>
+                    <a:lumOff val="5000"/>
+                  </a:schemeClr>
+                </a:solidFill>
+              </a:ln>
+            </p:spPr>
+            <p:style>
+              <a:lnRef idx="2">
+                <a:schemeClr val="accent6">
+                  <a:shade val="50000"/>
+                </a:schemeClr>
+              </a:lnRef>
+              <a:fillRef idx="1">
+                <a:schemeClr val="accent6"/>
+              </a:fillRef>
+              <a:effectRef idx="0">
+                <a:schemeClr val="accent6"/>
+              </a:effectRef>
+              <a:fontRef idx="minor">
+                <a:schemeClr val="lt1"/>
+              </a:fontRef>
+            </p:style>
+            <p:txBody>
+              <a:bodyPr rtlCol="0" anchor="ctr"/>
+              <a:lstStyle/>
+              <a:p>
+                <a:pPr algn="ctr"/>
+                <a:endParaRPr lang="fr-FR"/>
+              </a:p>
+            </p:txBody>
+          </p:sp>
+          <p:sp>
+            <p:nvSpPr>
+              <p:cNvPr id="154" name="Rectangle 153"/>
+              <p:cNvSpPr/>
+              <p:nvPr/>
+            </p:nvSpPr>
+            <p:spPr>
+              <a:xfrm>
+                <a:off x="6741516" y="2598682"/>
+                <a:ext cx="365893" cy="169918"/>
+              </a:xfrm>
+              <a:prstGeom prst="rect">
+                <a:avLst/>
+              </a:prstGeom>
+              <a:solidFill>
+                <a:srgbClr val="262626"/>
+              </a:solidFill>
+              <a:ln>
+                <a:noFill/>
+              </a:ln>
+            </p:spPr>
+            <p:style>
+              <a:lnRef idx="2">
+                <a:schemeClr val="accent1">
+                  <a:shade val="50000"/>
+                </a:schemeClr>
+              </a:lnRef>
+              <a:fillRef idx="1">
+                <a:schemeClr val="accent1"/>
+              </a:fillRef>
+              <a:effectRef idx="0">
+                <a:schemeClr val="accent1"/>
+              </a:effectRef>
+              <a:fontRef idx="minor">
+                <a:schemeClr val="lt1"/>
+              </a:fontRef>
+            </p:style>
+            <p:txBody>
+              <a:bodyPr rtlCol="0" anchor="ctr"/>
+              <a:lstStyle/>
+              <a:p>
+                <a:pPr algn="ctr"/>
+                <a:endParaRPr lang="fr-FR"/>
+              </a:p>
+            </p:txBody>
+          </p:sp>
         </p:grpSp>
         <p:sp>
           <p:nvSpPr>
-            <p:cNvPr id="2" name="Ellipse 1"/>
+            <p:cNvPr id="140" name="Parallélogramme 139"/>
             <p:cNvSpPr/>
             <p:nvPr/>
           </p:nvSpPr>
           <p:spPr>
             <a:xfrm>
-              <a:off x="4592924" y="2398248"/>
-              <a:ext cx="4402125" cy="4177723"/>
+              <a:off x="3694935" y="1025737"/>
+              <a:ext cx="921902" cy="235717"/>
             </a:xfrm>
-            <a:prstGeom prst="ellipse">
-              <a:avLst/>
+            <a:prstGeom prst="parallelogram">
+              <a:avLst>
+                <a:gd name="adj" fmla="val 98123"/>
+              </a:avLst>
             </a:prstGeom>
-            <a:noFill/>
-            <a:ln w="28575">
+            <a:gradFill flip="none" rotWithShape="1">
+              <a:gsLst>
+                <a:gs pos="0">
+                  <a:srgbClr val="3E82A3">
+                    <a:shade val="30000"/>
+                    <a:satMod val="115000"/>
+                  </a:srgbClr>
+                </a:gs>
+                <a:gs pos="50000">
+                  <a:srgbClr val="3E82A3">
+                    <a:shade val="67500"/>
+                    <a:satMod val="115000"/>
+                  </a:srgbClr>
+                </a:gs>
+                <a:gs pos="100000">
+                  <a:srgbClr val="3E82A3">
+                    <a:shade val="100000"/>
+                    <a:satMod val="115000"/>
+                  </a:srgbClr>
+                </a:gs>
+              </a:gsLst>
+              <a:lin ang="2700000" scaled="1"/>
+              <a:tileRect/>
+            </a:gradFill>
+            <a:ln>
               <a:solidFill>
-                <a:srgbClr val="3E82A3"/>
+                <a:srgbClr val="0F638C"/>
               </a:solidFill>
             </a:ln>
           </p:spPr>
           <p:style>
             <a:lnRef idx="2">
-              <a:schemeClr val="accent1">
+              <a:schemeClr val="accent5">
                 <a:shade val="50000"/>
               </a:schemeClr>
             </a:lnRef>
             <a:fillRef idx="1">
-              <a:schemeClr val="accent1"/>
+              <a:schemeClr val="accent5"/>
             </a:fillRef>
             <a:effectRef idx="0">
-              <a:schemeClr val="accent1"/>
+              <a:schemeClr val="accent5"/>
             </a:effectRef>
             <a:fontRef idx="minor">
               <a:schemeClr val="lt1"/>
@@ -4780,82 +7788,61 @@
         </p:sp>
         <p:sp>
           <p:nvSpPr>
-            <p:cNvPr id="58" name="Ellipse 57"/>
+            <p:cNvPr id="141" name="Parallélogramme 140"/>
             <p:cNvSpPr/>
             <p:nvPr/>
           </p:nvSpPr>
           <p:spPr>
             <a:xfrm>
-              <a:off x="4548475" y="2353900"/>
-              <a:ext cx="4500000" cy="4284000"/>
+              <a:off x="2787446" y="358387"/>
+              <a:ext cx="1123104" cy="235717"/>
             </a:xfrm>
-            <a:prstGeom prst="ellipse">
-              <a:avLst/>
+            <a:prstGeom prst="parallelogram">
+              <a:avLst>
+                <a:gd name="adj" fmla="val 98123"/>
+              </a:avLst>
             </a:prstGeom>
-            <a:noFill/>
-            <a:ln w="28575">
+            <a:gradFill flip="none" rotWithShape="1">
+              <a:gsLst>
+                <a:gs pos="0">
+                  <a:srgbClr val="3E82A3">
+                    <a:shade val="30000"/>
+                    <a:satMod val="115000"/>
+                  </a:srgbClr>
+                </a:gs>
+                <a:gs pos="50000">
+                  <a:srgbClr val="3E82A3">
+                    <a:shade val="67500"/>
+                    <a:satMod val="115000"/>
+                  </a:srgbClr>
+                </a:gs>
+                <a:gs pos="100000">
+                  <a:srgbClr val="3E82A3">
+                    <a:shade val="100000"/>
+                    <a:satMod val="115000"/>
+                  </a:srgbClr>
+                </a:gs>
+              </a:gsLst>
+              <a:lin ang="2700000" scaled="1"/>
+              <a:tileRect/>
+            </a:gradFill>
+            <a:ln>
               <a:solidFill>
-                <a:srgbClr val="262626"/>
+                <a:srgbClr val="0F638C"/>
               </a:solidFill>
             </a:ln>
           </p:spPr>
           <p:style>
             <a:lnRef idx="2">
-              <a:schemeClr val="accent1">
+              <a:schemeClr val="accent5">
                 <a:shade val="50000"/>
               </a:schemeClr>
             </a:lnRef>
             <a:fillRef idx="1">
-              <a:schemeClr val="accent1"/>
+              <a:schemeClr val="accent5"/>
             </a:fillRef>
             <a:effectRef idx="0">
-              <a:schemeClr val="accent1"/>
-            </a:effectRef>
-            <a:fontRef idx="minor">
-              <a:schemeClr val="lt1"/>
-            </a:fontRef>
-          </p:style>
-          <p:txBody>
-            <a:bodyPr rtlCol="0" anchor="ctr"/>
-            <a:lstStyle/>
-            <a:p>
-              <a:pPr algn="ctr"/>
-              <a:endParaRPr lang="fr-FR"/>
-            </a:p>
-          </p:txBody>
-        </p:sp>
-        <p:sp>
-          <p:nvSpPr>
-            <p:cNvPr id="59" name="Ellipse 58"/>
-            <p:cNvSpPr/>
-            <p:nvPr/>
-          </p:nvSpPr>
-          <p:spPr>
-            <a:xfrm>
-              <a:off x="4651986" y="2461900"/>
-              <a:ext cx="4284000" cy="4068000"/>
-            </a:xfrm>
-            <a:prstGeom prst="ellipse">
-              <a:avLst/>
-            </a:prstGeom>
-            <a:noFill/>
-            <a:ln w="28575">
-              <a:solidFill>
-                <a:schemeClr val="bg1"/>
-              </a:solidFill>
-            </a:ln>
-          </p:spPr>
-          <p:style>
-            <a:lnRef idx="2">
-              <a:schemeClr val="accent1">
-                <a:shade val="50000"/>
-              </a:schemeClr>
-            </a:lnRef>
-            <a:fillRef idx="1">
-              <a:schemeClr val="accent1"/>
-            </a:fillRef>
-            <a:effectRef idx="0">
-              <a:schemeClr val="accent1"/>
+              <a:schemeClr val="accent5"/>
             </a:effectRef>
             <a:fontRef idx="minor">
               <a:schemeClr val="lt1"/>

</xml_diff>